<commit_message>
more compact lyx notes
</commit_message>
<xml_diff>
--- a/cohort-vs-period-diagonals/Lexis-diagram.pptx
+++ b/cohort-vs-period-diagonals/Lexis-diagram.pptx
@@ -104,6 +104,11 @@
       </a:defRPr>
     </a:lvl9pPr>
   </p:defaultTextStyle>
+  <p:extLst>
+    <p:ext uri="{EFAFB233-063F-42B5-8137-9DF3F51BA10A}">
+      <p15:sldGuideLst xmlns:p15="http://schemas.microsoft.com/office/powerpoint/2012/main"/>
+    </p:ext>
+  </p:extLst>
 </p:presentation>
 </file>
 
@@ -254,7 +259,7 @@
           <a:p>
             <a:fld id="{D947278E-8722-4541-9ED3-F8DEF2984678}" type="datetimeFigureOut">
               <a:rPr lang="en-US" smtClean="0"/>
-              <a:t>12-Dec-23</a:t>
+              <a:t>13-Dec-23</a:t>
             </a:fld>
             <a:endParaRPr lang="en-US"/>
           </a:p>
@@ -452,7 +457,7 @@
           <a:p>
             <a:fld id="{D947278E-8722-4541-9ED3-F8DEF2984678}" type="datetimeFigureOut">
               <a:rPr lang="en-US" smtClean="0"/>
-              <a:t>12-Dec-23</a:t>
+              <a:t>13-Dec-23</a:t>
             </a:fld>
             <a:endParaRPr lang="en-US"/>
           </a:p>
@@ -660,7 +665,7 @@
           <a:p>
             <a:fld id="{D947278E-8722-4541-9ED3-F8DEF2984678}" type="datetimeFigureOut">
               <a:rPr lang="en-US" smtClean="0"/>
-              <a:t>12-Dec-23</a:t>
+              <a:t>13-Dec-23</a:t>
             </a:fld>
             <a:endParaRPr lang="en-US"/>
           </a:p>
@@ -858,7 +863,7 @@
           <a:p>
             <a:fld id="{D947278E-8722-4541-9ED3-F8DEF2984678}" type="datetimeFigureOut">
               <a:rPr lang="en-US" smtClean="0"/>
-              <a:t>12-Dec-23</a:t>
+              <a:t>13-Dec-23</a:t>
             </a:fld>
             <a:endParaRPr lang="en-US"/>
           </a:p>
@@ -1133,7 +1138,7 @@
           <a:p>
             <a:fld id="{D947278E-8722-4541-9ED3-F8DEF2984678}" type="datetimeFigureOut">
               <a:rPr lang="en-US" smtClean="0"/>
-              <a:t>12-Dec-23</a:t>
+              <a:t>13-Dec-23</a:t>
             </a:fld>
             <a:endParaRPr lang="en-US"/>
           </a:p>
@@ -1398,7 +1403,7 @@
           <a:p>
             <a:fld id="{D947278E-8722-4541-9ED3-F8DEF2984678}" type="datetimeFigureOut">
               <a:rPr lang="en-US" smtClean="0"/>
-              <a:t>12-Dec-23</a:t>
+              <a:t>13-Dec-23</a:t>
             </a:fld>
             <a:endParaRPr lang="en-US"/>
           </a:p>
@@ -1810,7 +1815,7 @@
           <a:p>
             <a:fld id="{D947278E-8722-4541-9ED3-F8DEF2984678}" type="datetimeFigureOut">
               <a:rPr lang="en-US" smtClean="0"/>
-              <a:t>12-Dec-23</a:t>
+              <a:t>13-Dec-23</a:t>
             </a:fld>
             <a:endParaRPr lang="en-US"/>
           </a:p>
@@ -1951,7 +1956,7 @@
           <a:p>
             <a:fld id="{D947278E-8722-4541-9ED3-F8DEF2984678}" type="datetimeFigureOut">
               <a:rPr lang="en-US" smtClean="0"/>
-              <a:t>12-Dec-23</a:t>
+              <a:t>13-Dec-23</a:t>
             </a:fld>
             <a:endParaRPr lang="en-US"/>
           </a:p>
@@ -2064,7 +2069,7 @@
           <a:p>
             <a:fld id="{D947278E-8722-4541-9ED3-F8DEF2984678}" type="datetimeFigureOut">
               <a:rPr lang="en-US" smtClean="0"/>
-              <a:t>12-Dec-23</a:t>
+              <a:t>13-Dec-23</a:t>
             </a:fld>
             <a:endParaRPr lang="en-US"/>
           </a:p>
@@ -2375,7 +2380,7 @@
           <a:p>
             <a:fld id="{D947278E-8722-4541-9ED3-F8DEF2984678}" type="datetimeFigureOut">
               <a:rPr lang="en-US" smtClean="0"/>
-              <a:t>12-Dec-23</a:t>
+              <a:t>13-Dec-23</a:t>
             </a:fld>
             <a:endParaRPr lang="en-US"/>
           </a:p>
@@ -2663,7 +2668,7 @@
           <a:p>
             <a:fld id="{D947278E-8722-4541-9ED3-F8DEF2984678}" type="datetimeFigureOut">
               <a:rPr lang="en-US" smtClean="0"/>
-              <a:t>12-Dec-23</a:t>
+              <a:t>13-Dec-23</a:t>
             </a:fld>
             <a:endParaRPr lang="en-US"/>
           </a:p>
@@ -2904,7 +2909,7 @@
           <a:p>
             <a:fld id="{D947278E-8722-4541-9ED3-F8DEF2984678}" type="datetimeFigureOut">
               <a:rPr lang="en-US" smtClean="0"/>
-              <a:t>12-Dec-23</a:t>
+              <a:t>13-Dec-23</a:t>
             </a:fld>
             <a:endParaRPr lang="en-US"/>
           </a:p>
@@ -3335,10 +3340,10 @@
         </p:nvGrpSpPr>
         <p:grpSpPr>
           <a:xfrm>
-            <a:off x="399325" y="1669444"/>
-            <a:ext cx="9344413" cy="4253411"/>
-            <a:chOff x="399325" y="1669444"/>
-            <a:chExt cx="9344413" cy="4253411"/>
+            <a:off x="399325" y="1672892"/>
+            <a:ext cx="9344413" cy="4249963"/>
+            <a:chOff x="399325" y="1672892"/>
+            <a:chExt cx="9344413" cy="4249963"/>
           </a:xfrm>
         </p:grpSpPr>
         <p:grpSp>
@@ -4678,7 +4683,7 @@
           <p:spPr>
             <a:xfrm>
               <a:off x="742530" y="5615078"/>
-              <a:ext cx="550151" cy="307777"/>
+              <a:ext cx="405880" cy="307777"/>
             </a:xfrm>
             <a:prstGeom prst="rect">
               <a:avLst/>
@@ -4693,7 +4698,7 @@
             <a:p>
               <a:r>
                 <a:rPr lang="en-US" sz="1400" dirty="0"/>
-                <a:t>1959</a:t>
+                <a:t>c-1</a:t>
               </a:r>
             </a:p>
           </p:txBody>
@@ -4712,8 +4717,8 @@
           </p:nvSpPr>
           <p:spPr>
             <a:xfrm>
-              <a:off x="1418442" y="5615078"/>
-              <a:ext cx="550151" cy="307777"/>
+              <a:off x="1591798" y="5609780"/>
+              <a:ext cx="260008" cy="307777"/>
             </a:xfrm>
             <a:prstGeom prst="rect">
               <a:avLst/>
@@ -4728,7 +4733,7 @@
             <a:p>
               <a:r>
                 <a:rPr lang="en-US" sz="1400" dirty="0"/>
-                <a:t>1960</a:t>
+                <a:t>c</a:t>
               </a:r>
             </a:p>
           </p:txBody>
@@ -4747,8 +4752,8 @@
           </p:nvSpPr>
           <p:spPr>
             <a:xfrm>
-              <a:off x="2111486" y="5607697"/>
-              <a:ext cx="550151" cy="307777"/>
+              <a:off x="2219259" y="5613339"/>
+              <a:ext cx="441146" cy="307777"/>
             </a:xfrm>
             <a:prstGeom prst="rect">
               <a:avLst/>
@@ -4763,7 +4768,7 @@
             <a:p>
               <a:r>
                 <a:rPr lang="en-US" sz="1400" dirty="0"/>
-                <a:t>1961</a:t>
+                <a:t>c+1</a:t>
               </a:r>
             </a:p>
           </p:txBody>
@@ -4783,7 +4788,7 @@
           <p:spPr>
             <a:xfrm>
               <a:off x="7214084" y="1676825"/>
-              <a:ext cx="659155" cy="307777"/>
+              <a:ext cx="514885" cy="307777"/>
             </a:xfrm>
             <a:prstGeom prst="rect">
               <a:avLst/>
@@ -4798,7 +4803,7 @@
             <a:p>
               <a:r>
                 <a:rPr lang="en-US" sz="1400" dirty="0"/>
-                <a:t>(1959)</a:t>
+                <a:t>(c-1)</a:t>
               </a:r>
             </a:p>
           </p:txBody>
@@ -4817,8 +4822,8 @@
           </p:nvSpPr>
           <p:spPr>
             <a:xfrm>
-              <a:off x="7889996" y="1676825"/>
-              <a:ext cx="659155" cy="307777"/>
+              <a:off x="8037292" y="1672892"/>
+              <a:ext cx="369012" cy="307777"/>
             </a:xfrm>
             <a:prstGeom prst="rect">
               <a:avLst/>
@@ -4833,7 +4838,7 @@
             <a:p>
               <a:r>
                 <a:rPr lang="en-US" sz="1400" dirty="0"/>
-                <a:t>(1960)</a:t>
+                <a:t>(c)</a:t>
               </a:r>
             </a:p>
           </p:txBody>
@@ -4852,8 +4857,8 @@
           </p:nvSpPr>
           <p:spPr>
             <a:xfrm>
-              <a:off x="8583040" y="1669444"/>
-              <a:ext cx="659155" cy="307777"/>
+              <a:off x="8702827" y="1678232"/>
+              <a:ext cx="550151" cy="307777"/>
             </a:xfrm>
             <a:prstGeom prst="rect">
               <a:avLst/>
@@ -4868,7 +4873,7 @@
             <a:p>
               <a:r>
                 <a:rPr lang="en-US" sz="1400" dirty="0"/>
-                <a:t>(1961)</a:t>
+                <a:t>(c+1)</a:t>
               </a:r>
             </a:p>
           </p:txBody>
@@ -5167,8 +5172,8 @@
           </p:nvSpPr>
           <p:spPr>
             <a:xfrm>
-              <a:off x="7266230" y="5609781"/>
-              <a:ext cx="550151" cy="307777"/>
+              <a:off x="7214084" y="5615078"/>
+              <a:ext cx="532518" cy="307777"/>
             </a:xfrm>
             <a:prstGeom prst="rect">
               <a:avLst/>
@@ -5183,7 +5188,7 @@
             <a:p>
               <a:r>
                 <a:rPr lang="en-US" sz="1400" dirty="0"/>
-                <a:t>1999</a:t>
+                <a:t>c+39</a:t>
               </a:r>
             </a:p>
           </p:txBody>
@@ -5202,8 +5207,8 @@
           </p:nvSpPr>
           <p:spPr>
             <a:xfrm>
-              <a:off x="7942142" y="5609781"/>
-              <a:ext cx="550151" cy="307777"/>
+              <a:off x="7959820" y="5609780"/>
+              <a:ext cx="532518" cy="307777"/>
             </a:xfrm>
             <a:prstGeom prst="rect">
               <a:avLst/>
@@ -5218,7 +5223,7 @@
             <a:p>
               <a:r>
                 <a:rPr lang="en-US" sz="1400" dirty="0"/>
-                <a:t>2000</a:t>
+                <a:t>c+40</a:t>
               </a:r>
             </a:p>
           </p:txBody>
@@ -5237,8 +5242,8 @@
           </p:nvSpPr>
           <p:spPr>
             <a:xfrm>
-              <a:off x="8635186" y="5602400"/>
-              <a:ext cx="550151" cy="307777"/>
+              <a:off x="8678564" y="5602429"/>
+              <a:ext cx="532518" cy="307777"/>
             </a:xfrm>
             <a:prstGeom prst="rect">
               <a:avLst/>
@@ -5253,7 +5258,7 @@
             <a:p>
               <a:r>
                 <a:rPr lang="en-US" sz="1400" dirty="0"/>
-                <a:t>2001</a:t>
+                <a:t>c+41</a:t>
               </a:r>
             </a:p>
           </p:txBody>

</xml_diff>

<commit_message>
"take 2" in progress
</commit_message>
<xml_diff>
--- a/cohort-vs-period-diagonals/Lexis-diagram.pptx
+++ b/cohort-vs-period-diagonals/Lexis-diagram.pptx
@@ -6,9 +6,13 @@
   </p:sldMasterIdLst>
   <p:sldIdLst>
     <p:sldId id="258" r:id="rId2"/>
+    <p:sldId id="259" r:id="rId3"/>
+    <p:sldId id="260" r:id="rId4"/>
+    <p:sldId id="261" r:id="rId5"/>
+    <p:sldId id="262" r:id="rId6"/>
   </p:sldIdLst>
   <p:sldSz cx="12192000" cy="6858000"/>
-  <p:notesSz cx="6858000" cy="9144000"/>
+  <p:notesSz cx="7315200" cy="9601200"/>
   <p:defaultTextStyle>
     <a:defPPr>
       <a:defRPr lang="en-US"/>
@@ -259,7 +263,7 @@
           <a:p>
             <a:fld id="{D947278E-8722-4541-9ED3-F8DEF2984678}" type="datetimeFigureOut">
               <a:rPr lang="en-US" smtClean="0"/>
-              <a:t>13-Dec-23</a:t>
+              <a:t>15-Dec-23</a:t>
             </a:fld>
             <a:endParaRPr lang="en-US"/>
           </a:p>
@@ -457,7 +461,7 @@
           <a:p>
             <a:fld id="{D947278E-8722-4541-9ED3-F8DEF2984678}" type="datetimeFigureOut">
               <a:rPr lang="en-US" smtClean="0"/>
-              <a:t>13-Dec-23</a:t>
+              <a:t>15-Dec-23</a:t>
             </a:fld>
             <a:endParaRPr lang="en-US"/>
           </a:p>
@@ -665,7 +669,7 @@
           <a:p>
             <a:fld id="{D947278E-8722-4541-9ED3-F8DEF2984678}" type="datetimeFigureOut">
               <a:rPr lang="en-US" smtClean="0"/>
-              <a:t>13-Dec-23</a:t>
+              <a:t>15-Dec-23</a:t>
             </a:fld>
             <a:endParaRPr lang="en-US"/>
           </a:p>
@@ -863,7 +867,7 @@
           <a:p>
             <a:fld id="{D947278E-8722-4541-9ED3-F8DEF2984678}" type="datetimeFigureOut">
               <a:rPr lang="en-US" smtClean="0"/>
-              <a:t>13-Dec-23</a:t>
+              <a:t>15-Dec-23</a:t>
             </a:fld>
             <a:endParaRPr lang="en-US"/>
           </a:p>
@@ -1138,7 +1142,7 @@
           <a:p>
             <a:fld id="{D947278E-8722-4541-9ED3-F8DEF2984678}" type="datetimeFigureOut">
               <a:rPr lang="en-US" smtClean="0"/>
-              <a:t>13-Dec-23</a:t>
+              <a:t>15-Dec-23</a:t>
             </a:fld>
             <a:endParaRPr lang="en-US"/>
           </a:p>
@@ -1403,7 +1407,7 @@
           <a:p>
             <a:fld id="{D947278E-8722-4541-9ED3-F8DEF2984678}" type="datetimeFigureOut">
               <a:rPr lang="en-US" smtClean="0"/>
-              <a:t>13-Dec-23</a:t>
+              <a:t>15-Dec-23</a:t>
             </a:fld>
             <a:endParaRPr lang="en-US"/>
           </a:p>
@@ -1815,7 +1819,7 @@
           <a:p>
             <a:fld id="{D947278E-8722-4541-9ED3-F8DEF2984678}" type="datetimeFigureOut">
               <a:rPr lang="en-US" smtClean="0"/>
-              <a:t>13-Dec-23</a:t>
+              <a:t>15-Dec-23</a:t>
             </a:fld>
             <a:endParaRPr lang="en-US"/>
           </a:p>
@@ -1956,7 +1960,7 @@
           <a:p>
             <a:fld id="{D947278E-8722-4541-9ED3-F8DEF2984678}" type="datetimeFigureOut">
               <a:rPr lang="en-US" smtClean="0"/>
-              <a:t>13-Dec-23</a:t>
+              <a:t>15-Dec-23</a:t>
             </a:fld>
             <a:endParaRPr lang="en-US"/>
           </a:p>
@@ -2069,7 +2073,7 @@
           <a:p>
             <a:fld id="{D947278E-8722-4541-9ED3-F8DEF2984678}" type="datetimeFigureOut">
               <a:rPr lang="en-US" smtClean="0"/>
-              <a:t>13-Dec-23</a:t>
+              <a:t>15-Dec-23</a:t>
             </a:fld>
             <a:endParaRPr lang="en-US"/>
           </a:p>
@@ -2380,7 +2384,7 @@
           <a:p>
             <a:fld id="{D947278E-8722-4541-9ED3-F8DEF2984678}" type="datetimeFigureOut">
               <a:rPr lang="en-US" smtClean="0"/>
-              <a:t>13-Dec-23</a:t>
+              <a:t>15-Dec-23</a:t>
             </a:fld>
             <a:endParaRPr lang="en-US"/>
           </a:p>
@@ -2668,7 +2672,7 @@
           <a:p>
             <a:fld id="{D947278E-8722-4541-9ED3-F8DEF2984678}" type="datetimeFigureOut">
               <a:rPr lang="en-US" smtClean="0"/>
-              <a:t>13-Dec-23</a:t>
+              <a:t>15-Dec-23</a:t>
             </a:fld>
             <a:endParaRPr lang="en-US"/>
           </a:p>
@@ -2909,7 +2913,7 @@
           <a:p>
             <a:fld id="{D947278E-8722-4541-9ED3-F8DEF2984678}" type="datetimeFigureOut">
               <a:rPr lang="en-US" smtClean="0"/>
-              <a:t>13-Dec-23</a:t>
+              <a:t>15-Dec-23</a:t>
             </a:fld>
             <a:endParaRPr lang="en-US"/>
           </a:p>
@@ -7010,6 +7014,4689 @@
 </p:sld>
 </file>
 
+<file path=ppt/slides/slide2.xml><?xml version="1.0" encoding="utf-8"?>
+<p:sld xmlns:a="http://schemas.openxmlformats.org/drawingml/2006/main" xmlns:r="http://schemas.openxmlformats.org/officeDocument/2006/relationships" xmlns:p="http://schemas.openxmlformats.org/presentationml/2006/main">
+  <p:cSld>
+    <p:spTree>
+      <p:nvGrpSpPr>
+        <p:cNvPr id="1" name=""/>
+        <p:cNvGrpSpPr/>
+        <p:nvPr/>
+      </p:nvGrpSpPr>
+      <p:grpSpPr>
+        <a:xfrm>
+          <a:off x="0" y="0"/>
+          <a:ext cx="0" cy="0"/>
+          <a:chOff x="0" y="0"/>
+          <a:chExt cx="0" cy="0"/>
+        </a:xfrm>
+      </p:grpSpPr>
+      <p:grpSp>
+        <p:nvGrpSpPr>
+          <p:cNvPr id="15" name="Group 14">
+            <a:extLst>
+              <a:ext uri="{FF2B5EF4-FFF2-40B4-BE49-F238E27FC236}">
+                <a16:creationId xmlns:a16="http://schemas.microsoft.com/office/drawing/2014/main" id="{F284C8B7-99EA-BF05-E6E4-5E623AC9A39C}"/>
+              </a:ext>
+            </a:extLst>
+          </p:cNvPr>
+          <p:cNvGrpSpPr/>
+          <p:nvPr/>
+        </p:nvGrpSpPr>
+        <p:grpSpPr>
+          <a:xfrm>
+            <a:off x="880288" y="771000"/>
+            <a:ext cx="10039059" cy="5315998"/>
+            <a:chOff x="294361" y="1077203"/>
+            <a:chExt cx="10039059" cy="5315998"/>
+          </a:xfrm>
+        </p:grpSpPr>
+        <p:sp>
+          <p:nvSpPr>
+            <p:cNvPr id="2" name="Rectangle 1">
+              <a:extLst>
+                <a:ext uri="{FF2B5EF4-FFF2-40B4-BE49-F238E27FC236}">
+                  <a16:creationId xmlns:a16="http://schemas.microsoft.com/office/drawing/2014/main" id="{84E5EDC6-DE44-993A-E34C-75D7DF11809A}"/>
+                </a:ext>
+              </a:extLst>
+            </p:cNvPr>
+            <p:cNvSpPr/>
+            <p:nvPr/>
+          </p:nvSpPr>
+          <p:spPr>
+            <a:xfrm>
+              <a:off x="1278571" y="1369591"/>
+              <a:ext cx="4343400" cy="4341180"/>
+            </a:xfrm>
+            <a:prstGeom prst="rect">
+              <a:avLst/>
+            </a:prstGeom>
+            <a:noFill/>
+            <a:ln w="31750"/>
+          </p:spPr>
+          <p:style>
+            <a:lnRef idx="2">
+              <a:schemeClr val="accent1">
+                <a:shade val="15000"/>
+              </a:schemeClr>
+            </a:lnRef>
+            <a:fillRef idx="1">
+              <a:schemeClr val="accent1"/>
+            </a:fillRef>
+            <a:effectRef idx="0">
+              <a:schemeClr val="accent1"/>
+            </a:effectRef>
+            <a:fontRef idx="minor">
+              <a:schemeClr val="lt1"/>
+            </a:fontRef>
+          </p:style>
+          <p:txBody>
+            <a:bodyPr rtlCol="0" anchor="ctr"/>
+            <a:lstStyle/>
+            <a:p>
+              <a:pPr algn="ctr"/>
+              <a:endParaRPr lang="en-US"/>
+            </a:p>
+          </p:txBody>
+        </p:sp>
+        <p:sp>
+          <p:nvSpPr>
+            <p:cNvPr id="3" name="Rectangle 2">
+              <a:extLst>
+                <a:ext uri="{FF2B5EF4-FFF2-40B4-BE49-F238E27FC236}">
+                  <a16:creationId xmlns:a16="http://schemas.microsoft.com/office/drawing/2014/main" id="{90B5B565-714C-95BE-60DB-B090A50F3A5E}"/>
+                </a:ext>
+              </a:extLst>
+            </p:cNvPr>
+            <p:cNvSpPr/>
+            <p:nvPr/>
+          </p:nvSpPr>
+          <p:spPr>
+            <a:xfrm>
+              <a:off x="5621971" y="1369591"/>
+              <a:ext cx="4343400" cy="4341180"/>
+            </a:xfrm>
+            <a:prstGeom prst="rect">
+              <a:avLst/>
+            </a:prstGeom>
+            <a:noFill/>
+            <a:ln w="31750"/>
+          </p:spPr>
+          <p:style>
+            <a:lnRef idx="2">
+              <a:schemeClr val="accent1">
+                <a:shade val="15000"/>
+              </a:schemeClr>
+            </a:lnRef>
+            <a:fillRef idx="1">
+              <a:schemeClr val="accent1"/>
+            </a:fillRef>
+            <a:effectRef idx="0">
+              <a:schemeClr val="accent1"/>
+            </a:effectRef>
+            <a:fontRef idx="minor">
+              <a:schemeClr val="lt1"/>
+            </a:fontRef>
+          </p:style>
+          <p:txBody>
+            <a:bodyPr rtlCol="0" anchor="ctr"/>
+            <a:lstStyle/>
+            <a:p>
+              <a:pPr algn="ctr"/>
+              <a:endParaRPr lang="en-US"/>
+            </a:p>
+          </p:txBody>
+        </p:sp>
+        <p:sp>
+          <p:nvSpPr>
+            <p:cNvPr id="8" name="TextBox 7">
+              <a:extLst>
+                <a:ext uri="{FF2B5EF4-FFF2-40B4-BE49-F238E27FC236}">
+                  <a16:creationId xmlns:a16="http://schemas.microsoft.com/office/drawing/2014/main" id="{C56ABB66-0E9C-E672-80BE-49E3841A94BB}"/>
+                </a:ext>
+              </a:extLst>
+            </p:cNvPr>
+            <p:cNvSpPr txBox="1"/>
+            <p:nvPr/>
+          </p:nvSpPr>
+          <p:spPr>
+            <a:xfrm>
+              <a:off x="1117309" y="5808426"/>
+              <a:ext cx="322524" cy="584775"/>
+            </a:xfrm>
+            <a:prstGeom prst="rect">
+              <a:avLst/>
+            </a:prstGeom>
+            <a:noFill/>
+          </p:spPr>
+          <p:txBody>
+            <a:bodyPr wrap="none" rtlCol="0">
+              <a:spAutoFit/>
+            </a:bodyPr>
+            <a:lstStyle/>
+            <a:p>
+              <a:r>
+                <a:rPr lang="en-US" sz="3200" dirty="0"/>
+                <a:t>t</a:t>
+              </a:r>
+            </a:p>
+          </p:txBody>
+        </p:sp>
+        <p:sp>
+          <p:nvSpPr>
+            <p:cNvPr id="9" name="TextBox 8">
+              <a:extLst>
+                <a:ext uri="{FF2B5EF4-FFF2-40B4-BE49-F238E27FC236}">
+                  <a16:creationId xmlns:a16="http://schemas.microsoft.com/office/drawing/2014/main" id="{A8D62E97-AC02-F5F8-770D-0A76D99E4D2B}"/>
+                </a:ext>
+              </a:extLst>
+            </p:cNvPr>
+            <p:cNvSpPr txBox="1"/>
+            <p:nvPr/>
+          </p:nvSpPr>
+          <p:spPr>
+            <a:xfrm>
+              <a:off x="5253921" y="5808425"/>
+              <a:ext cx="736099" cy="584775"/>
+            </a:xfrm>
+            <a:prstGeom prst="rect">
+              <a:avLst/>
+            </a:prstGeom>
+            <a:noFill/>
+          </p:spPr>
+          <p:txBody>
+            <a:bodyPr wrap="none" rtlCol="0">
+              <a:spAutoFit/>
+            </a:bodyPr>
+            <a:lstStyle/>
+            <a:p>
+              <a:r>
+                <a:rPr lang="en-US" sz="3200" dirty="0"/>
+                <a:t>t+1</a:t>
+              </a:r>
+            </a:p>
+          </p:txBody>
+        </p:sp>
+        <p:sp>
+          <p:nvSpPr>
+            <p:cNvPr id="10" name="TextBox 9">
+              <a:extLst>
+                <a:ext uri="{FF2B5EF4-FFF2-40B4-BE49-F238E27FC236}">
+                  <a16:creationId xmlns:a16="http://schemas.microsoft.com/office/drawing/2014/main" id="{4242D461-3683-9129-CFBE-33E62BB592C6}"/>
+                </a:ext>
+              </a:extLst>
+            </p:cNvPr>
+            <p:cNvSpPr txBox="1"/>
+            <p:nvPr/>
+          </p:nvSpPr>
+          <p:spPr>
+            <a:xfrm>
+              <a:off x="9597321" y="5808424"/>
+              <a:ext cx="736099" cy="584775"/>
+            </a:xfrm>
+            <a:prstGeom prst="rect">
+              <a:avLst/>
+            </a:prstGeom>
+            <a:noFill/>
+          </p:spPr>
+          <p:txBody>
+            <a:bodyPr wrap="none" rtlCol="0">
+              <a:spAutoFit/>
+            </a:bodyPr>
+            <a:lstStyle/>
+            <a:p>
+              <a:r>
+                <a:rPr lang="en-US" sz="3200" dirty="0"/>
+                <a:t>t+2</a:t>
+              </a:r>
+            </a:p>
+          </p:txBody>
+        </p:sp>
+        <p:sp>
+          <p:nvSpPr>
+            <p:cNvPr id="11" name="TextBox 10">
+              <a:extLst>
+                <a:ext uri="{FF2B5EF4-FFF2-40B4-BE49-F238E27FC236}">
+                  <a16:creationId xmlns:a16="http://schemas.microsoft.com/office/drawing/2014/main" id="{26B99A1B-A91B-6678-A2AB-A4B9A8775587}"/>
+                </a:ext>
+              </a:extLst>
+            </p:cNvPr>
+            <p:cNvSpPr txBox="1"/>
+            <p:nvPr/>
+          </p:nvSpPr>
+          <p:spPr>
+            <a:xfrm>
+              <a:off x="501149" y="5312756"/>
+              <a:ext cx="362600" cy="584775"/>
+            </a:xfrm>
+            <a:prstGeom prst="rect">
+              <a:avLst/>
+            </a:prstGeom>
+            <a:noFill/>
+          </p:spPr>
+          <p:txBody>
+            <a:bodyPr wrap="none" rtlCol="0">
+              <a:spAutoFit/>
+            </a:bodyPr>
+            <a:lstStyle/>
+            <a:p>
+              <a:r>
+                <a:rPr lang="en-US" sz="3200" dirty="0"/>
+                <a:t>x</a:t>
+              </a:r>
+            </a:p>
+          </p:txBody>
+        </p:sp>
+        <p:sp>
+          <p:nvSpPr>
+            <p:cNvPr id="12" name="TextBox 11">
+              <a:extLst>
+                <a:ext uri="{FF2B5EF4-FFF2-40B4-BE49-F238E27FC236}">
+                  <a16:creationId xmlns:a16="http://schemas.microsoft.com/office/drawing/2014/main" id="{4042CA89-8018-999F-59A2-314BDD20F4F5}"/>
+                </a:ext>
+              </a:extLst>
+            </p:cNvPr>
+            <p:cNvSpPr txBox="1"/>
+            <p:nvPr/>
+          </p:nvSpPr>
+          <p:spPr>
+            <a:xfrm>
+              <a:off x="294361" y="1077203"/>
+              <a:ext cx="776175" cy="584775"/>
+            </a:xfrm>
+            <a:prstGeom prst="rect">
+              <a:avLst/>
+            </a:prstGeom>
+            <a:noFill/>
+          </p:spPr>
+          <p:txBody>
+            <a:bodyPr wrap="none" rtlCol="0">
+              <a:spAutoFit/>
+            </a:bodyPr>
+            <a:lstStyle/>
+            <a:p>
+              <a:r>
+                <a:rPr lang="en-US" sz="3200" dirty="0"/>
+                <a:t>x+1</a:t>
+              </a:r>
+            </a:p>
+          </p:txBody>
+        </p:sp>
+      </p:grpSp>
+      <p:sp>
+        <p:nvSpPr>
+          <p:cNvPr id="13" name="TextBox 12">
+            <a:extLst>
+              <a:ext uri="{FF2B5EF4-FFF2-40B4-BE49-F238E27FC236}">
+                <a16:creationId xmlns:a16="http://schemas.microsoft.com/office/drawing/2014/main" id="{7D1C5FE5-D000-22DF-D29D-C60F72CE91F2}"/>
+              </a:ext>
+            </a:extLst>
+          </p:cNvPr>
+          <p:cNvSpPr txBox="1"/>
+          <p:nvPr/>
+        </p:nvSpPr>
+        <p:spPr>
+          <a:xfrm>
+            <a:off x="559881" y="2941590"/>
+            <a:ext cx="889795" cy="584775"/>
+          </a:xfrm>
+          <a:prstGeom prst="rect">
+            <a:avLst/>
+          </a:prstGeom>
+          <a:noFill/>
+        </p:spPr>
+        <p:txBody>
+          <a:bodyPr wrap="none" rtlCol="0">
+            <a:spAutoFit/>
+          </a:bodyPr>
+          <a:lstStyle/>
+          <a:p>
+            <a:r>
+              <a:rPr lang="en-US" sz="3200" b="1" dirty="0"/>
+              <a:t>AGE</a:t>
+            </a:r>
+          </a:p>
+        </p:txBody>
+      </p:sp>
+      <p:sp>
+        <p:nvSpPr>
+          <p:cNvPr id="14" name="TextBox 13">
+            <a:extLst>
+              <a:ext uri="{FF2B5EF4-FFF2-40B4-BE49-F238E27FC236}">
+                <a16:creationId xmlns:a16="http://schemas.microsoft.com/office/drawing/2014/main" id="{8B77634A-6B60-0039-E887-856B7FE0B3B7}"/>
+              </a:ext>
+            </a:extLst>
+          </p:cNvPr>
+          <p:cNvSpPr txBox="1"/>
+          <p:nvPr/>
+        </p:nvSpPr>
+        <p:spPr>
+          <a:xfrm>
+            <a:off x="5679547" y="6086996"/>
+            <a:ext cx="1056700" cy="584775"/>
+          </a:xfrm>
+          <a:prstGeom prst="rect">
+            <a:avLst/>
+          </a:prstGeom>
+          <a:noFill/>
+        </p:spPr>
+        <p:txBody>
+          <a:bodyPr wrap="none" rtlCol="0">
+            <a:spAutoFit/>
+          </a:bodyPr>
+          <a:lstStyle/>
+          <a:p>
+            <a:r>
+              <a:rPr lang="en-US" sz="3200" b="1" dirty="0"/>
+              <a:t>TIME</a:t>
+            </a:r>
+          </a:p>
+        </p:txBody>
+      </p:sp>
+      <p:sp>
+        <p:nvSpPr>
+          <p:cNvPr id="16" name="TextBox 15">
+            <a:extLst>
+              <a:ext uri="{FF2B5EF4-FFF2-40B4-BE49-F238E27FC236}">
+                <a16:creationId xmlns:a16="http://schemas.microsoft.com/office/drawing/2014/main" id="{22E068ED-829A-7C78-CEB5-AA38FD7B0EDA}"/>
+              </a:ext>
+            </a:extLst>
+          </p:cNvPr>
+          <p:cNvSpPr txBox="1"/>
+          <p:nvPr/>
+        </p:nvSpPr>
+        <p:spPr>
+          <a:xfrm>
+            <a:off x="2523957" y="159400"/>
+            <a:ext cx="3024482" cy="646331"/>
+          </a:xfrm>
+          <a:prstGeom prst="rect">
+            <a:avLst/>
+          </a:prstGeom>
+          <a:noFill/>
+        </p:spPr>
+        <p:txBody>
+          <a:bodyPr wrap="none" rtlCol="0">
+            <a:spAutoFit/>
+          </a:bodyPr>
+          <a:lstStyle/>
+          <a:p>
+            <a:r>
+              <a:rPr lang="en-US" sz="3600" b="1" dirty="0"/>
+              <a:t>AP Square (</a:t>
+            </a:r>
+            <a:r>
+              <a:rPr lang="en-US" sz="3600" b="1" dirty="0" err="1"/>
+              <a:t>x,t</a:t>
+            </a:r>
+            <a:r>
+              <a:rPr lang="en-US" sz="3600" b="1" dirty="0"/>
+              <a:t>)</a:t>
+            </a:r>
+          </a:p>
+        </p:txBody>
+      </p:sp>
+      <p:sp>
+        <p:nvSpPr>
+          <p:cNvPr id="17" name="TextBox 16">
+            <a:extLst>
+              <a:ext uri="{FF2B5EF4-FFF2-40B4-BE49-F238E27FC236}">
+                <a16:creationId xmlns:a16="http://schemas.microsoft.com/office/drawing/2014/main" id="{B027CA12-8E98-FB43-61B8-B6DADED80B58}"/>
+              </a:ext>
+            </a:extLst>
+          </p:cNvPr>
+          <p:cNvSpPr txBox="1"/>
+          <p:nvPr/>
+        </p:nvSpPr>
+        <p:spPr>
+          <a:xfrm>
+            <a:off x="6635723" y="159400"/>
+            <a:ext cx="3487750" cy="646331"/>
+          </a:xfrm>
+          <a:prstGeom prst="rect">
+            <a:avLst/>
+          </a:prstGeom>
+          <a:noFill/>
+        </p:spPr>
+        <p:txBody>
+          <a:bodyPr wrap="none" rtlCol="0">
+            <a:spAutoFit/>
+          </a:bodyPr>
+          <a:lstStyle/>
+          <a:p>
+            <a:r>
+              <a:rPr lang="en-US" sz="3600" b="1" dirty="0"/>
+              <a:t>AP Square (x,t+1)</a:t>
+            </a:r>
+          </a:p>
+        </p:txBody>
+      </p:sp>
+      <p:sp>
+        <p:nvSpPr>
+          <p:cNvPr id="22" name="Parallelogram 21">
+            <a:extLst>
+              <a:ext uri="{FF2B5EF4-FFF2-40B4-BE49-F238E27FC236}">
+                <a16:creationId xmlns:a16="http://schemas.microsoft.com/office/drawing/2014/main" id="{44DC624F-96FD-3569-C8F9-E0D0748D6F53}"/>
+              </a:ext>
+            </a:extLst>
+          </p:cNvPr>
+          <p:cNvSpPr/>
+          <p:nvPr/>
+        </p:nvSpPr>
+        <p:spPr>
+          <a:xfrm>
+            <a:off x="1864498" y="1063387"/>
+            <a:ext cx="8686800" cy="4341181"/>
+          </a:xfrm>
+          <a:prstGeom prst="parallelogram">
+            <a:avLst>
+              <a:gd name="adj" fmla="val 99438"/>
+            </a:avLst>
+          </a:prstGeom>
+          <a:solidFill>
+            <a:schemeClr val="accent1">
+              <a:alpha val="50000"/>
+            </a:schemeClr>
+          </a:solidFill>
+        </p:spPr>
+        <p:style>
+          <a:lnRef idx="2">
+            <a:schemeClr val="accent1">
+              <a:shade val="15000"/>
+            </a:schemeClr>
+          </a:lnRef>
+          <a:fillRef idx="1">
+            <a:schemeClr val="accent1"/>
+          </a:fillRef>
+          <a:effectRef idx="0">
+            <a:schemeClr val="accent1"/>
+          </a:effectRef>
+          <a:fontRef idx="minor">
+            <a:schemeClr val="lt1"/>
+          </a:fontRef>
+        </p:style>
+        <p:txBody>
+          <a:bodyPr rtlCol="0" anchor="ctr"/>
+          <a:lstStyle/>
+          <a:p>
+            <a:pPr algn="ctr"/>
+            <a:r>
+              <a:rPr lang="en-US" dirty="0"/>
+              <a:t>L</a:t>
+            </a:r>
+          </a:p>
+        </p:txBody>
+      </p:sp>
+      <p:sp>
+        <p:nvSpPr>
+          <p:cNvPr id="23" name="TextBox 22">
+            <a:extLst>
+              <a:ext uri="{FF2B5EF4-FFF2-40B4-BE49-F238E27FC236}">
+                <a16:creationId xmlns:a16="http://schemas.microsoft.com/office/drawing/2014/main" id="{562A6581-7E98-0D43-A7AE-776DCE6BD9E3}"/>
+              </a:ext>
+            </a:extLst>
+          </p:cNvPr>
+          <p:cNvSpPr txBox="1"/>
+          <p:nvPr/>
+        </p:nvSpPr>
+        <p:spPr>
+          <a:xfrm>
+            <a:off x="4110361" y="3755254"/>
+            <a:ext cx="1155509" cy="830997"/>
+          </a:xfrm>
+          <a:prstGeom prst="rect">
+            <a:avLst/>
+          </a:prstGeom>
+          <a:noFill/>
+        </p:spPr>
+        <p:txBody>
+          <a:bodyPr wrap="none" rtlCol="0">
+            <a:spAutoFit/>
+          </a:bodyPr>
+          <a:lstStyle/>
+          <a:p>
+            <a:r>
+              <a:rPr lang="en-US" sz="4800" dirty="0" err="1"/>
+              <a:t>L</a:t>
+            </a:r>
+            <a:r>
+              <a:rPr lang="en-US" sz="4800" baseline="-25000" dirty="0" err="1"/>
+              <a:t>x,t</a:t>
+            </a:r>
+            <a:r>
+              <a:rPr lang="en-US" sz="4800" baseline="-25000" dirty="0"/>
+              <a:t>-x</a:t>
+            </a:r>
+            <a:endParaRPr lang="en-US" sz="4800" dirty="0"/>
+          </a:p>
+        </p:txBody>
+      </p:sp>
+      <p:sp>
+        <p:nvSpPr>
+          <p:cNvPr id="24" name="TextBox 23">
+            <a:extLst>
+              <a:ext uri="{FF2B5EF4-FFF2-40B4-BE49-F238E27FC236}">
+                <a16:creationId xmlns:a16="http://schemas.microsoft.com/office/drawing/2014/main" id="{EE0D54CE-72B6-EB4F-D269-61ED51D3CB9F}"/>
+              </a:ext>
+            </a:extLst>
+          </p:cNvPr>
+          <p:cNvSpPr txBox="1"/>
+          <p:nvPr/>
+        </p:nvSpPr>
+        <p:spPr>
+          <a:xfrm>
+            <a:off x="6943817" y="2034465"/>
+            <a:ext cx="1291764" cy="830997"/>
+          </a:xfrm>
+          <a:prstGeom prst="rect">
+            <a:avLst/>
+          </a:prstGeom>
+          <a:noFill/>
+        </p:spPr>
+        <p:txBody>
+          <a:bodyPr wrap="none" rtlCol="0">
+            <a:spAutoFit/>
+          </a:bodyPr>
+          <a:lstStyle/>
+          <a:p>
+            <a:r>
+              <a:rPr lang="en-US" sz="4800" dirty="0" err="1"/>
+              <a:t>U</a:t>
+            </a:r>
+            <a:r>
+              <a:rPr lang="en-US" sz="4800" baseline="-25000" dirty="0" err="1"/>
+              <a:t>x,t</a:t>
+            </a:r>
+            <a:r>
+              <a:rPr lang="en-US" sz="4800" baseline="-25000" dirty="0"/>
+              <a:t>-x</a:t>
+            </a:r>
+            <a:endParaRPr lang="en-US" sz="4800" dirty="0"/>
+          </a:p>
+        </p:txBody>
+      </p:sp>
+      <p:sp>
+        <p:nvSpPr>
+          <p:cNvPr id="25" name="TextBox 24">
+            <a:extLst>
+              <a:ext uri="{FF2B5EF4-FFF2-40B4-BE49-F238E27FC236}">
+                <a16:creationId xmlns:a16="http://schemas.microsoft.com/office/drawing/2014/main" id="{74277B72-9248-DB37-AB97-E1DBDA91C8A5}"/>
+              </a:ext>
+            </a:extLst>
+          </p:cNvPr>
+          <p:cNvSpPr txBox="1"/>
+          <p:nvPr/>
+        </p:nvSpPr>
+        <p:spPr>
+          <a:xfrm>
+            <a:off x="2760087" y="4819793"/>
+            <a:ext cx="2965042" cy="584775"/>
+          </a:xfrm>
+          <a:prstGeom prst="rect">
+            <a:avLst/>
+          </a:prstGeom>
+          <a:noFill/>
+        </p:spPr>
+        <p:txBody>
+          <a:bodyPr wrap="none" rtlCol="0">
+            <a:spAutoFit/>
+          </a:bodyPr>
+          <a:lstStyle/>
+          <a:p>
+            <a:r>
+              <a:rPr lang="en-US" sz="3200" b="1" dirty="0">
+                <a:solidFill>
+                  <a:srgbClr val="002060"/>
+                </a:solidFill>
+              </a:rPr>
+              <a:t>Birth Year c = t-x</a:t>
+            </a:r>
+          </a:p>
+        </p:txBody>
+      </p:sp>
+    </p:spTree>
+    <p:extLst>
+      <p:ext uri="{BB962C8B-B14F-4D97-AF65-F5344CB8AC3E}">
+        <p14:creationId xmlns:p14="http://schemas.microsoft.com/office/powerpoint/2010/main" val="2806720841"/>
+      </p:ext>
+    </p:extLst>
+  </p:cSld>
+  <p:clrMapOvr>
+    <a:masterClrMapping/>
+  </p:clrMapOvr>
+</p:sld>
+</file>
+
+<file path=ppt/slides/slide3.xml><?xml version="1.0" encoding="utf-8"?>
+<p:sld xmlns:a="http://schemas.openxmlformats.org/drawingml/2006/main" xmlns:r="http://schemas.openxmlformats.org/officeDocument/2006/relationships" xmlns:p="http://schemas.openxmlformats.org/presentationml/2006/main">
+  <p:cSld>
+    <p:spTree>
+      <p:nvGrpSpPr>
+        <p:cNvPr id="1" name=""/>
+        <p:cNvGrpSpPr/>
+        <p:nvPr/>
+      </p:nvGrpSpPr>
+      <p:grpSpPr>
+        <a:xfrm>
+          <a:off x="0" y="0"/>
+          <a:ext cx="0" cy="0"/>
+          <a:chOff x="0" y="0"/>
+          <a:chExt cx="0" cy="0"/>
+        </a:xfrm>
+      </p:grpSpPr>
+      <p:grpSp>
+        <p:nvGrpSpPr>
+          <p:cNvPr id="80" name="Group 79">
+            <a:extLst>
+              <a:ext uri="{FF2B5EF4-FFF2-40B4-BE49-F238E27FC236}">
+                <a16:creationId xmlns:a16="http://schemas.microsoft.com/office/drawing/2014/main" id="{075DC61E-EF16-08C7-D73E-4D723E9D139A}"/>
+              </a:ext>
+            </a:extLst>
+          </p:cNvPr>
+          <p:cNvGrpSpPr/>
+          <p:nvPr/>
+        </p:nvGrpSpPr>
+        <p:grpSpPr>
+          <a:xfrm>
+            <a:off x="223478" y="601448"/>
+            <a:ext cx="9491003" cy="6256552"/>
+            <a:chOff x="223478" y="601448"/>
+            <a:chExt cx="9491003" cy="6256552"/>
+          </a:xfrm>
+        </p:grpSpPr>
+        <p:grpSp>
+          <p:nvGrpSpPr>
+            <p:cNvPr id="75" name="Group 74">
+              <a:extLst>
+                <a:ext uri="{FF2B5EF4-FFF2-40B4-BE49-F238E27FC236}">
+                  <a16:creationId xmlns:a16="http://schemas.microsoft.com/office/drawing/2014/main" id="{0CDD19BD-50AF-AC97-3AA3-2157B4AF394E}"/>
+                </a:ext>
+              </a:extLst>
+            </p:cNvPr>
+            <p:cNvGrpSpPr/>
+            <p:nvPr/>
+          </p:nvGrpSpPr>
+          <p:grpSpPr>
+            <a:xfrm>
+              <a:off x="223478" y="601448"/>
+              <a:ext cx="9491003" cy="6256552"/>
+              <a:chOff x="223478" y="601448"/>
+              <a:chExt cx="9491003" cy="6256552"/>
+            </a:xfrm>
+          </p:grpSpPr>
+          <p:grpSp>
+            <p:nvGrpSpPr>
+              <p:cNvPr id="67" name="Group 66">
+                <a:extLst>
+                  <a:ext uri="{FF2B5EF4-FFF2-40B4-BE49-F238E27FC236}">
+                    <a16:creationId xmlns:a16="http://schemas.microsoft.com/office/drawing/2014/main" id="{7DEACFFA-1B4E-DEA4-97C6-531638254563}"/>
+                  </a:ext>
+                </a:extLst>
+              </p:cNvPr>
+              <p:cNvGrpSpPr/>
+              <p:nvPr/>
+            </p:nvGrpSpPr>
+            <p:grpSpPr>
+              <a:xfrm>
+                <a:off x="223478" y="832281"/>
+                <a:ext cx="9190281" cy="6025719"/>
+                <a:chOff x="223478" y="832281"/>
+                <a:chExt cx="9190281" cy="6025719"/>
+              </a:xfrm>
+            </p:grpSpPr>
+            <p:grpSp>
+              <p:nvGrpSpPr>
+                <p:cNvPr id="54" name="Group 53">
+                  <a:extLst>
+                    <a:ext uri="{FF2B5EF4-FFF2-40B4-BE49-F238E27FC236}">
+                      <a16:creationId xmlns:a16="http://schemas.microsoft.com/office/drawing/2014/main" id="{985D6AE0-792A-404A-1CFA-7850647BA561}"/>
+                    </a:ext>
+                  </a:extLst>
+                </p:cNvPr>
+                <p:cNvGrpSpPr/>
+                <p:nvPr/>
+              </p:nvGrpSpPr>
+              <p:grpSpPr>
+                <a:xfrm>
+                  <a:off x="1623602" y="832281"/>
+                  <a:ext cx="7790157" cy="5193438"/>
+                  <a:chOff x="2733501" y="2690181"/>
+                  <a:chExt cx="5486400" cy="3662038"/>
+                </a:xfrm>
+              </p:grpSpPr>
+              <p:grpSp>
+                <p:nvGrpSpPr>
+                  <p:cNvPr id="38" name="Group 37">
+                    <a:extLst>
+                      <a:ext uri="{FF2B5EF4-FFF2-40B4-BE49-F238E27FC236}">
+                        <a16:creationId xmlns:a16="http://schemas.microsoft.com/office/drawing/2014/main" id="{DCEB7AD8-92A8-6393-0069-CFABE0E487A0}"/>
+                      </a:ext>
+                    </a:extLst>
+                  </p:cNvPr>
+                  <p:cNvGrpSpPr/>
+                  <p:nvPr/>
+                </p:nvGrpSpPr>
+                <p:grpSpPr>
+                  <a:xfrm>
+                    <a:off x="2733501" y="4523419"/>
+                    <a:ext cx="5486400" cy="1828800"/>
+                    <a:chOff x="1802167" y="3888419"/>
+                    <a:chExt cx="5486400" cy="1828800"/>
+                  </a:xfrm>
+                </p:grpSpPr>
+                <p:sp>
+                  <p:nvSpPr>
+                    <p:cNvPr id="35" name="Rectangle 34">
+                      <a:extLst>
+                        <a:ext uri="{FF2B5EF4-FFF2-40B4-BE49-F238E27FC236}">
+                          <a16:creationId xmlns:a16="http://schemas.microsoft.com/office/drawing/2014/main" id="{E2E19F8D-8EC5-F148-9F23-518DC54BA446}"/>
+                        </a:ext>
+                      </a:extLst>
+                    </p:cNvPr>
+                    <p:cNvSpPr/>
+                    <p:nvPr/>
+                  </p:nvSpPr>
+                  <p:spPr>
+                    <a:xfrm>
+                      <a:off x="1802167" y="3888419"/>
+                      <a:ext cx="1828800" cy="1828800"/>
+                    </a:xfrm>
+                    <a:prstGeom prst="rect">
+                      <a:avLst/>
+                    </a:prstGeom>
+                    <a:noFill/>
+                    <a:ln w="50800"/>
+                  </p:spPr>
+                  <p:style>
+                    <a:lnRef idx="2">
+                      <a:schemeClr val="accent1">
+                        <a:shade val="15000"/>
+                      </a:schemeClr>
+                    </a:lnRef>
+                    <a:fillRef idx="1">
+                      <a:schemeClr val="accent1"/>
+                    </a:fillRef>
+                    <a:effectRef idx="0">
+                      <a:schemeClr val="accent1"/>
+                    </a:effectRef>
+                    <a:fontRef idx="minor">
+                      <a:schemeClr val="lt1"/>
+                    </a:fontRef>
+                  </p:style>
+                  <p:txBody>
+                    <a:bodyPr rtlCol="0" anchor="ctr"/>
+                    <a:lstStyle/>
+                    <a:p>
+                      <a:pPr algn="ctr"/>
+                      <a:endParaRPr lang="en-US"/>
+                    </a:p>
+                  </p:txBody>
+                </p:sp>
+                <p:sp>
+                  <p:nvSpPr>
+                    <p:cNvPr id="36" name="Rectangle 35">
+                      <a:extLst>
+                        <a:ext uri="{FF2B5EF4-FFF2-40B4-BE49-F238E27FC236}">
+                          <a16:creationId xmlns:a16="http://schemas.microsoft.com/office/drawing/2014/main" id="{CE5D3CEB-A5BF-FA6C-D53F-E588954BD4CC}"/>
+                        </a:ext>
+                      </a:extLst>
+                    </p:cNvPr>
+                    <p:cNvSpPr/>
+                    <p:nvPr/>
+                  </p:nvSpPr>
+                  <p:spPr>
+                    <a:xfrm>
+                      <a:off x="3630967" y="3888419"/>
+                      <a:ext cx="1828800" cy="1828800"/>
+                    </a:xfrm>
+                    <a:prstGeom prst="rect">
+                      <a:avLst/>
+                    </a:prstGeom>
+                    <a:noFill/>
+                    <a:ln w="50800"/>
+                  </p:spPr>
+                  <p:style>
+                    <a:lnRef idx="2">
+                      <a:schemeClr val="accent1">
+                        <a:shade val="15000"/>
+                      </a:schemeClr>
+                    </a:lnRef>
+                    <a:fillRef idx="1">
+                      <a:schemeClr val="accent1"/>
+                    </a:fillRef>
+                    <a:effectRef idx="0">
+                      <a:schemeClr val="accent1"/>
+                    </a:effectRef>
+                    <a:fontRef idx="minor">
+                      <a:schemeClr val="lt1"/>
+                    </a:fontRef>
+                  </p:style>
+                  <p:txBody>
+                    <a:bodyPr rtlCol="0" anchor="ctr"/>
+                    <a:lstStyle/>
+                    <a:p>
+                      <a:pPr algn="ctr"/>
+                      <a:endParaRPr lang="en-US"/>
+                    </a:p>
+                  </p:txBody>
+                </p:sp>
+                <p:sp>
+                  <p:nvSpPr>
+                    <p:cNvPr id="37" name="Rectangle 36">
+                      <a:extLst>
+                        <a:ext uri="{FF2B5EF4-FFF2-40B4-BE49-F238E27FC236}">
+                          <a16:creationId xmlns:a16="http://schemas.microsoft.com/office/drawing/2014/main" id="{F74D9692-A8E6-1DCA-006C-14164A7928E1}"/>
+                        </a:ext>
+                      </a:extLst>
+                    </p:cNvPr>
+                    <p:cNvSpPr/>
+                    <p:nvPr/>
+                  </p:nvSpPr>
+                  <p:spPr>
+                    <a:xfrm>
+                      <a:off x="5459767" y="3888419"/>
+                      <a:ext cx="1828800" cy="1828800"/>
+                    </a:xfrm>
+                    <a:prstGeom prst="rect">
+                      <a:avLst/>
+                    </a:prstGeom>
+                    <a:noFill/>
+                    <a:ln w="50800"/>
+                  </p:spPr>
+                  <p:style>
+                    <a:lnRef idx="2">
+                      <a:schemeClr val="accent1">
+                        <a:shade val="15000"/>
+                      </a:schemeClr>
+                    </a:lnRef>
+                    <a:fillRef idx="1">
+                      <a:schemeClr val="accent1"/>
+                    </a:fillRef>
+                    <a:effectRef idx="0">
+                      <a:schemeClr val="accent1"/>
+                    </a:effectRef>
+                    <a:fontRef idx="minor">
+                      <a:schemeClr val="lt1"/>
+                    </a:fontRef>
+                  </p:style>
+                  <p:txBody>
+                    <a:bodyPr rtlCol="0" anchor="ctr"/>
+                    <a:lstStyle/>
+                    <a:p>
+                      <a:pPr algn="ctr"/>
+                      <a:endParaRPr lang="en-US"/>
+                    </a:p>
+                  </p:txBody>
+                </p:sp>
+              </p:grpSp>
+              <p:grpSp>
+                <p:nvGrpSpPr>
+                  <p:cNvPr id="39" name="Group 38">
+                    <a:extLst>
+                      <a:ext uri="{FF2B5EF4-FFF2-40B4-BE49-F238E27FC236}">
+                        <a16:creationId xmlns:a16="http://schemas.microsoft.com/office/drawing/2014/main" id="{8AD6A607-6777-469D-DFD5-C15CE064F993}"/>
+                      </a:ext>
+                    </a:extLst>
+                  </p:cNvPr>
+                  <p:cNvGrpSpPr/>
+                  <p:nvPr/>
+                </p:nvGrpSpPr>
+                <p:grpSpPr>
+                  <a:xfrm>
+                    <a:off x="2733501" y="2690181"/>
+                    <a:ext cx="5486400" cy="1828800"/>
+                    <a:chOff x="1802167" y="3888419"/>
+                    <a:chExt cx="5486400" cy="1828800"/>
+                  </a:xfrm>
+                </p:grpSpPr>
+                <p:sp>
+                  <p:nvSpPr>
+                    <p:cNvPr id="40" name="Rectangle 39">
+                      <a:extLst>
+                        <a:ext uri="{FF2B5EF4-FFF2-40B4-BE49-F238E27FC236}">
+                          <a16:creationId xmlns:a16="http://schemas.microsoft.com/office/drawing/2014/main" id="{5CA31944-0BA3-2599-1D8F-4CACCBE03620}"/>
+                        </a:ext>
+                      </a:extLst>
+                    </p:cNvPr>
+                    <p:cNvSpPr/>
+                    <p:nvPr/>
+                  </p:nvSpPr>
+                  <p:spPr>
+                    <a:xfrm>
+                      <a:off x="1802167" y="3888419"/>
+                      <a:ext cx="1828800" cy="1828800"/>
+                    </a:xfrm>
+                    <a:prstGeom prst="rect">
+                      <a:avLst/>
+                    </a:prstGeom>
+                    <a:noFill/>
+                    <a:ln w="50800"/>
+                  </p:spPr>
+                  <p:style>
+                    <a:lnRef idx="2">
+                      <a:schemeClr val="accent1">
+                        <a:shade val="15000"/>
+                      </a:schemeClr>
+                    </a:lnRef>
+                    <a:fillRef idx="1">
+                      <a:schemeClr val="accent1"/>
+                    </a:fillRef>
+                    <a:effectRef idx="0">
+                      <a:schemeClr val="accent1"/>
+                    </a:effectRef>
+                    <a:fontRef idx="minor">
+                      <a:schemeClr val="lt1"/>
+                    </a:fontRef>
+                  </p:style>
+                  <p:txBody>
+                    <a:bodyPr rtlCol="0" anchor="ctr"/>
+                    <a:lstStyle/>
+                    <a:p>
+                      <a:pPr algn="ctr"/>
+                      <a:endParaRPr lang="en-US"/>
+                    </a:p>
+                  </p:txBody>
+                </p:sp>
+                <p:sp>
+                  <p:nvSpPr>
+                    <p:cNvPr id="41" name="Rectangle 40">
+                      <a:extLst>
+                        <a:ext uri="{FF2B5EF4-FFF2-40B4-BE49-F238E27FC236}">
+                          <a16:creationId xmlns:a16="http://schemas.microsoft.com/office/drawing/2014/main" id="{F85EEF61-7B48-8D81-FE82-24014D8D3E37}"/>
+                        </a:ext>
+                      </a:extLst>
+                    </p:cNvPr>
+                    <p:cNvSpPr/>
+                    <p:nvPr/>
+                  </p:nvSpPr>
+                  <p:spPr>
+                    <a:xfrm>
+                      <a:off x="3630967" y="3888419"/>
+                      <a:ext cx="1828800" cy="1828800"/>
+                    </a:xfrm>
+                    <a:prstGeom prst="rect">
+                      <a:avLst/>
+                    </a:prstGeom>
+                    <a:noFill/>
+                    <a:ln w="50800"/>
+                  </p:spPr>
+                  <p:style>
+                    <a:lnRef idx="2">
+                      <a:schemeClr val="accent1">
+                        <a:shade val="15000"/>
+                      </a:schemeClr>
+                    </a:lnRef>
+                    <a:fillRef idx="1">
+                      <a:schemeClr val="accent1"/>
+                    </a:fillRef>
+                    <a:effectRef idx="0">
+                      <a:schemeClr val="accent1"/>
+                    </a:effectRef>
+                    <a:fontRef idx="minor">
+                      <a:schemeClr val="lt1"/>
+                    </a:fontRef>
+                  </p:style>
+                  <p:txBody>
+                    <a:bodyPr rtlCol="0" anchor="ctr"/>
+                    <a:lstStyle/>
+                    <a:p>
+                      <a:pPr algn="ctr"/>
+                      <a:endParaRPr lang="en-US"/>
+                    </a:p>
+                  </p:txBody>
+                </p:sp>
+                <p:sp>
+                  <p:nvSpPr>
+                    <p:cNvPr id="42" name="Rectangle 41">
+                      <a:extLst>
+                        <a:ext uri="{FF2B5EF4-FFF2-40B4-BE49-F238E27FC236}">
+                          <a16:creationId xmlns:a16="http://schemas.microsoft.com/office/drawing/2014/main" id="{02EABAD6-3CB4-0358-4C3A-E51B2CB6474B}"/>
+                        </a:ext>
+                      </a:extLst>
+                    </p:cNvPr>
+                    <p:cNvSpPr/>
+                    <p:nvPr/>
+                  </p:nvSpPr>
+                  <p:spPr>
+                    <a:xfrm>
+                      <a:off x="5459767" y="3888419"/>
+                      <a:ext cx="1828800" cy="1828800"/>
+                    </a:xfrm>
+                    <a:prstGeom prst="rect">
+                      <a:avLst/>
+                    </a:prstGeom>
+                    <a:noFill/>
+                    <a:ln w="50800"/>
+                  </p:spPr>
+                  <p:style>
+                    <a:lnRef idx="2">
+                      <a:schemeClr val="accent1">
+                        <a:shade val="15000"/>
+                      </a:schemeClr>
+                    </a:lnRef>
+                    <a:fillRef idx="1">
+                      <a:schemeClr val="accent1"/>
+                    </a:fillRef>
+                    <a:effectRef idx="0">
+                      <a:schemeClr val="accent1"/>
+                    </a:effectRef>
+                    <a:fontRef idx="minor">
+                      <a:schemeClr val="lt1"/>
+                    </a:fontRef>
+                  </p:style>
+                  <p:txBody>
+                    <a:bodyPr rtlCol="0" anchor="ctr"/>
+                    <a:lstStyle/>
+                    <a:p>
+                      <a:pPr algn="ctr"/>
+                      <a:endParaRPr lang="en-US"/>
+                    </a:p>
+                  </p:txBody>
+                </p:sp>
+              </p:grpSp>
+            </p:grpSp>
+            <p:sp>
+              <p:nvSpPr>
+                <p:cNvPr id="55" name="Parallelogram 54">
+                  <a:extLst>
+                    <a:ext uri="{FF2B5EF4-FFF2-40B4-BE49-F238E27FC236}">
+                      <a16:creationId xmlns:a16="http://schemas.microsoft.com/office/drawing/2014/main" id="{BBE57817-9FF4-7F9C-2B21-AD649660E8DA}"/>
+                    </a:ext>
+                  </a:extLst>
+                </p:cNvPr>
+                <p:cNvSpPr/>
+                <p:nvPr/>
+              </p:nvSpPr>
+              <p:spPr>
+                <a:xfrm>
+                  <a:off x="1623603" y="3425853"/>
+                  <a:ext cx="5193438" cy="2599866"/>
+                </a:xfrm>
+                <a:prstGeom prst="parallelogram">
+                  <a:avLst>
+                    <a:gd name="adj" fmla="val 100372"/>
+                  </a:avLst>
+                </a:prstGeom>
+                <a:solidFill>
+                  <a:schemeClr val="accent1">
+                    <a:alpha val="50000"/>
+                  </a:schemeClr>
+                </a:solidFill>
+              </p:spPr>
+              <p:style>
+                <a:lnRef idx="2">
+                  <a:schemeClr val="accent1">
+                    <a:shade val="15000"/>
+                  </a:schemeClr>
+                </a:lnRef>
+                <a:fillRef idx="1">
+                  <a:schemeClr val="accent1"/>
+                </a:fillRef>
+                <a:effectRef idx="0">
+                  <a:schemeClr val="accent1"/>
+                </a:effectRef>
+                <a:fontRef idx="minor">
+                  <a:schemeClr val="lt1"/>
+                </a:fontRef>
+              </p:style>
+              <p:txBody>
+                <a:bodyPr rtlCol="0" anchor="ctr"/>
+                <a:lstStyle/>
+                <a:p>
+                  <a:pPr algn="ctr"/>
+                  <a:endParaRPr lang="en-US"/>
+                </a:p>
+              </p:txBody>
+            </p:sp>
+            <p:sp>
+              <p:nvSpPr>
+                <p:cNvPr id="57" name="TextBox 56">
+                  <a:extLst>
+                    <a:ext uri="{FF2B5EF4-FFF2-40B4-BE49-F238E27FC236}">
+                      <a16:creationId xmlns:a16="http://schemas.microsoft.com/office/drawing/2014/main" id="{EC4A7C77-DF82-5073-9654-A0CC8FB013CC}"/>
+                    </a:ext>
+                  </a:extLst>
+                </p:cNvPr>
+                <p:cNvSpPr txBox="1"/>
+                <p:nvPr/>
+              </p:nvSpPr>
+              <p:spPr>
+                <a:xfrm rot="16200000">
+                  <a:off x="70968" y="3150138"/>
+                  <a:ext cx="889795" cy="584775"/>
+                </a:xfrm>
+                <a:prstGeom prst="rect">
+                  <a:avLst/>
+                </a:prstGeom>
+                <a:noFill/>
+              </p:spPr>
+              <p:txBody>
+                <a:bodyPr wrap="none" rtlCol="0">
+                  <a:spAutoFit/>
+                </a:bodyPr>
+                <a:lstStyle/>
+                <a:p>
+                  <a:r>
+                    <a:rPr lang="en-US" sz="3200" b="1" dirty="0"/>
+                    <a:t>AGE</a:t>
+                  </a:r>
+                </a:p>
+              </p:txBody>
+            </p:sp>
+            <p:sp>
+              <p:nvSpPr>
+                <p:cNvPr id="58" name="TextBox 57">
+                  <a:extLst>
+                    <a:ext uri="{FF2B5EF4-FFF2-40B4-BE49-F238E27FC236}">
+                      <a16:creationId xmlns:a16="http://schemas.microsoft.com/office/drawing/2014/main" id="{709178DA-8278-0EB3-D739-7AC92BFF79CE}"/>
+                    </a:ext>
+                  </a:extLst>
+                </p:cNvPr>
+                <p:cNvSpPr txBox="1"/>
+                <p:nvPr/>
+              </p:nvSpPr>
+              <p:spPr>
+                <a:xfrm>
+                  <a:off x="4990330" y="6273225"/>
+                  <a:ext cx="1056700" cy="584775"/>
+                </a:xfrm>
+                <a:prstGeom prst="rect">
+                  <a:avLst/>
+                </a:prstGeom>
+                <a:noFill/>
+              </p:spPr>
+              <p:txBody>
+                <a:bodyPr wrap="none" rtlCol="0">
+                  <a:spAutoFit/>
+                </a:bodyPr>
+                <a:lstStyle/>
+                <a:p>
+                  <a:r>
+                    <a:rPr lang="en-US" sz="3200" b="1" dirty="0"/>
+                    <a:t>TIME</a:t>
+                  </a:r>
+                </a:p>
+              </p:txBody>
+            </p:sp>
+            <p:sp>
+              <p:nvSpPr>
+                <p:cNvPr id="59" name="Parallelogram 58">
+                  <a:extLst>
+                    <a:ext uri="{FF2B5EF4-FFF2-40B4-BE49-F238E27FC236}">
+                      <a16:creationId xmlns:a16="http://schemas.microsoft.com/office/drawing/2014/main" id="{4EDCB9CF-D18B-FFF9-FB58-317D3E7DC6E1}"/>
+                    </a:ext>
+                  </a:extLst>
+                </p:cNvPr>
+                <p:cNvSpPr/>
+                <p:nvPr/>
+              </p:nvSpPr>
+              <p:spPr>
+                <a:xfrm>
+                  <a:off x="4220320" y="846291"/>
+                  <a:ext cx="5193438" cy="2599866"/>
+                </a:xfrm>
+                <a:prstGeom prst="parallelogram">
+                  <a:avLst>
+                    <a:gd name="adj" fmla="val 100372"/>
+                  </a:avLst>
+                </a:prstGeom>
+                <a:solidFill>
+                  <a:srgbClr val="92D050">
+                    <a:alpha val="50000"/>
+                  </a:srgbClr>
+                </a:solidFill>
+              </p:spPr>
+              <p:style>
+                <a:lnRef idx="2">
+                  <a:schemeClr val="accent1">
+                    <a:shade val="15000"/>
+                  </a:schemeClr>
+                </a:lnRef>
+                <a:fillRef idx="1">
+                  <a:schemeClr val="accent1"/>
+                </a:fillRef>
+                <a:effectRef idx="0">
+                  <a:schemeClr val="accent1"/>
+                </a:effectRef>
+                <a:fontRef idx="minor">
+                  <a:schemeClr val="lt1"/>
+                </a:fontRef>
+              </p:style>
+              <p:txBody>
+                <a:bodyPr rtlCol="0" anchor="ctr"/>
+                <a:lstStyle/>
+                <a:p>
+                  <a:pPr algn="ctr"/>
+                  <a:endParaRPr lang="en-US"/>
+                </a:p>
+              </p:txBody>
+            </p:sp>
+            <p:sp>
+              <p:nvSpPr>
+                <p:cNvPr id="60" name="TextBox 59">
+                  <a:extLst>
+                    <a:ext uri="{FF2B5EF4-FFF2-40B4-BE49-F238E27FC236}">
+                      <a16:creationId xmlns:a16="http://schemas.microsoft.com/office/drawing/2014/main" id="{50A42DF2-7F04-21C3-A70D-243D39F47B2A}"/>
+                    </a:ext>
+                  </a:extLst>
+                </p:cNvPr>
+                <p:cNvSpPr txBox="1"/>
+                <p:nvPr/>
+              </p:nvSpPr>
+              <p:spPr>
+                <a:xfrm>
+                  <a:off x="1623601" y="846291"/>
+                  <a:ext cx="1010533" cy="461665"/>
+                </a:xfrm>
+                <a:prstGeom prst="rect">
+                  <a:avLst/>
+                </a:prstGeom>
+                <a:noFill/>
+              </p:spPr>
+              <p:txBody>
+                <a:bodyPr wrap="none" rtlCol="0">
+                  <a:spAutoFit/>
+                </a:bodyPr>
+                <a:lstStyle/>
+                <a:p>
+                  <a:r>
+                    <a:rPr lang="en-US" sz="2400" b="1" dirty="0"/>
+                    <a:t>(x+1,t)</a:t>
+                  </a:r>
+                </a:p>
+              </p:txBody>
+            </p:sp>
+            <p:sp>
+              <p:nvSpPr>
+                <p:cNvPr id="61" name="TextBox 60">
+                  <a:extLst>
+                    <a:ext uri="{FF2B5EF4-FFF2-40B4-BE49-F238E27FC236}">
+                      <a16:creationId xmlns:a16="http://schemas.microsoft.com/office/drawing/2014/main" id="{3693D6BF-243C-BF97-9F86-1A2B73D47699}"/>
+                    </a:ext>
+                  </a:extLst>
+                </p:cNvPr>
+                <p:cNvSpPr txBox="1"/>
+                <p:nvPr/>
+              </p:nvSpPr>
+              <p:spPr>
+                <a:xfrm>
+                  <a:off x="4220318" y="846290"/>
+                  <a:ext cx="1319913" cy="461665"/>
+                </a:xfrm>
+                <a:prstGeom prst="rect">
+                  <a:avLst/>
+                </a:prstGeom>
+                <a:noFill/>
+              </p:spPr>
+              <p:txBody>
+                <a:bodyPr wrap="none" rtlCol="0">
+                  <a:spAutoFit/>
+                </a:bodyPr>
+                <a:lstStyle/>
+                <a:p>
+                  <a:r>
+                    <a:rPr lang="en-US" sz="2400" b="1" dirty="0"/>
+                    <a:t>(x+1,t+1)</a:t>
+                  </a:r>
+                </a:p>
+              </p:txBody>
+            </p:sp>
+            <p:sp>
+              <p:nvSpPr>
+                <p:cNvPr id="62" name="TextBox 61">
+                  <a:extLst>
+                    <a:ext uri="{FF2B5EF4-FFF2-40B4-BE49-F238E27FC236}">
+                      <a16:creationId xmlns:a16="http://schemas.microsoft.com/office/drawing/2014/main" id="{0805A988-7343-1997-DF91-A95860046359}"/>
+                    </a:ext>
+                  </a:extLst>
+                </p:cNvPr>
+                <p:cNvSpPr txBox="1"/>
+                <p:nvPr/>
+              </p:nvSpPr>
+              <p:spPr>
+                <a:xfrm>
+                  <a:off x="6817037" y="852585"/>
+                  <a:ext cx="1319913" cy="461665"/>
+                </a:xfrm>
+                <a:prstGeom prst="rect">
+                  <a:avLst/>
+                </a:prstGeom>
+                <a:noFill/>
+              </p:spPr>
+              <p:txBody>
+                <a:bodyPr wrap="none" rtlCol="0">
+                  <a:spAutoFit/>
+                </a:bodyPr>
+                <a:lstStyle/>
+                <a:p>
+                  <a:r>
+                    <a:rPr lang="en-US" sz="2400" b="1" dirty="0"/>
+                    <a:t>(x+1,t+2)</a:t>
+                  </a:r>
+                </a:p>
+              </p:txBody>
+            </p:sp>
+            <p:sp>
+              <p:nvSpPr>
+                <p:cNvPr id="63" name="TextBox 62">
+                  <a:extLst>
+                    <a:ext uri="{FF2B5EF4-FFF2-40B4-BE49-F238E27FC236}">
+                      <a16:creationId xmlns:a16="http://schemas.microsoft.com/office/drawing/2014/main" id="{C28B918A-9452-6C7E-753C-5CE09609A6B7}"/>
+                    </a:ext>
+                  </a:extLst>
+                </p:cNvPr>
+                <p:cNvSpPr txBox="1"/>
+                <p:nvPr/>
+              </p:nvSpPr>
+              <p:spPr>
+                <a:xfrm>
+                  <a:off x="1623601" y="3442527"/>
+                  <a:ext cx="2077877" cy="461665"/>
+                </a:xfrm>
+                <a:prstGeom prst="rect">
+                  <a:avLst/>
+                </a:prstGeom>
+                <a:noFill/>
+              </p:spPr>
+              <p:txBody>
+                <a:bodyPr wrap="none" rtlCol="0">
+                  <a:spAutoFit/>
+                </a:bodyPr>
+                <a:lstStyle/>
+                <a:p>
+                  <a:r>
+                    <a:rPr lang="en-US" sz="2400" b="1" dirty="0"/>
+                    <a:t>AP Square (</a:t>
+                  </a:r>
+                  <a:r>
+                    <a:rPr lang="en-US" sz="2400" b="1" dirty="0" err="1"/>
+                    <a:t>x,t</a:t>
+                  </a:r>
+                  <a:r>
+                    <a:rPr lang="en-US" sz="2400" b="1" dirty="0"/>
+                    <a:t>)</a:t>
+                  </a:r>
+                </a:p>
+              </p:txBody>
+            </p:sp>
+            <p:sp>
+              <p:nvSpPr>
+                <p:cNvPr id="64" name="TextBox 63">
+                  <a:extLst>
+                    <a:ext uri="{FF2B5EF4-FFF2-40B4-BE49-F238E27FC236}">
+                      <a16:creationId xmlns:a16="http://schemas.microsoft.com/office/drawing/2014/main" id="{7585D4EB-0DAA-D011-E79B-97F2D51CD0E3}"/>
+                    </a:ext>
+                  </a:extLst>
+                </p:cNvPr>
+                <p:cNvSpPr txBox="1"/>
+                <p:nvPr/>
+              </p:nvSpPr>
+              <p:spPr>
+                <a:xfrm>
+                  <a:off x="4220318" y="3442526"/>
+                  <a:ext cx="1010533" cy="461665"/>
+                </a:xfrm>
+                <a:prstGeom prst="rect">
+                  <a:avLst/>
+                </a:prstGeom>
+                <a:noFill/>
+              </p:spPr>
+              <p:txBody>
+                <a:bodyPr wrap="none" rtlCol="0">
+                  <a:spAutoFit/>
+                </a:bodyPr>
+                <a:lstStyle/>
+                <a:p>
+                  <a:r>
+                    <a:rPr lang="en-US" sz="2400" b="1" dirty="0"/>
+                    <a:t>(x,t+1)</a:t>
+                  </a:r>
+                </a:p>
+              </p:txBody>
+            </p:sp>
+            <p:sp>
+              <p:nvSpPr>
+                <p:cNvPr id="65" name="TextBox 64">
+                  <a:extLst>
+                    <a:ext uri="{FF2B5EF4-FFF2-40B4-BE49-F238E27FC236}">
+                      <a16:creationId xmlns:a16="http://schemas.microsoft.com/office/drawing/2014/main" id="{0B9C0AF9-D7DF-4287-AE90-1A5952AC9AA1}"/>
+                    </a:ext>
+                  </a:extLst>
+                </p:cNvPr>
+                <p:cNvSpPr txBox="1"/>
+                <p:nvPr/>
+              </p:nvSpPr>
+              <p:spPr>
+                <a:xfrm>
+                  <a:off x="6817037" y="3448821"/>
+                  <a:ext cx="1010533" cy="461665"/>
+                </a:xfrm>
+                <a:prstGeom prst="rect">
+                  <a:avLst/>
+                </a:prstGeom>
+                <a:noFill/>
+              </p:spPr>
+              <p:txBody>
+                <a:bodyPr wrap="none" rtlCol="0">
+                  <a:spAutoFit/>
+                </a:bodyPr>
+                <a:lstStyle/>
+                <a:p>
+                  <a:r>
+                    <a:rPr lang="en-US" sz="2400" b="1" dirty="0"/>
+                    <a:t>(x,t+2)</a:t>
+                  </a:r>
+                </a:p>
+              </p:txBody>
+            </p:sp>
+            <p:sp>
+              <p:nvSpPr>
+                <p:cNvPr id="66" name="TextBox 65">
+                  <a:extLst>
+                    <a:ext uri="{FF2B5EF4-FFF2-40B4-BE49-F238E27FC236}">
+                      <a16:creationId xmlns:a16="http://schemas.microsoft.com/office/drawing/2014/main" id="{14C1F5E6-13B9-46AB-53FD-C41E6857FAD1}"/>
+                    </a:ext>
+                  </a:extLst>
+                </p:cNvPr>
+                <p:cNvSpPr txBox="1"/>
+                <p:nvPr/>
+              </p:nvSpPr>
+              <p:spPr>
+                <a:xfrm>
+                  <a:off x="1888020" y="5580728"/>
+                  <a:ext cx="2267993" cy="461665"/>
+                </a:xfrm>
+                <a:prstGeom prst="rect">
+                  <a:avLst/>
+                </a:prstGeom>
+                <a:noFill/>
+              </p:spPr>
+              <p:txBody>
+                <a:bodyPr wrap="none" rtlCol="0">
+                  <a:spAutoFit/>
+                </a:bodyPr>
+                <a:lstStyle/>
+                <a:p>
+                  <a:r>
+                    <a:rPr lang="en-US" sz="2400" b="1" dirty="0">
+                      <a:solidFill>
+                        <a:srgbClr val="002060"/>
+                      </a:solidFill>
+                    </a:rPr>
+                    <a:t>Birth Year c = t-x</a:t>
+                  </a:r>
+                </a:p>
+              </p:txBody>
+            </p:sp>
+          </p:grpSp>
+          <p:sp>
+            <p:nvSpPr>
+              <p:cNvPr id="68" name="TextBox 67">
+                <a:extLst>
+                  <a:ext uri="{FF2B5EF4-FFF2-40B4-BE49-F238E27FC236}">
+                    <a16:creationId xmlns:a16="http://schemas.microsoft.com/office/drawing/2014/main" id="{30DA8838-8B56-AB61-FF9A-2705EFB2FDF5}"/>
+                  </a:ext>
+                </a:extLst>
+              </p:cNvPr>
+              <p:cNvSpPr txBox="1"/>
+              <p:nvPr/>
+            </p:nvSpPr>
+            <p:spPr>
+              <a:xfrm>
+                <a:off x="821095" y="601448"/>
+                <a:ext cx="635110" cy="461665"/>
+              </a:xfrm>
+              <a:prstGeom prst="rect">
+                <a:avLst/>
+              </a:prstGeom>
+              <a:noFill/>
+            </p:spPr>
+            <p:txBody>
+              <a:bodyPr wrap="none" rtlCol="0">
+                <a:spAutoFit/>
+              </a:bodyPr>
+              <a:lstStyle/>
+              <a:p>
+                <a:r>
+                  <a:rPr lang="en-US" sz="2400" b="1" dirty="0"/>
+                  <a:t>x+2</a:t>
+                </a:r>
+              </a:p>
+            </p:txBody>
+          </p:sp>
+          <p:sp>
+            <p:nvSpPr>
+              <p:cNvPr id="69" name="TextBox 68">
+                <a:extLst>
+                  <a:ext uri="{FF2B5EF4-FFF2-40B4-BE49-F238E27FC236}">
+                    <a16:creationId xmlns:a16="http://schemas.microsoft.com/office/drawing/2014/main" id="{6745F9C7-60E8-8D92-E878-FB30A51D889A}"/>
+                  </a:ext>
+                </a:extLst>
+              </p:cNvPr>
+              <p:cNvSpPr txBox="1"/>
+              <p:nvPr/>
+            </p:nvSpPr>
+            <p:spPr>
+              <a:xfrm>
+                <a:off x="833098" y="3195020"/>
+                <a:ext cx="635110" cy="461665"/>
+              </a:xfrm>
+              <a:prstGeom prst="rect">
+                <a:avLst/>
+              </a:prstGeom>
+              <a:noFill/>
+            </p:spPr>
+            <p:txBody>
+              <a:bodyPr wrap="none" rtlCol="0">
+                <a:spAutoFit/>
+              </a:bodyPr>
+              <a:lstStyle/>
+              <a:p>
+                <a:r>
+                  <a:rPr lang="en-US" sz="2400" b="1" dirty="0"/>
+                  <a:t>x+1</a:t>
+                </a:r>
+              </a:p>
+            </p:txBody>
+          </p:sp>
+          <p:sp>
+            <p:nvSpPr>
+              <p:cNvPr id="70" name="TextBox 69">
+                <a:extLst>
+                  <a:ext uri="{FF2B5EF4-FFF2-40B4-BE49-F238E27FC236}">
+                    <a16:creationId xmlns:a16="http://schemas.microsoft.com/office/drawing/2014/main" id="{D5551724-5FFA-101F-8539-0B94872E967B}"/>
+                  </a:ext>
+                </a:extLst>
+              </p:cNvPr>
+              <p:cNvSpPr txBox="1"/>
+              <p:nvPr/>
+            </p:nvSpPr>
+            <p:spPr>
+              <a:xfrm>
+                <a:off x="987788" y="5811560"/>
+                <a:ext cx="325730" cy="461665"/>
+              </a:xfrm>
+              <a:prstGeom prst="rect">
+                <a:avLst/>
+              </a:prstGeom>
+              <a:noFill/>
+            </p:spPr>
+            <p:txBody>
+              <a:bodyPr wrap="none" rtlCol="0">
+                <a:spAutoFit/>
+              </a:bodyPr>
+              <a:lstStyle/>
+              <a:p>
+                <a:r>
+                  <a:rPr lang="en-US" sz="2400" b="1" dirty="0"/>
+                  <a:t>x</a:t>
+                </a:r>
+              </a:p>
+            </p:txBody>
+          </p:sp>
+          <p:sp>
+            <p:nvSpPr>
+              <p:cNvPr id="71" name="TextBox 70">
+                <a:extLst>
+                  <a:ext uri="{FF2B5EF4-FFF2-40B4-BE49-F238E27FC236}">
+                    <a16:creationId xmlns:a16="http://schemas.microsoft.com/office/drawing/2014/main" id="{CCBAFA0A-55F9-674B-5E48-37A77DEBEC44}"/>
+                  </a:ext>
+                </a:extLst>
+              </p:cNvPr>
+              <p:cNvSpPr txBox="1"/>
+              <p:nvPr/>
+            </p:nvSpPr>
+            <p:spPr>
+              <a:xfrm>
+                <a:off x="3919594" y="6103947"/>
+                <a:ext cx="601447" cy="461665"/>
+              </a:xfrm>
+              <a:prstGeom prst="rect">
+                <a:avLst/>
+              </a:prstGeom>
+              <a:noFill/>
+            </p:spPr>
+            <p:txBody>
+              <a:bodyPr wrap="none" rtlCol="0">
+                <a:spAutoFit/>
+              </a:bodyPr>
+              <a:lstStyle/>
+              <a:p>
+                <a:r>
+                  <a:rPr lang="en-US" sz="2400" b="1" dirty="0"/>
+                  <a:t>t+1</a:t>
+                </a:r>
+              </a:p>
+            </p:txBody>
+          </p:sp>
+          <p:sp>
+            <p:nvSpPr>
+              <p:cNvPr id="72" name="TextBox 71">
+                <a:extLst>
+                  <a:ext uri="{FF2B5EF4-FFF2-40B4-BE49-F238E27FC236}">
+                    <a16:creationId xmlns:a16="http://schemas.microsoft.com/office/drawing/2014/main" id="{490FACC5-D7B3-AF98-7B72-ADDA6971746E}"/>
+                  </a:ext>
+                </a:extLst>
+              </p:cNvPr>
+              <p:cNvSpPr txBox="1"/>
+              <p:nvPr/>
+            </p:nvSpPr>
+            <p:spPr>
+              <a:xfrm>
+                <a:off x="6525670" y="6103947"/>
+                <a:ext cx="601447" cy="461665"/>
+              </a:xfrm>
+              <a:prstGeom prst="rect">
+                <a:avLst/>
+              </a:prstGeom>
+              <a:noFill/>
+            </p:spPr>
+            <p:txBody>
+              <a:bodyPr wrap="none" rtlCol="0">
+                <a:spAutoFit/>
+              </a:bodyPr>
+              <a:lstStyle/>
+              <a:p>
+                <a:r>
+                  <a:rPr lang="en-US" sz="2400" b="1" dirty="0"/>
+                  <a:t>t+2</a:t>
+                </a:r>
+              </a:p>
+            </p:txBody>
+          </p:sp>
+          <p:sp>
+            <p:nvSpPr>
+              <p:cNvPr id="73" name="TextBox 72">
+                <a:extLst>
+                  <a:ext uri="{FF2B5EF4-FFF2-40B4-BE49-F238E27FC236}">
+                    <a16:creationId xmlns:a16="http://schemas.microsoft.com/office/drawing/2014/main" id="{498186B4-8375-CA1E-9451-8279DCD88CA6}"/>
+                  </a:ext>
+                </a:extLst>
+              </p:cNvPr>
+              <p:cNvSpPr txBox="1"/>
+              <p:nvPr/>
+            </p:nvSpPr>
+            <p:spPr>
+              <a:xfrm>
+                <a:off x="9113034" y="6103947"/>
+                <a:ext cx="601447" cy="461665"/>
+              </a:xfrm>
+              <a:prstGeom prst="rect">
+                <a:avLst/>
+              </a:prstGeom>
+              <a:noFill/>
+            </p:spPr>
+            <p:txBody>
+              <a:bodyPr wrap="none" rtlCol="0">
+                <a:spAutoFit/>
+              </a:bodyPr>
+              <a:lstStyle/>
+              <a:p>
+                <a:r>
+                  <a:rPr lang="en-US" sz="2400" b="1" dirty="0"/>
+                  <a:t>t+3</a:t>
+                </a:r>
+              </a:p>
+            </p:txBody>
+          </p:sp>
+          <p:sp>
+            <p:nvSpPr>
+              <p:cNvPr id="74" name="TextBox 73">
+                <a:extLst>
+                  <a:ext uri="{FF2B5EF4-FFF2-40B4-BE49-F238E27FC236}">
+                    <a16:creationId xmlns:a16="http://schemas.microsoft.com/office/drawing/2014/main" id="{3D6DB02A-547A-E6D3-CD63-52D4682B6428}"/>
+                  </a:ext>
+                </a:extLst>
+              </p:cNvPr>
+              <p:cNvSpPr txBox="1"/>
+              <p:nvPr/>
+            </p:nvSpPr>
+            <p:spPr>
+              <a:xfrm>
+                <a:off x="1490739" y="6103946"/>
+                <a:ext cx="292068" cy="461665"/>
+              </a:xfrm>
+              <a:prstGeom prst="rect">
+                <a:avLst/>
+              </a:prstGeom>
+              <a:noFill/>
+            </p:spPr>
+            <p:txBody>
+              <a:bodyPr wrap="none" rtlCol="0">
+                <a:spAutoFit/>
+              </a:bodyPr>
+              <a:lstStyle/>
+              <a:p>
+                <a:r>
+                  <a:rPr lang="en-US" sz="2400" b="1" dirty="0"/>
+                  <a:t>t</a:t>
+                </a:r>
+              </a:p>
+            </p:txBody>
+          </p:sp>
+        </p:grpSp>
+        <p:sp>
+          <p:nvSpPr>
+            <p:cNvPr id="76" name="TextBox 75">
+              <a:extLst>
+                <a:ext uri="{FF2B5EF4-FFF2-40B4-BE49-F238E27FC236}">
+                  <a16:creationId xmlns:a16="http://schemas.microsoft.com/office/drawing/2014/main" id="{7A9C20AA-F70A-0A0C-0F81-DBC06F60CF58}"/>
+                </a:ext>
+              </a:extLst>
+            </p:cNvPr>
+            <p:cNvSpPr txBox="1"/>
+            <p:nvPr/>
+          </p:nvSpPr>
+          <p:spPr>
+            <a:xfrm>
+              <a:off x="3139019" y="4859844"/>
+              <a:ext cx="630942" cy="584775"/>
+            </a:xfrm>
+            <a:prstGeom prst="rect">
+              <a:avLst/>
+            </a:prstGeom>
+            <a:noFill/>
+            <a:ln w="19050">
+              <a:solidFill>
+                <a:schemeClr val="accent1">
+                  <a:shade val="15000"/>
+                </a:schemeClr>
+              </a:solidFill>
+            </a:ln>
+          </p:spPr>
+          <p:txBody>
+            <a:bodyPr wrap="none" rtlCol="0">
+              <a:spAutoFit/>
+            </a:bodyPr>
+            <a:lstStyle/>
+            <a:p>
+              <a:r>
+                <a:rPr lang="en-US" sz="3200" dirty="0" err="1"/>
+                <a:t>L</a:t>
+              </a:r>
+              <a:r>
+                <a:rPr lang="en-US" sz="3200" baseline="-25000" dirty="0" err="1"/>
+                <a:t>x,t</a:t>
+              </a:r>
+              <a:endParaRPr lang="en-US" sz="3200" dirty="0"/>
+            </a:p>
+          </p:txBody>
+        </p:sp>
+        <p:sp>
+          <p:nvSpPr>
+            <p:cNvPr id="77" name="TextBox 76">
+              <a:extLst>
+                <a:ext uri="{FF2B5EF4-FFF2-40B4-BE49-F238E27FC236}">
+                  <a16:creationId xmlns:a16="http://schemas.microsoft.com/office/drawing/2014/main" id="{F8B73E9B-1BE7-64E8-E620-7CDB8F125D58}"/>
+                </a:ext>
+              </a:extLst>
+            </p:cNvPr>
+            <p:cNvSpPr txBox="1"/>
+            <p:nvPr/>
+          </p:nvSpPr>
+          <p:spPr>
+            <a:xfrm>
+              <a:off x="5518680" y="2574911"/>
+              <a:ext cx="1182375" cy="584775"/>
+            </a:xfrm>
+            <a:prstGeom prst="rect">
+              <a:avLst/>
+            </a:prstGeom>
+            <a:noFill/>
+            <a:ln w="19050">
+              <a:solidFill>
+                <a:schemeClr val="accent1">
+                  <a:shade val="15000"/>
+                </a:schemeClr>
+              </a:solidFill>
+            </a:ln>
+          </p:spPr>
+          <p:txBody>
+            <a:bodyPr wrap="none" rtlCol="0">
+              <a:spAutoFit/>
+            </a:bodyPr>
+            <a:lstStyle/>
+            <a:p>
+              <a:r>
+                <a:rPr lang="en-US" sz="3200" dirty="0"/>
+                <a:t>L</a:t>
+              </a:r>
+              <a:r>
+                <a:rPr lang="en-US" sz="3200" baseline="-25000" dirty="0"/>
+                <a:t>x+1,t+1</a:t>
+              </a:r>
+              <a:endParaRPr lang="en-US" sz="3200" dirty="0"/>
+            </a:p>
+          </p:txBody>
+        </p:sp>
+        <p:sp>
+          <p:nvSpPr>
+            <p:cNvPr id="78" name="TextBox 77">
+              <a:extLst>
+                <a:ext uri="{FF2B5EF4-FFF2-40B4-BE49-F238E27FC236}">
+                  <a16:creationId xmlns:a16="http://schemas.microsoft.com/office/drawing/2014/main" id="{43095B57-2132-3B31-FC1D-DE3FFB03EF7F}"/>
+                </a:ext>
+              </a:extLst>
+            </p:cNvPr>
+            <p:cNvSpPr txBox="1"/>
+            <p:nvPr/>
+          </p:nvSpPr>
+          <p:spPr>
+            <a:xfrm>
+              <a:off x="4407523" y="3982419"/>
+              <a:ext cx="996427" cy="584775"/>
+            </a:xfrm>
+            <a:prstGeom prst="rect">
+              <a:avLst/>
+            </a:prstGeom>
+            <a:noFill/>
+            <a:ln w="19050">
+              <a:solidFill>
+                <a:schemeClr val="accent1">
+                  <a:shade val="15000"/>
+                </a:schemeClr>
+              </a:solidFill>
+            </a:ln>
+          </p:spPr>
+          <p:txBody>
+            <a:bodyPr wrap="none" rtlCol="0">
+              <a:spAutoFit/>
+            </a:bodyPr>
+            <a:lstStyle/>
+            <a:p>
+              <a:r>
+                <a:rPr lang="en-US" sz="3200" dirty="0"/>
+                <a:t>U</a:t>
+              </a:r>
+              <a:r>
+                <a:rPr lang="en-US" sz="3200" baseline="-25000" dirty="0"/>
+                <a:t>x,t+1</a:t>
+              </a:r>
+              <a:endParaRPr lang="en-US" sz="3200" dirty="0"/>
+            </a:p>
+          </p:txBody>
+        </p:sp>
+        <p:sp>
+          <p:nvSpPr>
+            <p:cNvPr id="79" name="TextBox 78">
+              <a:extLst>
+                <a:ext uri="{FF2B5EF4-FFF2-40B4-BE49-F238E27FC236}">
+                  <a16:creationId xmlns:a16="http://schemas.microsoft.com/office/drawing/2014/main" id="{E32B5D62-0913-3ECB-44E7-17FA339CFC68}"/>
+                </a:ext>
+              </a:extLst>
+            </p:cNvPr>
+            <p:cNvSpPr txBox="1"/>
+            <p:nvPr/>
+          </p:nvSpPr>
+          <p:spPr>
+            <a:xfrm>
+              <a:off x="6916994" y="1504686"/>
+              <a:ext cx="1272143" cy="584775"/>
+            </a:xfrm>
+            <a:prstGeom prst="rect">
+              <a:avLst/>
+            </a:prstGeom>
+            <a:noFill/>
+            <a:ln w="19050">
+              <a:solidFill>
+                <a:schemeClr val="accent1">
+                  <a:shade val="15000"/>
+                </a:schemeClr>
+              </a:solidFill>
+            </a:ln>
+          </p:spPr>
+          <p:txBody>
+            <a:bodyPr wrap="none" rtlCol="0">
+              <a:spAutoFit/>
+            </a:bodyPr>
+            <a:lstStyle/>
+            <a:p>
+              <a:r>
+                <a:rPr lang="en-US" sz="3200" dirty="0"/>
+                <a:t>U</a:t>
+              </a:r>
+              <a:r>
+                <a:rPr lang="en-US" sz="3200" baseline="-25000" dirty="0"/>
+                <a:t>x+1,t+2</a:t>
+              </a:r>
+              <a:endParaRPr lang="en-US" sz="3200" dirty="0"/>
+            </a:p>
+          </p:txBody>
+        </p:sp>
+      </p:grpSp>
+    </p:spTree>
+    <p:extLst>
+      <p:ext uri="{BB962C8B-B14F-4D97-AF65-F5344CB8AC3E}">
+        <p14:creationId xmlns:p14="http://schemas.microsoft.com/office/powerpoint/2010/main" val="821764839"/>
+      </p:ext>
+    </p:extLst>
+  </p:cSld>
+  <p:clrMapOvr>
+    <a:masterClrMapping/>
+  </p:clrMapOvr>
+</p:sld>
+</file>
+
+<file path=ppt/slides/slide4.xml><?xml version="1.0" encoding="utf-8"?>
+<p:sld xmlns:a="http://schemas.openxmlformats.org/drawingml/2006/main" xmlns:r="http://schemas.openxmlformats.org/officeDocument/2006/relationships" xmlns:p="http://schemas.openxmlformats.org/presentationml/2006/main">
+  <p:cSld>
+    <p:spTree>
+      <p:nvGrpSpPr>
+        <p:cNvPr id="1" name=""/>
+        <p:cNvGrpSpPr/>
+        <p:nvPr/>
+      </p:nvGrpSpPr>
+      <p:grpSpPr>
+        <a:xfrm>
+          <a:off x="0" y="0"/>
+          <a:ext cx="0" cy="0"/>
+          <a:chOff x="0" y="0"/>
+          <a:chExt cx="0" cy="0"/>
+        </a:xfrm>
+      </p:grpSpPr>
+      <p:grpSp>
+        <p:nvGrpSpPr>
+          <p:cNvPr id="67" name="Group 66">
+            <a:extLst>
+              <a:ext uri="{FF2B5EF4-FFF2-40B4-BE49-F238E27FC236}">
+                <a16:creationId xmlns:a16="http://schemas.microsoft.com/office/drawing/2014/main" id="{7DEACFFA-1B4E-DEA4-97C6-531638254563}"/>
+              </a:ext>
+            </a:extLst>
+          </p:cNvPr>
+          <p:cNvGrpSpPr/>
+          <p:nvPr/>
+        </p:nvGrpSpPr>
+        <p:grpSpPr>
+          <a:xfrm>
+            <a:off x="223478" y="832281"/>
+            <a:ext cx="9190281" cy="6025719"/>
+            <a:chOff x="223478" y="832281"/>
+            <a:chExt cx="9190281" cy="6025719"/>
+          </a:xfrm>
+        </p:grpSpPr>
+        <p:grpSp>
+          <p:nvGrpSpPr>
+            <p:cNvPr id="54" name="Group 53">
+              <a:extLst>
+                <a:ext uri="{FF2B5EF4-FFF2-40B4-BE49-F238E27FC236}">
+                  <a16:creationId xmlns:a16="http://schemas.microsoft.com/office/drawing/2014/main" id="{985D6AE0-792A-404A-1CFA-7850647BA561}"/>
+                </a:ext>
+              </a:extLst>
+            </p:cNvPr>
+            <p:cNvGrpSpPr/>
+            <p:nvPr/>
+          </p:nvGrpSpPr>
+          <p:grpSpPr>
+            <a:xfrm>
+              <a:off x="1623602" y="832281"/>
+              <a:ext cx="7790157" cy="5193438"/>
+              <a:chOff x="2733501" y="2690181"/>
+              <a:chExt cx="5486400" cy="3662038"/>
+            </a:xfrm>
+          </p:grpSpPr>
+          <p:grpSp>
+            <p:nvGrpSpPr>
+              <p:cNvPr id="38" name="Group 37">
+                <a:extLst>
+                  <a:ext uri="{FF2B5EF4-FFF2-40B4-BE49-F238E27FC236}">
+                    <a16:creationId xmlns:a16="http://schemas.microsoft.com/office/drawing/2014/main" id="{DCEB7AD8-92A8-6393-0069-CFABE0E487A0}"/>
+                  </a:ext>
+                </a:extLst>
+              </p:cNvPr>
+              <p:cNvGrpSpPr/>
+              <p:nvPr/>
+            </p:nvGrpSpPr>
+            <p:grpSpPr>
+              <a:xfrm>
+                <a:off x="2733501" y="4523419"/>
+                <a:ext cx="5486400" cy="1828800"/>
+                <a:chOff x="1802167" y="3888419"/>
+                <a:chExt cx="5486400" cy="1828800"/>
+              </a:xfrm>
+            </p:grpSpPr>
+            <p:sp>
+              <p:nvSpPr>
+                <p:cNvPr id="35" name="Rectangle 34">
+                  <a:extLst>
+                    <a:ext uri="{FF2B5EF4-FFF2-40B4-BE49-F238E27FC236}">
+                      <a16:creationId xmlns:a16="http://schemas.microsoft.com/office/drawing/2014/main" id="{E2E19F8D-8EC5-F148-9F23-518DC54BA446}"/>
+                    </a:ext>
+                  </a:extLst>
+                </p:cNvPr>
+                <p:cNvSpPr/>
+                <p:nvPr/>
+              </p:nvSpPr>
+              <p:spPr>
+                <a:xfrm>
+                  <a:off x="1802167" y="3888419"/>
+                  <a:ext cx="1828800" cy="1828800"/>
+                </a:xfrm>
+                <a:prstGeom prst="rect">
+                  <a:avLst/>
+                </a:prstGeom>
+                <a:noFill/>
+                <a:ln w="50800"/>
+              </p:spPr>
+              <p:style>
+                <a:lnRef idx="2">
+                  <a:schemeClr val="accent1">
+                    <a:shade val="15000"/>
+                  </a:schemeClr>
+                </a:lnRef>
+                <a:fillRef idx="1">
+                  <a:schemeClr val="accent1"/>
+                </a:fillRef>
+                <a:effectRef idx="0">
+                  <a:schemeClr val="accent1"/>
+                </a:effectRef>
+                <a:fontRef idx="minor">
+                  <a:schemeClr val="lt1"/>
+                </a:fontRef>
+              </p:style>
+              <p:txBody>
+                <a:bodyPr rtlCol="0" anchor="ctr"/>
+                <a:lstStyle/>
+                <a:p>
+                  <a:pPr algn="ctr"/>
+                  <a:endParaRPr lang="en-US"/>
+                </a:p>
+              </p:txBody>
+            </p:sp>
+            <p:sp>
+              <p:nvSpPr>
+                <p:cNvPr id="36" name="Rectangle 35">
+                  <a:extLst>
+                    <a:ext uri="{FF2B5EF4-FFF2-40B4-BE49-F238E27FC236}">
+                      <a16:creationId xmlns:a16="http://schemas.microsoft.com/office/drawing/2014/main" id="{CE5D3CEB-A5BF-FA6C-D53F-E588954BD4CC}"/>
+                    </a:ext>
+                  </a:extLst>
+                </p:cNvPr>
+                <p:cNvSpPr/>
+                <p:nvPr/>
+              </p:nvSpPr>
+              <p:spPr>
+                <a:xfrm>
+                  <a:off x="3630967" y="3888419"/>
+                  <a:ext cx="1828800" cy="1828800"/>
+                </a:xfrm>
+                <a:prstGeom prst="rect">
+                  <a:avLst/>
+                </a:prstGeom>
+                <a:noFill/>
+                <a:ln w="50800"/>
+              </p:spPr>
+              <p:style>
+                <a:lnRef idx="2">
+                  <a:schemeClr val="accent1">
+                    <a:shade val="15000"/>
+                  </a:schemeClr>
+                </a:lnRef>
+                <a:fillRef idx="1">
+                  <a:schemeClr val="accent1"/>
+                </a:fillRef>
+                <a:effectRef idx="0">
+                  <a:schemeClr val="accent1"/>
+                </a:effectRef>
+                <a:fontRef idx="minor">
+                  <a:schemeClr val="lt1"/>
+                </a:fontRef>
+              </p:style>
+              <p:txBody>
+                <a:bodyPr rtlCol="0" anchor="ctr"/>
+                <a:lstStyle/>
+                <a:p>
+                  <a:pPr algn="ctr"/>
+                  <a:endParaRPr lang="en-US"/>
+                </a:p>
+              </p:txBody>
+            </p:sp>
+            <p:sp>
+              <p:nvSpPr>
+                <p:cNvPr id="37" name="Rectangle 36">
+                  <a:extLst>
+                    <a:ext uri="{FF2B5EF4-FFF2-40B4-BE49-F238E27FC236}">
+                      <a16:creationId xmlns:a16="http://schemas.microsoft.com/office/drawing/2014/main" id="{F74D9692-A8E6-1DCA-006C-14164A7928E1}"/>
+                    </a:ext>
+                  </a:extLst>
+                </p:cNvPr>
+                <p:cNvSpPr/>
+                <p:nvPr/>
+              </p:nvSpPr>
+              <p:spPr>
+                <a:xfrm>
+                  <a:off x="5459767" y="3888419"/>
+                  <a:ext cx="1828800" cy="1828800"/>
+                </a:xfrm>
+                <a:prstGeom prst="rect">
+                  <a:avLst/>
+                </a:prstGeom>
+                <a:noFill/>
+                <a:ln w="50800"/>
+              </p:spPr>
+              <p:style>
+                <a:lnRef idx="2">
+                  <a:schemeClr val="accent1">
+                    <a:shade val="15000"/>
+                  </a:schemeClr>
+                </a:lnRef>
+                <a:fillRef idx="1">
+                  <a:schemeClr val="accent1"/>
+                </a:fillRef>
+                <a:effectRef idx="0">
+                  <a:schemeClr val="accent1"/>
+                </a:effectRef>
+                <a:fontRef idx="minor">
+                  <a:schemeClr val="lt1"/>
+                </a:fontRef>
+              </p:style>
+              <p:txBody>
+                <a:bodyPr rtlCol="0" anchor="ctr"/>
+                <a:lstStyle/>
+                <a:p>
+                  <a:pPr algn="ctr"/>
+                  <a:endParaRPr lang="en-US"/>
+                </a:p>
+              </p:txBody>
+            </p:sp>
+          </p:grpSp>
+          <p:grpSp>
+            <p:nvGrpSpPr>
+              <p:cNvPr id="39" name="Group 38">
+                <a:extLst>
+                  <a:ext uri="{FF2B5EF4-FFF2-40B4-BE49-F238E27FC236}">
+                    <a16:creationId xmlns:a16="http://schemas.microsoft.com/office/drawing/2014/main" id="{8AD6A607-6777-469D-DFD5-C15CE064F993}"/>
+                  </a:ext>
+                </a:extLst>
+              </p:cNvPr>
+              <p:cNvGrpSpPr/>
+              <p:nvPr/>
+            </p:nvGrpSpPr>
+            <p:grpSpPr>
+              <a:xfrm>
+                <a:off x="2733501" y="2690181"/>
+                <a:ext cx="5486400" cy="1828800"/>
+                <a:chOff x="1802167" y="3888419"/>
+                <a:chExt cx="5486400" cy="1828800"/>
+              </a:xfrm>
+            </p:grpSpPr>
+            <p:sp>
+              <p:nvSpPr>
+                <p:cNvPr id="40" name="Rectangle 39">
+                  <a:extLst>
+                    <a:ext uri="{FF2B5EF4-FFF2-40B4-BE49-F238E27FC236}">
+                      <a16:creationId xmlns:a16="http://schemas.microsoft.com/office/drawing/2014/main" id="{5CA31944-0BA3-2599-1D8F-4CACCBE03620}"/>
+                    </a:ext>
+                  </a:extLst>
+                </p:cNvPr>
+                <p:cNvSpPr/>
+                <p:nvPr/>
+              </p:nvSpPr>
+              <p:spPr>
+                <a:xfrm>
+                  <a:off x="1802167" y="3888419"/>
+                  <a:ext cx="1828800" cy="1828800"/>
+                </a:xfrm>
+                <a:prstGeom prst="rect">
+                  <a:avLst/>
+                </a:prstGeom>
+                <a:noFill/>
+                <a:ln w="50800"/>
+              </p:spPr>
+              <p:style>
+                <a:lnRef idx="2">
+                  <a:schemeClr val="accent1">
+                    <a:shade val="15000"/>
+                  </a:schemeClr>
+                </a:lnRef>
+                <a:fillRef idx="1">
+                  <a:schemeClr val="accent1"/>
+                </a:fillRef>
+                <a:effectRef idx="0">
+                  <a:schemeClr val="accent1"/>
+                </a:effectRef>
+                <a:fontRef idx="minor">
+                  <a:schemeClr val="lt1"/>
+                </a:fontRef>
+              </p:style>
+              <p:txBody>
+                <a:bodyPr rtlCol="0" anchor="ctr"/>
+                <a:lstStyle/>
+                <a:p>
+                  <a:pPr algn="ctr"/>
+                  <a:endParaRPr lang="en-US"/>
+                </a:p>
+              </p:txBody>
+            </p:sp>
+            <p:sp>
+              <p:nvSpPr>
+                <p:cNvPr id="41" name="Rectangle 40">
+                  <a:extLst>
+                    <a:ext uri="{FF2B5EF4-FFF2-40B4-BE49-F238E27FC236}">
+                      <a16:creationId xmlns:a16="http://schemas.microsoft.com/office/drawing/2014/main" id="{F85EEF61-7B48-8D81-FE82-24014D8D3E37}"/>
+                    </a:ext>
+                  </a:extLst>
+                </p:cNvPr>
+                <p:cNvSpPr/>
+                <p:nvPr/>
+              </p:nvSpPr>
+              <p:spPr>
+                <a:xfrm>
+                  <a:off x="3630967" y="3888419"/>
+                  <a:ext cx="1828800" cy="1828800"/>
+                </a:xfrm>
+                <a:prstGeom prst="rect">
+                  <a:avLst/>
+                </a:prstGeom>
+                <a:noFill/>
+                <a:ln w="50800"/>
+              </p:spPr>
+              <p:style>
+                <a:lnRef idx="2">
+                  <a:schemeClr val="accent1">
+                    <a:shade val="15000"/>
+                  </a:schemeClr>
+                </a:lnRef>
+                <a:fillRef idx="1">
+                  <a:schemeClr val="accent1"/>
+                </a:fillRef>
+                <a:effectRef idx="0">
+                  <a:schemeClr val="accent1"/>
+                </a:effectRef>
+                <a:fontRef idx="minor">
+                  <a:schemeClr val="lt1"/>
+                </a:fontRef>
+              </p:style>
+              <p:txBody>
+                <a:bodyPr rtlCol="0" anchor="ctr"/>
+                <a:lstStyle/>
+                <a:p>
+                  <a:pPr algn="ctr"/>
+                  <a:endParaRPr lang="en-US"/>
+                </a:p>
+              </p:txBody>
+            </p:sp>
+            <p:sp>
+              <p:nvSpPr>
+                <p:cNvPr id="42" name="Rectangle 41">
+                  <a:extLst>
+                    <a:ext uri="{FF2B5EF4-FFF2-40B4-BE49-F238E27FC236}">
+                      <a16:creationId xmlns:a16="http://schemas.microsoft.com/office/drawing/2014/main" id="{02EABAD6-3CB4-0358-4C3A-E51B2CB6474B}"/>
+                    </a:ext>
+                  </a:extLst>
+                </p:cNvPr>
+                <p:cNvSpPr/>
+                <p:nvPr/>
+              </p:nvSpPr>
+              <p:spPr>
+                <a:xfrm>
+                  <a:off x="5459767" y="3888419"/>
+                  <a:ext cx="1828800" cy="1828800"/>
+                </a:xfrm>
+                <a:prstGeom prst="rect">
+                  <a:avLst/>
+                </a:prstGeom>
+                <a:noFill/>
+                <a:ln w="50800"/>
+              </p:spPr>
+              <p:style>
+                <a:lnRef idx="2">
+                  <a:schemeClr val="accent1">
+                    <a:shade val="15000"/>
+                  </a:schemeClr>
+                </a:lnRef>
+                <a:fillRef idx="1">
+                  <a:schemeClr val="accent1"/>
+                </a:fillRef>
+                <a:effectRef idx="0">
+                  <a:schemeClr val="accent1"/>
+                </a:effectRef>
+                <a:fontRef idx="minor">
+                  <a:schemeClr val="lt1"/>
+                </a:fontRef>
+              </p:style>
+              <p:txBody>
+                <a:bodyPr rtlCol="0" anchor="ctr"/>
+                <a:lstStyle/>
+                <a:p>
+                  <a:pPr algn="ctr"/>
+                  <a:endParaRPr lang="en-US"/>
+                </a:p>
+              </p:txBody>
+            </p:sp>
+          </p:grpSp>
+        </p:grpSp>
+        <p:sp>
+          <p:nvSpPr>
+            <p:cNvPr id="55" name="Parallelogram 54">
+              <a:extLst>
+                <a:ext uri="{FF2B5EF4-FFF2-40B4-BE49-F238E27FC236}">
+                  <a16:creationId xmlns:a16="http://schemas.microsoft.com/office/drawing/2014/main" id="{BBE57817-9FF4-7F9C-2B21-AD649660E8DA}"/>
+                </a:ext>
+              </a:extLst>
+            </p:cNvPr>
+            <p:cNvSpPr/>
+            <p:nvPr/>
+          </p:nvSpPr>
+          <p:spPr>
+            <a:xfrm>
+              <a:off x="1623603" y="3425853"/>
+              <a:ext cx="5193438" cy="2599866"/>
+            </a:xfrm>
+            <a:prstGeom prst="parallelogram">
+              <a:avLst>
+                <a:gd name="adj" fmla="val 100372"/>
+              </a:avLst>
+            </a:prstGeom>
+            <a:solidFill>
+              <a:schemeClr val="accent1">
+                <a:alpha val="50000"/>
+              </a:schemeClr>
+            </a:solidFill>
+          </p:spPr>
+          <p:style>
+            <a:lnRef idx="2">
+              <a:schemeClr val="accent1">
+                <a:shade val="15000"/>
+              </a:schemeClr>
+            </a:lnRef>
+            <a:fillRef idx="1">
+              <a:schemeClr val="accent1"/>
+            </a:fillRef>
+            <a:effectRef idx="0">
+              <a:schemeClr val="accent1"/>
+            </a:effectRef>
+            <a:fontRef idx="minor">
+              <a:schemeClr val="lt1"/>
+            </a:fontRef>
+          </p:style>
+          <p:txBody>
+            <a:bodyPr rtlCol="0" anchor="ctr"/>
+            <a:lstStyle/>
+            <a:p>
+              <a:pPr algn="ctr"/>
+              <a:endParaRPr lang="en-US"/>
+            </a:p>
+          </p:txBody>
+        </p:sp>
+        <p:sp>
+          <p:nvSpPr>
+            <p:cNvPr id="57" name="TextBox 56">
+              <a:extLst>
+                <a:ext uri="{FF2B5EF4-FFF2-40B4-BE49-F238E27FC236}">
+                  <a16:creationId xmlns:a16="http://schemas.microsoft.com/office/drawing/2014/main" id="{EC4A7C77-DF82-5073-9654-A0CC8FB013CC}"/>
+                </a:ext>
+              </a:extLst>
+            </p:cNvPr>
+            <p:cNvSpPr txBox="1"/>
+            <p:nvPr/>
+          </p:nvSpPr>
+          <p:spPr>
+            <a:xfrm rot="16200000">
+              <a:off x="70968" y="3150138"/>
+              <a:ext cx="889795" cy="584775"/>
+            </a:xfrm>
+            <a:prstGeom prst="rect">
+              <a:avLst/>
+            </a:prstGeom>
+            <a:noFill/>
+          </p:spPr>
+          <p:txBody>
+            <a:bodyPr wrap="none" rtlCol="0">
+              <a:spAutoFit/>
+            </a:bodyPr>
+            <a:lstStyle/>
+            <a:p>
+              <a:r>
+                <a:rPr lang="en-US" sz="3200" b="1" dirty="0"/>
+                <a:t>AGE</a:t>
+              </a:r>
+            </a:p>
+          </p:txBody>
+        </p:sp>
+        <p:sp>
+          <p:nvSpPr>
+            <p:cNvPr id="58" name="TextBox 57">
+              <a:extLst>
+                <a:ext uri="{FF2B5EF4-FFF2-40B4-BE49-F238E27FC236}">
+                  <a16:creationId xmlns:a16="http://schemas.microsoft.com/office/drawing/2014/main" id="{709178DA-8278-0EB3-D739-7AC92BFF79CE}"/>
+                </a:ext>
+              </a:extLst>
+            </p:cNvPr>
+            <p:cNvSpPr txBox="1"/>
+            <p:nvPr/>
+          </p:nvSpPr>
+          <p:spPr>
+            <a:xfrm>
+              <a:off x="4990330" y="6273225"/>
+              <a:ext cx="1056700" cy="584775"/>
+            </a:xfrm>
+            <a:prstGeom prst="rect">
+              <a:avLst/>
+            </a:prstGeom>
+            <a:noFill/>
+          </p:spPr>
+          <p:txBody>
+            <a:bodyPr wrap="none" rtlCol="0">
+              <a:spAutoFit/>
+            </a:bodyPr>
+            <a:lstStyle/>
+            <a:p>
+              <a:r>
+                <a:rPr lang="en-US" sz="3200" b="1" dirty="0"/>
+                <a:t>TIME</a:t>
+              </a:r>
+            </a:p>
+          </p:txBody>
+        </p:sp>
+        <p:sp>
+          <p:nvSpPr>
+            <p:cNvPr id="59" name="Parallelogram 58">
+              <a:extLst>
+                <a:ext uri="{FF2B5EF4-FFF2-40B4-BE49-F238E27FC236}">
+                  <a16:creationId xmlns:a16="http://schemas.microsoft.com/office/drawing/2014/main" id="{4EDCB9CF-D18B-FFF9-FB58-317D3E7DC6E1}"/>
+                </a:ext>
+              </a:extLst>
+            </p:cNvPr>
+            <p:cNvSpPr/>
+            <p:nvPr/>
+          </p:nvSpPr>
+          <p:spPr>
+            <a:xfrm>
+              <a:off x="4220320" y="846291"/>
+              <a:ext cx="5193438" cy="2599866"/>
+            </a:xfrm>
+            <a:prstGeom prst="parallelogram">
+              <a:avLst>
+                <a:gd name="adj" fmla="val 100372"/>
+              </a:avLst>
+            </a:prstGeom>
+            <a:solidFill>
+              <a:srgbClr val="92D050">
+                <a:alpha val="50000"/>
+              </a:srgbClr>
+            </a:solidFill>
+          </p:spPr>
+          <p:style>
+            <a:lnRef idx="2">
+              <a:schemeClr val="accent1">
+                <a:shade val="15000"/>
+              </a:schemeClr>
+            </a:lnRef>
+            <a:fillRef idx="1">
+              <a:schemeClr val="accent1"/>
+            </a:fillRef>
+            <a:effectRef idx="0">
+              <a:schemeClr val="accent1"/>
+            </a:effectRef>
+            <a:fontRef idx="minor">
+              <a:schemeClr val="lt1"/>
+            </a:fontRef>
+          </p:style>
+          <p:txBody>
+            <a:bodyPr rtlCol="0" anchor="ctr"/>
+            <a:lstStyle/>
+            <a:p>
+              <a:pPr algn="ctr"/>
+              <a:endParaRPr lang="en-US"/>
+            </a:p>
+          </p:txBody>
+        </p:sp>
+        <p:sp>
+          <p:nvSpPr>
+            <p:cNvPr id="60" name="TextBox 59">
+              <a:extLst>
+                <a:ext uri="{FF2B5EF4-FFF2-40B4-BE49-F238E27FC236}">
+                  <a16:creationId xmlns:a16="http://schemas.microsoft.com/office/drawing/2014/main" id="{50A42DF2-7F04-21C3-A70D-243D39F47B2A}"/>
+                </a:ext>
+              </a:extLst>
+            </p:cNvPr>
+            <p:cNvSpPr txBox="1"/>
+            <p:nvPr/>
+          </p:nvSpPr>
+          <p:spPr>
+            <a:xfrm>
+              <a:off x="1623601" y="846291"/>
+              <a:ext cx="1010533" cy="461665"/>
+            </a:xfrm>
+            <a:prstGeom prst="rect">
+              <a:avLst/>
+            </a:prstGeom>
+            <a:noFill/>
+          </p:spPr>
+          <p:txBody>
+            <a:bodyPr wrap="none" rtlCol="0">
+              <a:spAutoFit/>
+            </a:bodyPr>
+            <a:lstStyle/>
+            <a:p>
+              <a:r>
+                <a:rPr lang="en-US" sz="2400" b="1" dirty="0"/>
+                <a:t>(x+1,t)</a:t>
+              </a:r>
+            </a:p>
+          </p:txBody>
+        </p:sp>
+        <p:sp>
+          <p:nvSpPr>
+            <p:cNvPr id="61" name="TextBox 60">
+              <a:extLst>
+                <a:ext uri="{FF2B5EF4-FFF2-40B4-BE49-F238E27FC236}">
+                  <a16:creationId xmlns:a16="http://schemas.microsoft.com/office/drawing/2014/main" id="{3693D6BF-243C-BF97-9F86-1A2B73D47699}"/>
+                </a:ext>
+              </a:extLst>
+            </p:cNvPr>
+            <p:cNvSpPr txBox="1"/>
+            <p:nvPr/>
+          </p:nvSpPr>
+          <p:spPr>
+            <a:xfrm>
+              <a:off x="4220318" y="846290"/>
+              <a:ext cx="1319913" cy="461665"/>
+            </a:xfrm>
+            <a:prstGeom prst="rect">
+              <a:avLst/>
+            </a:prstGeom>
+            <a:noFill/>
+          </p:spPr>
+          <p:txBody>
+            <a:bodyPr wrap="none" rtlCol="0">
+              <a:spAutoFit/>
+            </a:bodyPr>
+            <a:lstStyle/>
+            <a:p>
+              <a:r>
+                <a:rPr lang="en-US" sz="2400" b="1" dirty="0"/>
+                <a:t>(x+1,t+1)</a:t>
+              </a:r>
+            </a:p>
+          </p:txBody>
+        </p:sp>
+        <p:sp>
+          <p:nvSpPr>
+            <p:cNvPr id="62" name="TextBox 61">
+              <a:extLst>
+                <a:ext uri="{FF2B5EF4-FFF2-40B4-BE49-F238E27FC236}">
+                  <a16:creationId xmlns:a16="http://schemas.microsoft.com/office/drawing/2014/main" id="{0805A988-7343-1997-DF91-A95860046359}"/>
+                </a:ext>
+              </a:extLst>
+            </p:cNvPr>
+            <p:cNvSpPr txBox="1"/>
+            <p:nvPr/>
+          </p:nvSpPr>
+          <p:spPr>
+            <a:xfrm>
+              <a:off x="6817037" y="852585"/>
+              <a:ext cx="1319913" cy="461665"/>
+            </a:xfrm>
+            <a:prstGeom prst="rect">
+              <a:avLst/>
+            </a:prstGeom>
+            <a:noFill/>
+          </p:spPr>
+          <p:txBody>
+            <a:bodyPr wrap="none" rtlCol="0">
+              <a:spAutoFit/>
+            </a:bodyPr>
+            <a:lstStyle/>
+            <a:p>
+              <a:r>
+                <a:rPr lang="en-US" sz="2400" b="1" dirty="0"/>
+                <a:t>(x+1,t+2)</a:t>
+              </a:r>
+            </a:p>
+          </p:txBody>
+        </p:sp>
+        <p:sp>
+          <p:nvSpPr>
+            <p:cNvPr id="63" name="TextBox 62">
+              <a:extLst>
+                <a:ext uri="{FF2B5EF4-FFF2-40B4-BE49-F238E27FC236}">
+                  <a16:creationId xmlns:a16="http://schemas.microsoft.com/office/drawing/2014/main" id="{C28B918A-9452-6C7E-753C-5CE09609A6B7}"/>
+                </a:ext>
+              </a:extLst>
+            </p:cNvPr>
+            <p:cNvSpPr txBox="1"/>
+            <p:nvPr/>
+          </p:nvSpPr>
+          <p:spPr>
+            <a:xfrm>
+              <a:off x="1623601" y="3442527"/>
+              <a:ext cx="2077877" cy="461665"/>
+            </a:xfrm>
+            <a:prstGeom prst="rect">
+              <a:avLst/>
+            </a:prstGeom>
+            <a:noFill/>
+          </p:spPr>
+          <p:txBody>
+            <a:bodyPr wrap="none" rtlCol="0">
+              <a:spAutoFit/>
+            </a:bodyPr>
+            <a:lstStyle/>
+            <a:p>
+              <a:r>
+                <a:rPr lang="en-US" sz="2400" b="1" dirty="0"/>
+                <a:t>AP Square (</a:t>
+              </a:r>
+              <a:r>
+                <a:rPr lang="en-US" sz="2400" b="1" dirty="0" err="1"/>
+                <a:t>x,t</a:t>
+              </a:r>
+              <a:r>
+                <a:rPr lang="en-US" sz="2400" b="1" dirty="0"/>
+                <a:t>)</a:t>
+              </a:r>
+            </a:p>
+          </p:txBody>
+        </p:sp>
+        <p:sp>
+          <p:nvSpPr>
+            <p:cNvPr id="64" name="TextBox 63">
+              <a:extLst>
+                <a:ext uri="{FF2B5EF4-FFF2-40B4-BE49-F238E27FC236}">
+                  <a16:creationId xmlns:a16="http://schemas.microsoft.com/office/drawing/2014/main" id="{7585D4EB-0DAA-D011-E79B-97F2D51CD0E3}"/>
+                </a:ext>
+              </a:extLst>
+            </p:cNvPr>
+            <p:cNvSpPr txBox="1"/>
+            <p:nvPr/>
+          </p:nvSpPr>
+          <p:spPr>
+            <a:xfrm>
+              <a:off x="4220318" y="3442526"/>
+              <a:ext cx="1010533" cy="461665"/>
+            </a:xfrm>
+            <a:prstGeom prst="rect">
+              <a:avLst/>
+            </a:prstGeom>
+            <a:noFill/>
+          </p:spPr>
+          <p:txBody>
+            <a:bodyPr wrap="none" rtlCol="0">
+              <a:spAutoFit/>
+            </a:bodyPr>
+            <a:lstStyle/>
+            <a:p>
+              <a:r>
+                <a:rPr lang="en-US" sz="2400" b="1" dirty="0"/>
+                <a:t>(x,t+1)</a:t>
+              </a:r>
+            </a:p>
+          </p:txBody>
+        </p:sp>
+        <p:sp>
+          <p:nvSpPr>
+            <p:cNvPr id="65" name="TextBox 64">
+              <a:extLst>
+                <a:ext uri="{FF2B5EF4-FFF2-40B4-BE49-F238E27FC236}">
+                  <a16:creationId xmlns:a16="http://schemas.microsoft.com/office/drawing/2014/main" id="{0B9C0AF9-D7DF-4287-AE90-1A5952AC9AA1}"/>
+                </a:ext>
+              </a:extLst>
+            </p:cNvPr>
+            <p:cNvSpPr txBox="1"/>
+            <p:nvPr/>
+          </p:nvSpPr>
+          <p:spPr>
+            <a:xfrm>
+              <a:off x="6817037" y="3448821"/>
+              <a:ext cx="1010533" cy="461665"/>
+            </a:xfrm>
+            <a:prstGeom prst="rect">
+              <a:avLst/>
+            </a:prstGeom>
+            <a:noFill/>
+          </p:spPr>
+          <p:txBody>
+            <a:bodyPr wrap="none" rtlCol="0">
+              <a:spAutoFit/>
+            </a:bodyPr>
+            <a:lstStyle/>
+            <a:p>
+              <a:r>
+                <a:rPr lang="en-US" sz="2400" b="1" dirty="0"/>
+                <a:t>(x,t+2)</a:t>
+              </a:r>
+            </a:p>
+          </p:txBody>
+        </p:sp>
+        <p:sp>
+          <p:nvSpPr>
+            <p:cNvPr id="66" name="TextBox 65">
+              <a:extLst>
+                <a:ext uri="{FF2B5EF4-FFF2-40B4-BE49-F238E27FC236}">
+                  <a16:creationId xmlns:a16="http://schemas.microsoft.com/office/drawing/2014/main" id="{14C1F5E6-13B9-46AB-53FD-C41E6857FAD1}"/>
+                </a:ext>
+              </a:extLst>
+            </p:cNvPr>
+            <p:cNvSpPr txBox="1"/>
+            <p:nvPr/>
+          </p:nvSpPr>
+          <p:spPr>
+            <a:xfrm>
+              <a:off x="1888020" y="5580728"/>
+              <a:ext cx="2267993" cy="461665"/>
+            </a:xfrm>
+            <a:prstGeom prst="rect">
+              <a:avLst/>
+            </a:prstGeom>
+            <a:noFill/>
+          </p:spPr>
+          <p:txBody>
+            <a:bodyPr wrap="none" rtlCol="0">
+              <a:spAutoFit/>
+            </a:bodyPr>
+            <a:lstStyle/>
+            <a:p>
+              <a:r>
+                <a:rPr lang="en-US" sz="2400" b="1" dirty="0">
+                  <a:solidFill>
+                    <a:srgbClr val="002060"/>
+                  </a:solidFill>
+                </a:rPr>
+                <a:t>Birth Year c = t-x</a:t>
+              </a:r>
+            </a:p>
+          </p:txBody>
+        </p:sp>
+      </p:grpSp>
+      <p:sp>
+        <p:nvSpPr>
+          <p:cNvPr id="68" name="TextBox 67">
+            <a:extLst>
+              <a:ext uri="{FF2B5EF4-FFF2-40B4-BE49-F238E27FC236}">
+                <a16:creationId xmlns:a16="http://schemas.microsoft.com/office/drawing/2014/main" id="{30DA8838-8B56-AB61-FF9A-2705EFB2FDF5}"/>
+              </a:ext>
+            </a:extLst>
+          </p:cNvPr>
+          <p:cNvSpPr txBox="1"/>
+          <p:nvPr/>
+        </p:nvSpPr>
+        <p:spPr>
+          <a:xfrm>
+            <a:off x="821095" y="601448"/>
+            <a:ext cx="635110" cy="461665"/>
+          </a:xfrm>
+          <a:prstGeom prst="rect">
+            <a:avLst/>
+          </a:prstGeom>
+          <a:noFill/>
+        </p:spPr>
+        <p:txBody>
+          <a:bodyPr wrap="none" rtlCol="0">
+            <a:spAutoFit/>
+          </a:bodyPr>
+          <a:lstStyle/>
+          <a:p>
+            <a:r>
+              <a:rPr lang="en-US" sz="2400" b="1" dirty="0"/>
+              <a:t>x+2</a:t>
+            </a:r>
+          </a:p>
+        </p:txBody>
+      </p:sp>
+      <p:sp>
+        <p:nvSpPr>
+          <p:cNvPr id="69" name="TextBox 68">
+            <a:extLst>
+              <a:ext uri="{FF2B5EF4-FFF2-40B4-BE49-F238E27FC236}">
+                <a16:creationId xmlns:a16="http://schemas.microsoft.com/office/drawing/2014/main" id="{6745F9C7-60E8-8D92-E878-FB30A51D889A}"/>
+              </a:ext>
+            </a:extLst>
+          </p:cNvPr>
+          <p:cNvSpPr txBox="1"/>
+          <p:nvPr/>
+        </p:nvSpPr>
+        <p:spPr>
+          <a:xfrm>
+            <a:off x="833098" y="3195020"/>
+            <a:ext cx="635110" cy="461665"/>
+          </a:xfrm>
+          <a:prstGeom prst="rect">
+            <a:avLst/>
+          </a:prstGeom>
+          <a:noFill/>
+        </p:spPr>
+        <p:txBody>
+          <a:bodyPr wrap="none" rtlCol="0">
+            <a:spAutoFit/>
+          </a:bodyPr>
+          <a:lstStyle/>
+          <a:p>
+            <a:r>
+              <a:rPr lang="en-US" sz="2400" b="1" dirty="0"/>
+              <a:t>x+1</a:t>
+            </a:r>
+          </a:p>
+        </p:txBody>
+      </p:sp>
+      <p:sp>
+        <p:nvSpPr>
+          <p:cNvPr id="70" name="TextBox 69">
+            <a:extLst>
+              <a:ext uri="{FF2B5EF4-FFF2-40B4-BE49-F238E27FC236}">
+                <a16:creationId xmlns:a16="http://schemas.microsoft.com/office/drawing/2014/main" id="{D5551724-5FFA-101F-8539-0B94872E967B}"/>
+              </a:ext>
+            </a:extLst>
+          </p:cNvPr>
+          <p:cNvSpPr txBox="1"/>
+          <p:nvPr/>
+        </p:nvSpPr>
+        <p:spPr>
+          <a:xfrm>
+            <a:off x="987788" y="5811560"/>
+            <a:ext cx="325730" cy="461665"/>
+          </a:xfrm>
+          <a:prstGeom prst="rect">
+            <a:avLst/>
+          </a:prstGeom>
+          <a:noFill/>
+        </p:spPr>
+        <p:txBody>
+          <a:bodyPr wrap="none" rtlCol="0">
+            <a:spAutoFit/>
+          </a:bodyPr>
+          <a:lstStyle/>
+          <a:p>
+            <a:r>
+              <a:rPr lang="en-US" sz="2400" b="1" dirty="0"/>
+              <a:t>x</a:t>
+            </a:r>
+          </a:p>
+        </p:txBody>
+      </p:sp>
+      <p:sp>
+        <p:nvSpPr>
+          <p:cNvPr id="71" name="TextBox 70">
+            <a:extLst>
+              <a:ext uri="{FF2B5EF4-FFF2-40B4-BE49-F238E27FC236}">
+                <a16:creationId xmlns:a16="http://schemas.microsoft.com/office/drawing/2014/main" id="{CCBAFA0A-55F9-674B-5E48-37A77DEBEC44}"/>
+              </a:ext>
+            </a:extLst>
+          </p:cNvPr>
+          <p:cNvSpPr txBox="1"/>
+          <p:nvPr/>
+        </p:nvSpPr>
+        <p:spPr>
+          <a:xfrm>
+            <a:off x="3919594" y="6103947"/>
+            <a:ext cx="601447" cy="461665"/>
+          </a:xfrm>
+          <a:prstGeom prst="rect">
+            <a:avLst/>
+          </a:prstGeom>
+          <a:noFill/>
+        </p:spPr>
+        <p:txBody>
+          <a:bodyPr wrap="none" rtlCol="0">
+            <a:spAutoFit/>
+          </a:bodyPr>
+          <a:lstStyle/>
+          <a:p>
+            <a:r>
+              <a:rPr lang="en-US" sz="2400" b="1" dirty="0"/>
+              <a:t>t+1</a:t>
+            </a:r>
+          </a:p>
+        </p:txBody>
+      </p:sp>
+      <p:sp>
+        <p:nvSpPr>
+          <p:cNvPr id="72" name="TextBox 71">
+            <a:extLst>
+              <a:ext uri="{FF2B5EF4-FFF2-40B4-BE49-F238E27FC236}">
+                <a16:creationId xmlns:a16="http://schemas.microsoft.com/office/drawing/2014/main" id="{490FACC5-D7B3-AF98-7B72-ADDA6971746E}"/>
+              </a:ext>
+            </a:extLst>
+          </p:cNvPr>
+          <p:cNvSpPr txBox="1"/>
+          <p:nvPr/>
+        </p:nvSpPr>
+        <p:spPr>
+          <a:xfrm>
+            <a:off x="6525670" y="6103947"/>
+            <a:ext cx="601447" cy="461665"/>
+          </a:xfrm>
+          <a:prstGeom prst="rect">
+            <a:avLst/>
+          </a:prstGeom>
+          <a:noFill/>
+        </p:spPr>
+        <p:txBody>
+          <a:bodyPr wrap="none" rtlCol="0">
+            <a:spAutoFit/>
+          </a:bodyPr>
+          <a:lstStyle/>
+          <a:p>
+            <a:r>
+              <a:rPr lang="en-US" sz="2400" b="1" dirty="0"/>
+              <a:t>t+2</a:t>
+            </a:r>
+          </a:p>
+        </p:txBody>
+      </p:sp>
+      <p:sp>
+        <p:nvSpPr>
+          <p:cNvPr id="73" name="TextBox 72">
+            <a:extLst>
+              <a:ext uri="{FF2B5EF4-FFF2-40B4-BE49-F238E27FC236}">
+                <a16:creationId xmlns:a16="http://schemas.microsoft.com/office/drawing/2014/main" id="{498186B4-8375-CA1E-9451-8279DCD88CA6}"/>
+              </a:ext>
+            </a:extLst>
+          </p:cNvPr>
+          <p:cNvSpPr txBox="1"/>
+          <p:nvPr/>
+        </p:nvSpPr>
+        <p:spPr>
+          <a:xfrm>
+            <a:off x="9113034" y="6103947"/>
+            <a:ext cx="601447" cy="461665"/>
+          </a:xfrm>
+          <a:prstGeom prst="rect">
+            <a:avLst/>
+          </a:prstGeom>
+          <a:noFill/>
+        </p:spPr>
+        <p:txBody>
+          <a:bodyPr wrap="none" rtlCol="0">
+            <a:spAutoFit/>
+          </a:bodyPr>
+          <a:lstStyle/>
+          <a:p>
+            <a:r>
+              <a:rPr lang="en-US" sz="2400" b="1" dirty="0"/>
+              <a:t>t+3</a:t>
+            </a:r>
+          </a:p>
+        </p:txBody>
+      </p:sp>
+      <p:sp>
+        <p:nvSpPr>
+          <p:cNvPr id="74" name="TextBox 73">
+            <a:extLst>
+              <a:ext uri="{FF2B5EF4-FFF2-40B4-BE49-F238E27FC236}">
+                <a16:creationId xmlns:a16="http://schemas.microsoft.com/office/drawing/2014/main" id="{3D6DB02A-547A-E6D3-CD63-52D4682B6428}"/>
+              </a:ext>
+            </a:extLst>
+          </p:cNvPr>
+          <p:cNvSpPr txBox="1"/>
+          <p:nvPr/>
+        </p:nvSpPr>
+        <p:spPr>
+          <a:xfrm>
+            <a:off x="1490739" y="6103946"/>
+            <a:ext cx="292068" cy="461665"/>
+          </a:xfrm>
+          <a:prstGeom prst="rect">
+            <a:avLst/>
+          </a:prstGeom>
+          <a:noFill/>
+        </p:spPr>
+        <p:txBody>
+          <a:bodyPr wrap="none" rtlCol="0">
+            <a:spAutoFit/>
+          </a:bodyPr>
+          <a:lstStyle/>
+          <a:p>
+            <a:r>
+              <a:rPr lang="en-US" sz="2400" b="1" dirty="0"/>
+              <a:t>t</a:t>
+            </a:r>
+          </a:p>
+        </p:txBody>
+      </p:sp>
+      <p:sp>
+        <p:nvSpPr>
+          <p:cNvPr id="76" name="TextBox 75">
+            <a:extLst>
+              <a:ext uri="{FF2B5EF4-FFF2-40B4-BE49-F238E27FC236}">
+                <a16:creationId xmlns:a16="http://schemas.microsoft.com/office/drawing/2014/main" id="{7A9C20AA-F70A-0A0C-0F81-DBC06F60CF58}"/>
+              </a:ext>
+            </a:extLst>
+          </p:cNvPr>
+          <p:cNvSpPr txBox="1"/>
+          <p:nvPr/>
+        </p:nvSpPr>
+        <p:spPr>
+          <a:xfrm>
+            <a:off x="3177518" y="4859840"/>
+            <a:ext cx="596445" cy="584775"/>
+          </a:xfrm>
+          <a:prstGeom prst="rect">
+            <a:avLst/>
+          </a:prstGeom>
+          <a:noFill/>
+          <a:ln w="19050">
+            <a:noFill/>
+          </a:ln>
+        </p:spPr>
+        <p:txBody>
+          <a:bodyPr wrap="none" rtlCol="0">
+            <a:spAutoFit/>
+          </a:bodyPr>
+          <a:lstStyle/>
+          <a:p>
+            <a:r>
+              <a:rPr lang="en-US" sz="3200" dirty="0" err="1"/>
+              <a:t>L</a:t>
+            </a:r>
+            <a:r>
+              <a:rPr lang="en-US" sz="2800" baseline="-25000" dirty="0" err="1"/>
+              <a:t>x,t</a:t>
+            </a:r>
+            <a:endParaRPr lang="en-US" sz="3200" dirty="0"/>
+          </a:p>
+        </p:txBody>
+      </p:sp>
+      <p:sp>
+        <p:nvSpPr>
+          <p:cNvPr id="77" name="TextBox 76">
+            <a:extLst>
+              <a:ext uri="{FF2B5EF4-FFF2-40B4-BE49-F238E27FC236}">
+                <a16:creationId xmlns:a16="http://schemas.microsoft.com/office/drawing/2014/main" id="{F8B73E9B-1BE7-64E8-E620-7CDB8F125D58}"/>
+              </a:ext>
+            </a:extLst>
+          </p:cNvPr>
+          <p:cNvSpPr txBox="1"/>
+          <p:nvPr/>
+        </p:nvSpPr>
+        <p:spPr>
+          <a:xfrm>
+            <a:off x="5268424" y="2555661"/>
+            <a:ext cx="1077346" cy="584775"/>
+          </a:xfrm>
+          <a:prstGeom prst="rect">
+            <a:avLst/>
+          </a:prstGeom>
+          <a:noFill/>
+          <a:ln w="19050">
+            <a:noFill/>
+          </a:ln>
+        </p:spPr>
+        <p:txBody>
+          <a:bodyPr wrap="none" rtlCol="0">
+            <a:spAutoFit/>
+          </a:bodyPr>
+          <a:lstStyle/>
+          <a:p>
+            <a:r>
+              <a:rPr lang="en-US" sz="3200" dirty="0"/>
+              <a:t>L</a:t>
+            </a:r>
+            <a:r>
+              <a:rPr lang="en-US" sz="2800" baseline="-25000" dirty="0"/>
+              <a:t>x+1,t+1</a:t>
+            </a:r>
+            <a:endParaRPr lang="en-US" sz="3200" dirty="0"/>
+          </a:p>
+        </p:txBody>
+      </p:sp>
+      <p:sp>
+        <p:nvSpPr>
+          <p:cNvPr id="78" name="TextBox 77">
+            <a:extLst>
+              <a:ext uri="{FF2B5EF4-FFF2-40B4-BE49-F238E27FC236}">
+                <a16:creationId xmlns:a16="http://schemas.microsoft.com/office/drawing/2014/main" id="{43095B57-2132-3B31-FC1D-DE3FFB03EF7F}"/>
+              </a:ext>
+            </a:extLst>
+          </p:cNvPr>
+          <p:cNvSpPr txBox="1"/>
+          <p:nvPr/>
+        </p:nvSpPr>
+        <p:spPr>
+          <a:xfrm>
+            <a:off x="4407523" y="3953544"/>
+            <a:ext cx="926664" cy="584775"/>
+          </a:xfrm>
+          <a:prstGeom prst="rect">
+            <a:avLst/>
+          </a:prstGeom>
+          <a:noFill/>
+          <a:ln w="19050">
+            <a:noFill/>
+          </a:ln>
+        </p:spPr>
+        <p:txBody>
+          <a:bodyPr wrap="none" rtlCol="0">
+            <a:spAutoFit/>
+          </a:bodyPr>
+          <a:lstStyle/>
+          <a:p>
+            <a:r>
+              <a:rPr lang="en-US" sz="3200" dirty="0"/>
+              <a:t>U</a:t>
+            </a:r>
+            <a:r>
+              <a:rPr lang="en-US" sz="2800" baseline="-25000" dirty="0"/>
+              <a:t>x,t+1</a:t>
+            </a:r>
+            <a:endParaRPr lang="en-US" sz="3200" dirty="0"/>
+          </a:p>
+        </p:txBody>
+      </p:sp>
+      <p:sp>
+        <p:nvSpPr>
+          <p:cNvPr id="79" name="TextBox 78">
+            <a:extLst>
+              <a:ext uri="{FF2B5EF4-FFF2-40B4-BE49-F238E27FC236}">
+                <a16:creationId xmlns:a16="http://schemas.microsoft.com/office/drawing/2014/main" id="{E32B5D62-0913-3ECB-44E7-17FA339CFC68}"/>
+              </a:ext>
+            </a:extLst>
+          </p:cNvPr>
+          <p:cNvSpPr txBox="1"/>
+          <p:nvPr/>
+        </p:nvSpPr>
+        <p:spPr>
+          <a:xfrm>
+            <a:off x="6926619" y="1456561"/>
+            <a:ext cx="1167114" cy="584775"/>
+          </a:xfrm>
+          <a:prstGeom prst="rect">
+            <a:avLst/>
+          </a:prstGeom>
+          <a:noFill/>
+          <a:ln w="19050">
+            <a:noFill/>
+          </a:ln>
+        </p:spPr>
+        <p:txBody>
+          <a:bodyPr wrap="none" rtlCol="0">
+            <a:spAutoFit/>
+          </a:bodyPr>
+          <a:lstStyle/>
+          <a:p>
+            <a:r>
+              <a:rPr lang="en-US" sz="3200" dirty="0"/>
+              <a:t>U</a:t>
+            </a:r>
+            <a:r>
+              <a:rPr lang="en-US" sz="2800" baseline="-25000" dirty="0"/>
+              <a:t>x+1,t+2</a:t>
+            </a:r>
+            <a:endParaRPr lang="en-US" sz="3200" dirty="0"/>
+          </a:p>
+        </p:txBody>
+      </p:sp>
+      <p:sp>
+        <p:nvSpPr>
+          <p:cNvPr id="4" name="Right Triangle 3">
+            <a:extLst>
+              <a:ext uri="{FF2B5EF4-FFF2-40B4-BE49-F238E27FC236}">
+                <a16:creationId xmlns:a16="http://schemas.microsoft.com/office/drawing/2014/main" id="{E407B705-5E3C-B33E-0E31-ADDAA02AF8BA}"/>
+              </a:ext>
+            </a:extLst>
+          </p:cNvPr>
+          <p:cNvSpPr/>
+          <p:nvPr/>
+        </p:nvSpPr>
+        <p:spPr>
+          <a:xfrm flipH="1">
+            <a:off x="2460884" y="3872823"/>
+            <a:ext cx="1645920" cy="1645920"/>
+          </a:xfrm>
+          <a:prstGeom prst="rtTriangle">
+            <a:avLst/>
+          </a:prstGeom>
+          <a:noFill/>
+          <a:ln w="34925">
+            <a:solidFill>
+              <a:schemeClr val="accent1">
+                <a:shade val="15000"/>
+              </a:schemeClr>
+            </a:solidFill>
+          </a:ln>
+        </p:spPr>
+        <p:style>
+          <a:lnRef idx="2">
+            <a:schemeClr val="accent1">
+              <a:shade val="15000"/>
+            </a:schemeClr>
+          </a:lnRef>
+          <a:fillRef idx="1">
+            <a:schemeClr val="accent1"/>
+          </a:fillRef>
+          <a:effectRef idx="0">
+            <a:schemeClr val="accent1"/>
+          </a:effectRef>
+          <a:fontRef idx="minor">
+            <a:schemeClr val="lt1"/>
+          </a:fontRef>
+        </p:style>
+        <p:txBody>
+          <a:bodyPr rtlCol="0" anchor="ctr"/>
+          <a:lstStyle/>
+          <a:p>
+            <a:pPr algn="ctr"/>
+            <a:endParaRPr lang="en-US"/>
+          </a:p>
+        </p:txBody>
+      </p:sp>
+      <p:sp>
+        <p:nvSpPr>
+          <p:cNvPr id="5" name="Right Triangle 4">
+            <a:extLst>
+              <a:ext uri="{FF2B5EF4-FFF2-40B4-BE49-F238E27FC236}">
+                <a16:creationId xmlns:a16="http://schemas.microsoft.com/office/drawing/2014/main" id="{77C4D8EA-43C5-D47B-FC6C-63BD25A30916}"/>
+              </a:ext>
+            </a:extLst>
+          </p:cNvPr>
+          <p:cNvSpPr/>
+          <p:nvPr/>
+        </p:nvSpPr>
+        <p:spPr>
+          <a:xfrm flipV="1">
+            <a:off x="4394634" y="3901836"/>
+            <a:ext cx="1645920" cy="1645920"/>
+          </a:xfrm>
+          <a:prstGeom prst="rtTriangle">
+            <a:avLst/>
+          </a:prstGeom>
+          <a:noFill/>
+          <a:ln w="34925">
+            <a:solidFill>
+              <a:schemeClr val="accent1">
+                <a:shade val="15000"/>
+              </a:schemeClr>
+            </a:solidFill>
+          </a:ln>
+        </p:spPr>
+        <p:style>
+          <a:lnRef idx="2">
+            <a:schemeClr val="accent1">
+              <a:shade val="15000"/>
+            </a:schemeClr>
+          </a:lnRef>
+          <a:fillRef idx="1">
+            <a:schemeClr val="accent1"/>
+          </a:fillRef>
+          <a:effectRef idx="0">
+            <a:schemeClr val="accent1"/>
+          </a:effectRef>
+          <a:fontRef idx="minor">
+            <a:schemeClr val="lt1"/>
+          </a:fontRef>
+        </p:style>
+        <p:txBody>
+          <a:bodyPr rtlCol="0" anchor="ctr"/>
+          <a:lstStyle/>
+          <a:p>
+            <a:pPr algn="ctr"/>
+            <a:endParaRPr lang="en-US"/>
+          </a:p>
+        </p:txBody>
+      </p:sp>
+      <p:sp>
+        <p:nvSpPr>
+          <p:cNvPr id="102" name="Right Triangle 101">
+            <a:extLst>
+              <a:ext uri="{FF2B5EF4-FFF2-40B4-BE49-F238E27FC236}">
+                <a16:creationId xmlns:a16="http://schemas.microsoft.com/office/drawing/2014/main" id="{7C3C041F-B696-BFF9-5D78-EDD8E8C6BAE1}"/>
+              </a:ext>
+            </a:extLst>
+          </p:cNvPr>
+          <p:cNvSpPr/>
+          <p:nvPr/>
+        </p:nvSpPr>
+        <p:spPr>
+          <a:xfrm flipH="1">
+            <a:off x="4673097" y="1599653"/>
+            <a:ext cx="1645920" cy="1645920"/>
+          </a:xfrm>
+          <a:prstGeom prst="rtTriangle">
+            <a:avLst/>
+          </a:prstGeom>
+          <a:noFill/>
+          <a:ln w="34925">
+            <a:solidFill>
+              <a:schemeClr val="accent1">
+                <a:shade val="15000"/>
+              </a:schemeClr>
+            </a:solidFill>
+          </a:ln>
+        </p:spPr>
+        <p:style>
+          <a:lnRef idx="2">
+            <a:schemeClr val="accent1">
+              <a:shade val="15000"/>
+            </a:schemeClr>
+          </a:lnRef>
+          <a:fillRef idx="1">
+            <a:schemeClr val="accent1"/>
+          </a:fillRef>
+          <a:effectRef idx="0">
+            <a:schemeClr val="accent1"/>
+          </a:effectRef>
+          <a:fontRef idx="minor">
+            <a:schemeClr val="lt1"/>
+          </a:fontRef>
+        </p:style>
+        <p:txBody>
+          <a:bodyPr rtlCol="0" anchor="ctr"/>
+          <a:lstStyle/>
+          <a:p>
+            <a:pPr algn="ctr"/>
+            <a:endParaRPr lang="en-US"/>
+          </a:p>
+        </p:txBody>
+      </p:sp>
+      <p:sp>
+        <p:nvSpPr>
+          <p:cNvPr id="103" name="Right Triangle 102">
+            <a:extLst>
+              <a:ext uri="{FF2B5EF4-FFF2-40B4-BE49-F238E27FC236}">
+                <a16:creationId xmlns:a16="http://schemas.microsoft.com/office/drawing/2014/main" id="{CEE5AB76-9D31-E8ED-DEF3-54A5EB29CA74}"/>
+              </a:ext>
+            </a:extLst>
+          </p:cNvPr>
+          <p:cNvSpPr/>
+          <p:nvPr/>
+        </p:nvSpPr>
+        <p:spPr>
+          <a:xfrm flipV="1">
+            <a:off x="6953351" y="1426536"/>
+            <a:ext cx="1645920" cy="1645920"/>
+          </a:xfrm>
+          <a:prstGeom prst="rtTriangle">
+            <a:avLst/>
+          </a:prstGeom>
+          <a:noFill/>
+          <a:ln w="34925">
+            <a:solidFill>
+              <a:schemeClr val="accent1">
+                <a:shade val="15000"/>
+              </a:schemeClr>
+            </a:solidFill>
+          </a:ln>
+        </p:spPr>
+        <p:style>
+          <a:lnRef idx="2">
+            <a:schemeClr val="accent1">
+              <a:shade val="15000"/>
+            </a:schemeClr>
+          </a:lnRef>
+          <a:fillRef idx="1">
+            <a:schemeClr val="accent1"/>
+          </a:fillRef>
+          <a:effectRef idx="0">
+            <a:schemeClr val="accent1"/>
+          </a:effectRef>
+          <a:fontRef idx="minor">
+            <a:schemeClr val="lt1"/>
+          </a:fontRef>
+        </p:style>
+        <p:txBody>
+          <a:bodyPr rtlCol="0" anchor="ctr"/>
+          <a:lstStyle/>
+          <a:p>
+            <a:pPr algn="ctr"/>
+            <a:endParaRPr lang="en-US"/>
+          </a:p>
+        </p:txBody>
+      </p:sp>
+    </p:spTree>
+    <p:extLst>
+      <p:ext uri="{BB962C8B-B14F-4D97-AF65-F5344CB8AC3E}">
+        <p14:creationId xmlns:p14="http://schemas.microsoft.com/office/powerpoint/2010/main" val="1905486150"/>
+      </p:ext>
+    </p:extLst>
+  </p:cSld>
+  <p:clrMapOvr>
+    <a:masterClrMapping/>
+  </p:clrMapOvr>
+</p:sld>
+</file>
+
+<file path=ppt/slides/slide5.xml><?xml version="1.0" encoding="utf-8"?>
+<p:sld xmlns:a="http://schemas.openxmlformats.org/drawingml/2006/main" xmlns:r="http://schemas.openxmlformats.org/officeDocument/2006/relationships" xmlns:p="http://schemas.openxmlformats.org/presentationml/2006/main">
+  <p:cSld>
+    <p:spTree>
+      <p:nvGrpSpPr>
+        <p:cNvPr id="1" name=""/>
+        <p:cNvGrpSpPr/>
+        <p:nvPr/>
+      </p:nvGrpSpPr>
+      <p:grpSpPr>
+        <a:xfrm>
+          <a:off x="0" y="0"/>
+          <a:ext cx="0" cy="0"/>
+          <a:chOff x="0" y="0"/>
+          <a:chExt cx="0" cy="0"/>
+        </a:xfrm>
+      </p:grpSpPr>
+      <p:grpSp>
+        <p:nvGrpSpPr>
+          <p:cNvPr id="2" name="Group 1">
+            <a:extLst>
+              <a:ext uri="{FF2B5EF4-FFF2-40B4-BE49-F238E27FC236}">
+                <a16:creationId xmlns:a16="http://schemas.microsoft.com/office/drawing/2014/main" id="{A32097E9-31C7-3428-1958-3754BC9868DB}"/>
+              </a:ext>
+            </a:extLst>
+          </p:cNvPr>
+          <p:cNvGrpSpPr/>
+          <p:nvPr/>
+        </p:nvGrpSpPr>
+        <p:grpSpPr>
+          <a:xfrm>
+            <a:off x="223478" y="601448"/>
+            <a:ext cx="9491003" cy="6256552"/>
+            <a:chOff x="223478" y="601448"/>
+            <a:chExt cx="9491003" cy="6256552"/>
+          </a:xfrm>
+        </p:grpSpPr>
+        <p:grpSp>
+          <p:nvGrpSpPr>
+            <p:cNvPr id="54" name="Group 53">
+              <a:extLst>
+                <a:ext uri="{FF2B5EF4-FFF2-40B4-BE49-F238E27FC236}">
+                  <a16:creationId xmlns:a16="http://schemas.microsoft.com/office/drawing/2014/main" id="{985D6AE0-792A-404A-1CFA-7850647BA561}"/>
+                </a:ext>
+              </a:extLst>
+            </p:cNvPr>
+            <p:cNvGrpSpPr/>
+            <p:nvPr/>
+          </p:nvGrpSpPr>
+          <p:grpSpPr>
+            <a:xfrm>
+              <a:off x="1623602" y="832281"/>
+              <a:ext cx="7790157" cy="5193438"/>
+              <a:chOff x="2733501" y="2690181"/>
+              <a:chExt cx="5486400" cy="3662038"/>
+            </a:xfrm>
+          </p:grpSpPr>
+          <p:grpSp>
+            <p:nvGrpSpPr>
+              <p:cNvPr id="38" name="Group 37">
+                <a:extLst>
+                  <a:ext uri="{FF2B5EF4-FFF2-40B4-BE49-F238E27FC236}">
+                    <a16:creationId xmlns:a16="http://schemas.microsoft.com/office/drawing/2014/main" id="{DCEB7AD8-92A8-6393-0069-CFABE0E487A0}"/>
+                  </a:ext>
+                </a:extLst>
+              </p:cNvPr>
+              <p:cNvGrpSpPr/>
+              <p:nvPr/>
+            </p:nvGrpSpPr>
+            <p:grpSpPr>
+              <a:xfrm>
+                <a:off x="2733501" y="4523419"/>
+                <a:ext cx="5486400" cy="1828800"/>
+                <a:chOff x="1802167" y="3888419"/>
+                <a:chExt cx="5486400" cy="1828800"/>
+              </a:xfrm>
+            </p:grpSpPr>
+            <p:sp>
+              <p:nvSpPr>
+                <p:cNvPr id="35" name="Rectangle 34">
+                  <a:extLst>
+                    <a:ext uri="{FF2B5EF4-FFF2-40B4-BE49-F238E27FC236}">
+                      <a16:creationId xmlns:a16="http://schemas.microsoft.com/office/drawing/2014/main" id="{E2E19F8D-8EC5-F148-9F23-518DC54BA446}"/>
+                    </a:ext>
+                  </a:extLst>
+                </p:cNvPr>
+                <p:cNvSpPr/>
+                <p:nvPr/>
+              </p:nvSpPr>
+              <p:spPr>
+                <a:xfrm>
+                  <a:off x="1802167" y="3888419"/>
+                  <a:ext cx="1828800" cy="1828800"/>
+                </a:xfrm>
+                <a:prstGeom prst="rect">
+                  <a:avLst/>
+                </a:prstGeom>
+                <a:noFill/>
+                <a:ln w="50800"/>
+              </p:spPr>
+              <p:style>
+                <a:lnRef idx="2">
+                  <a:schemeClr val="accent1">
+                    <a:shade val="15000"/>
+                  </a:schemeClr>
+                </a:lnRef>
+                <a:fillRef idx="1">
+                  <a:schemeClr val="accent1"/>
+                </a:fillRef>
+                <a:effectRef idx="0">
+                  <a:schemeClr val="accent1"/>
+                </a:effectRef>
+                <a:fontRef idx="minor">
+                  <a:schemeClr val="lt1"/>
+                </a:fontRef>
+              </p:style>
+              <p:txBody>
+                <a:bodyPr rtlCol="0" anchor="ctr"/>
+                <a:lstStyle/>
+                <a:p>
+                  <a:pPr algn="ctr"/>
+                  <a:endParaRPr lang="en-US"/>
+                </a:p>
+              </p:txBody>
+            </p:sp>
+            <p:sp>
+              <p:nvSpPr>
+                <p:cNvPr id="36" name="Rectangle 35">
+                  <a:extLst>
+                    <a:ext uri="{FF2B5EF4-FFF2-40B4-BE49-F238E27FC236}">
+                      <a16:creationId xmlns:a16="http://schemas.microsoft.com/office/drawing/2014/main" id="{CE5D3CEB-A5BF-FA6C-D53F-E588954BD4CC}"/>
+                    </a:ext>
+                  </a:extLst>
+                </p:cNvPr>
+                <p:cNvSpPr/>
+                <p:nvPr/>
+              </p:nvSpPr>
+              <p:spPr>
+                <a:xfrm>
+                  <a:off x="3630967" y="3888419"/>
+                  <a:ext cx="1828800" cy="1828800"/>
+                </a:xfrm>
+                <a:prstGeom prst="rect">
+                  <a:avLst/>
+                </a:prstGeom>
+                <a:noFill/>
+                <a:ln w="50800"/>
+              </p:spPr>
+              <p:style>
+                <a:lnRef idx="2">
+                  <a:schemeClr val="accent1">
+                    <a:shade val="15000"/>
+                  </a:schemeClr>
+                </a:lnRef>
+                <a:fillRef idx="1">
+                  <a:schemeClr val="accent1"/>
+                </a:fillRef>
+                <a:effectRef idx="0">
+                  <a:schemeClr val="accent1"/>
+                </a:effectRef>
+                <a:fontRef idx="minor">
+                  <a:schemeClr val="lt1"/>
+                </a:fontRef>
+              </p:style>
+              <p:txBody>
+                <a:bodyPr rtlCol="0" anchor="ctr"/>
+                <a:lstStyle/>
+                <a:p>
+                  <a:pPr algn="ctr"/>
+                  <a:endParaRPr lang="en-US"/>
+                </a:p>
+              </p:txBody>
+            </p:sp>
+            <p:sp>
+              <p:nvSpPr>
+                <p:cNvPr id="37" name="Rectangle 36">
+                  <a:extLst>
+                    <a:ext uri="{FF2B5EF4-FFF2-40B4-BE49-F238E27FC236}">
+                      <a16:creationId xmlns:a16="http://schemas.microsoft.com/office/drawing/2014/main" id="{F74D9692-A8E6-1DCA-006C-14164A7928E1}"/>
+                    </a:ext>
+                  </a:extLst>
+                </p:cNvPr>
+                <p:cNvSpPr/>
+                <p:nvPr/>
+              </p:nvSpPr>
+              <p:spPr>
+                <a:xfrm>
+                  <a:off x="5459767" y="3888419"/>
+                  <a:ext cx="1828800" cy="1828800"/>
+                </a:xfrm>
+                <a:prstGeom prst="rect">
+                  <a:avLst/>
+                </a:prstGeom>
+                <a:noFill/>
+                <a:ln w="50800"/>
+              </p:spPr>
+              <p:style>
+                <a:lnRef idx="2">
+                  <a:schemeClr val="accent1">
+                    <a:shade val="15000"/>
+                  </a:schemeClr>
+                </a:lnRef>
+                <a:fillRef idx="1">
+                  <a:schemeClr val="accent1"/>
+                </a:fillRef>
+                <a:effectRef idx="0">
+                  <a:schemeClr val="accent1"/>
+                </a:effectRef>
+                <a:fontRef idx="minor">
+                  <a:schemeClr val="lt1"/>
+                </a:fontRef>
+              </p:style>
+              <p:txBody>
+                <a:bodyPr rtlCol="0" anchor="ctr"/>
+                <a:lstStyle/>
+                <a:p>
+                  <a:pPr algn="ctr"/>
+                  <a:endParaRPr lang="en-US"/>
+                </a:p>
+              </p:txBody>
+            </p:sp>
+          </p:grpSp>
+          <p:grpSp>
+            <p:nvGrpSpPr>
+              <p:cNvPr id="39" name="Group 38">
+                <a:extLst>
+                  <a:ext uri="{FF2B5EF4-FFF2-40B4-BE49-F238E27FC236}">
+                    <a16:creationId xmlns:a16="http://schemas.microsoft.com/office/drawing/2014/main" id="{8AD6A607-6777-469D-DFD5-C15CE064F993}"/>
+                  </a:ext>
+                </a:extLst>
+              </p:cNvPr>
+              <p:cNvGrpSpPr/>
+              <p:nvPr/>
+            </p:nvGrpSpPr>
+            <p:grpSpPr>
+              <a:xfrm>
+                <a:off x="2733501" y="2690181"/>
+                <a:ext cx="5486400" cy="1828800"/>
+                <a:chOff x="1802167" y="3888419"/>
+                <a:chExt cx="5486400" cy="1828800"/>
+              </a:xfrm>
+            </p:grpSpPr>
+            <p:sp>
+              <p:nvSpPr>
+                <p:cNvPr id="40" name="Rectangle 39">
+                  <a:extLst>
+                    <a:ext uri="{FF2B5EF4-FFF2-40B4-BE49-F238E27FC236}">
+                      <a16:creationId xmlns:a16="http://schemas.microsoft.com/office/drawing/2014/main" id="{5CA31944-0BA3-2599-1D8F-4CACCBE03620}"/>
+                    </a:ext>
+                  </a:extLst>
+                </p:cNvPr>
+                <p:cNvSpPr/>
+                <p:nvPr/>
+              </p:nvSpPr>
+              <p:spPr>
+                <a:xfrm>
+                  <a:off x="1802167" y="3888419"/>
+                  <a:ext cx="1828800" cy="1828800"/>
+                </a:xfrm>
+                <a:prstGeom prst="rect">
+                  <a:avLst/>
+                </a:prstGeom>
+                <a:noFill/>
+                <a:ln w="50800"/>
+              </p:spPr>
+              <p:style>
+                <a:lnRef idx="2">
+                  <a:schemeClr val="accent1">
+                    <a:shade val="15000"/>
+                  </a:schemeClr>
+                </a:lnRef>
+                <a:fillRef idx="1">
+                  <a:schemeClr val="accent1"/>
+                </a:fillRef>
+                <a:effectRef idx="0">
+                  <a:schemeClr val="accent1"/>
+                </a:effectRef>
+                <a:fontRef idx="minor">
+                  <a:schemeClr val="lt1"/>
+                </a:fontRef>
+              </p:style>
+              <p:txBody>
+                <a:bodyPr rtlCol="0" anchor="ctr"/>
+                <a:lstStyle/>
+                <a:p>
+                  <a:pPr algn="ctr"/>
+                  <a:endParaRPr lang="en-US"/>
+                </a:p>
+              </p:txBody>
+            </p:sp>
+            <p:sp>
+              <p:nvSpPr>
+                <p:cNvPr id="41" name="Rectangle 40">
+                  <a:extLst>
+                    <a:ext uri="{FF2B5EF4-FFF2-40B4-BE49-F238E27FC236}">
+                      <a16:creationId xmlns:a16="http://schemas.microsoft.com/office/drawing/2014/main" id="{F85EEF61-7B48-8D81-FE82-24014D8D3E37}"/>
+                    </a:ext>
+                  </a:extLst>
+                </p:cNvPr>
+                <p:cNvSpPr/>
+                <p:nvPr/>
+              </p:nvSpPr>
+              <p:spPr>
+                <a:xfrm>
+                  <a:off x="3630967" y="3888419"/>
+                  <a:ext cx="1828800" cy="1828800"/>
+                </a:xfrm>
+                <a:prstGeom prst="rect">
+                  <a:avLst/>
+                </a:prstGeom>
+                <a:noFill/>
+                <a:ln w="50800"/>
+              </p:spPr>
+              <p:style>
+                <a:lnRef idx="2">
+                  <a:schemeClr val="accent1">
+                    <a:shade val="15000"/>
+                  </a:schemeClr>
+                </a:lnRef>
+                <a:fillRef idx="1">
+                  <a:schemeClr val="accent1"/>
+                </a:fillRef>
+                <a:effectRef idx="0">
+                  <a:schemeClr val="accent1"/>
+                </a:effectRef>
+                <a:fontRef idx="minor">
+                  <a:schemeClr val="lt1"/>
+                </a:fontRef>
+              </p:style>
+              <p:txBody>
+                <a:bodyPr rtlCol="0" anchor="ctr"/>
+                <a:lstStyle/>
+                <a:p>
+                  <a:pPr algn="ctr"/>
+                  <a:endParaRPr lang="en-US"/>
+                </a:p>
+              </p:txBody>
+            </p:sp>
+            <p:sp>
+              <p:nvSpPr>
+                <p:cNvPr id="42" name="Rectangle 41">
+                  <a:extLst>
+                    <a:ext uri="{FF2B5EF4-FFF2-40B4-BE49-F238E27FC236}">
+                      <a16:creationId xmlns:a16="http://schemas.microsoft.com/office/drawing/2014/main" id="{02EABAD6-3CB4-0358-4C3A-E51B2CB6474B}"/>
+                    </a:ext>
+                  </a:extLst>
+                </p:cNvPr>
+                <p:cNvSpPr/>
+                <p:nvPr/>
+              </p:nvSpPr>
+              <p:spPr>
+                <a:xfrm>
+                  <a:off x="5459767" y="3888419"/>
+                  <a:ext cx="1828800" cy="1828800"/>
+                </a:xfrm>
+                <a:prstGeom prst="rect">
+                  <a:avLst/>
+                </a:prstGeom>
+                <a:noFill/>
+                <a:ln w="50800"/>
+              </p:spPr>
+              <p:style>
+                <a:lnRef idx="2">
+                  <a:schemeClr val="accent1">
+                    <a:shade val="15000"/>
+                  </a:schemeClr>
+                </a:lnRef>
+                <a:fillRef idx="1">
+                  <a:schemeClr val="accent1"/>
+                </a:fillRef>
+                <a:effectRef idx="0">
+                  <a:schemeClr val="accent1"/>
+                </a:effectRef>
+                <a:fontRef idx="minor">
+                  <a:schemeClr val="lt1"/>
+                </a:fontRef>
+              </p:style>
+              <p:txBody>
+                <a:bodyPr rtlCol="0" anchor="ctr"/>
+                <a:lstStyle/>
+                <a:p>
+                  <a:pPr algn="ctr"/>
+                  <a:endParaRPr lang="en-US"/>
+                </a:p>
+              </p:txBody>
+            </p:sp>
+          </p:grpSp>
+        </p:grpSp>
+        <p:sp>
+          <p:nvSpPr>
+            <p:cNvPr id="55" name="Parallelogram 54">
+              <a:extLst>
+                <a:ext uri="{FF2B5EF4-FFF2-40B4-BE49-F238E27FC236}">
+                  <a16:creationId xmlns:a16="http://schemas.microsoft.com/office/drawing/2014/main" id="{BBE57817-9FF4-7F9C-2B21-AD649660E8DA}"/>
+                </a:ext>
+              </a:extLst>
+            </p:cNvPr>
+            <p:cNvSpPr/>
+            <p:nvPr/>
+          </p:nvSpPr>
+          <p:spPr>
+            <a:xfrm>
+              <a:off x="1623603" y="3425853"/>
+              <a:ext cx="5193438" cy="2599866"/>
+            </a:xfrm>
+            <a:prstGeom prst="parallelogram">
+              <a:avLst>
+                <a:gd name="adj" fmla="val 100372"/>
+              </a:avLst>
+            </a:prstGeom>
+            <a:solidFill>
+              <a:schemeClr val="accent1">
+                <a:alpha val="50000"/>
+              </a:schemeClr>
+            </a:solidFill>
+          </p:spPr>
+          <p:style>
+            <a:lnRef idx="2">
+              <a:schemeClr val="accent1">
+                <a:shade val="15000"/>
+              </a:schemeClr>
+            </a:lnRef>
+            <a:fillRef idx="1">
+              <a:schemeClr val="accent1"/>
+            </a:fillRef>
+            <a:effectRef idx="0">
+              <a:schemeClr val="accent1"/>
+            </a:effectRef>
+            <a:fontRef idx="minor">
+              <a:schemeClr val="lt1"/>
+            </a:fontRef>
+          </p:style>
+          <p:txBody>
+            <a:bodyPr rtlCol="0" anchor="ctr"/>
+            <a:lstStyle/>
+            <a:p>
+              <a:pPr algn="ctr"/>
+              <a:endParaRPr lang="en-US"/>
+            </a:p>
+          </p:txBody>
+        </p:sp>
+        <p:sp>
+          <p:nvSpPr>
+            <p:cNvPr id="57" name="TextBox 56">
+              <a:extLst>
+                <a:ext uri="{FF2B5EF4-FFF2-40B4-BE49-F238E27FC236}">
+                  <a16:creationId xmlns:a16="http://schemas.microsoft.com/office/drawing/2014/main" id="{EC4A7C77-DF82-5073-9654-A0CC8FB013CC}"/>
+                </a:ext>
+              </a:extLst>
+            </p:cNvPr>
+            <p:cNvSpPr txBox="1"/>
+            <p:nvPr/>
+          </p:nvSpPr>
+          <p:spPr>
+            <a:xfrm rot="16200000">
+              <a:off x="70968" y="3150138"/>
+              <a:ext cx="889795" cy="584775"/>
+            </a:xfrm>
+            <a:prstGeom prst="rect">
+              <a:avLst/>
+            </a:prstGeom>
+            <a:noFill/>
+          </p:spPr>
+          <p:txBody>
+            <a:bodyPr wrap="none" rtlCol="0">
+              <a:spAutoFit/>
+            </a:bodyPr>
+            <a:lstStyle/>
+            <a:p>
+              <a:r>
+                <a:rPr lang="en-US" sz="3200" b="1" dirty="0"/>
+                <a:t>AGE</a:t>
+              </a:r>
+            </a:p>
+          </p:txBody>
+        </p:sp>
+        <p:sp>
+          <p:nvSpPr>
+            <p:cNvPr id="58" name="TextBox 57">
+              <a:extLst>
+                <a:ext uri="{FF2B5EF4-FFF2-40B4-BE49-F238E27FC236}">
+                  <a16:creationId xmlns:a16="http://schemas.microsoft.com/office/drawing/2014/main" id="{709178DA-8278-0EB3-D739-7AC92BFF79CE}"/>
+                </a:ext>
+              </a:extLst>
+            </p:cNvPr>
+            <p:cNvSpPr txBox="1"/>
+            <p:nvPr/>
+          </p:nvSpPr>
+          <p:spPr>
+            <a:xfrm>
+              <a:off x="4990330" y="6273225"/>
+              <a:ext cx="1056700" cy="584775"/>
+            </a:xfrm>
+            <a:prstGeom prst="rect">
+              <a:avLst/>
+            </a:prstGeom>
+            <a:noFill/>
+          </p:spPr>
+          <p:txBody>
+            <a:bodyPr wrap="none" rtlCol="0">
+              <a:spAutoFit/>
+            </a:bodyPr>
+            <a:lstStyle/>
+            <a:p>
+              <a:r>
+                <a:rPr lang="en-US" sz="3200" b="1" dirty="0"/>
+                <a:t>TIME</a:t>
+              </a:r>
+            </a:p>
+          </p:txBody>
+        </p:sp>
+        <p:sp>
+          <p:nvSpPr>
+            <p:cNvPr id="59" name="Parallelogram 58">
+              <a:extLst>
+                <a:ext uri="{FF2B5EF4-FFF2-40B4-BE49-F238E27FC236}">
+                  <a16:creationId xmlns:a16="http://schemas.microsoft.com/office/drawing/2014/main" id="{4EDCB9CF-D18B-FFF9-FB58-317D3E7DC6E1}"/>
+                </a:ext>
+              </a:extLst>
+            </p:cNvPr>
+            <p:cNvSpPr/>
+            <p:nvPr/>
+          </p:nvSpPr>
+          <p:spPr>
+            <a:xfrm>
+              <a:off x="4220320" y="846291"/>
+              <a:ext cx="5193438" cy="2599866"/>
+            </a:xfrm>
+            <a:prstGeom prst="parallelogram">
+              <a:avLst>
+                <a:gd name="adj" fmla="val 100372"/>
+              </a:avLst>
+            </a:prstGeom>
+            <a:solidFill>
+              <a:srgbClr val="92D050">
+                <a:alpha val="50000"/>
+              </a:srgbClr>
+            </a:solidFill>
+          </p:spPr>
+          <p:style>
+            <a:lnRef idx="2">
+              <a:schemeClr val="accent1">
+                <a:shade val="15000"/>
+              </a:schemeClr>
+            </a:lnRef>
+            <a:fillRef idx="1">
+              <a:schemeClr val="accent1"/>
+            </a:fillRef>
+            <a:effectRef idx="0">
+              <a:schemeClr val="accent1"/>
+            </a:effectRef>
+            <a:fontRef idx="minor">
+              <a:schemeClr val="lt1"/>
+            </a:fontRef>
+          </p:style>
+          <p:txBody>
+            <a:bodyPr rtlCol="0" anchor="ctr"/>
+            <a:lstStyle/>
+            <a:p>
+              <a:pPr algn="ctr"/>
+              <a:endParaRPr lang="en-US"/>
+            </a:p>
+          </p:txBody>
+        </p:sp>
+        <p:sp>
+          <p:nvSpPr>
+            <p:cNvPr id="60" name="TextBox 59">
+              <a:extLst>
+                <a:ext uri="{FF2B5EF4-FFF2-40B4-BE49-F238E27FC236}">
+                  <a16:creationId xmlns:a16="http://schemas.microsoft.com/office/drawing/2014/main" id="{50A42DF2-7F04-21C3-A70D-243D39F47B2A}"/>
+                </a:ext>
+              </a:extLst>
+            </p:cNvPr>
+            <p:cNvSpPr txBox="1"/>
+            <p:nvPr/>
+          </p:nvSpPr>
+          <p:spPr>
+            <a:xfrm>
+              <a:off x="1623601" y="846291"/>
+              <a:ext cx="1010533" cy="461665"/>
+            </a:xfrm>
+            <a:prstGeom prst="rect">
+              <a:avLst/>
+            </a:prstGeom>
+            <a:noFill/>
+          </p:spPr>
+          <p:txBody>
+            <a:bodyPr wrap="none" rtlCol="0">
+              <a:spAutoFit/>
+            </a:bodyPr>
+            <a:lstStyle/>
+            <a:p>
+              <a:r>
+                <a:rPr lang="en-US" sz="2400" b="1" dirty="0"/>
+                <a:t>(x+1,t)</a:t>
+              </a:r>
+            </a:p>
+          </p:txBody>
+        </p:sp>
+        <p:sp>
+          <p:nvSpPr>
+            <p:cNvPr id="61" name="TextBox 60">
+              <a:extLst>
+                <a:ext uri="{FF2B5EF4-FFF2-40B4-BE49-F238E27FC236}">
+                  <a16:creationId xmlns:a16="http://schemas.microsoft.com/office/drawing/2014/main" id="{3693D6BF-243C-BF97-9F86-1A2B73D47699}"/>
+                </a:ext>
+              </a:extLst>
+            </p:cNvPr>
+            <p:cNvSpPr txBox="1"/>
+            <p:nvPr/>
+          </p:nvSpPr>
+          <p:spPr>
+            <a:xfrm>
+              <a:off x="4220318" y="846290"/>
+              <a:ext cx="1319913" cy="461665"/>
+            </a:xfrm>
+            <a:prstGeom prst="rect">
+              <a:avLst/>
+            </a:prstGeom>
+            <a:noFill/>
+          </p:spPr>
+          <p:txBody>
+            <a:bodyPr wrap="none" rtlCol="0">
+              <a:spAutoFit/>
+            </a:bodyPr>
+            <a:lstStyle/>
+            <a:p>
+              <a:r>
+                <a:rPr lang="en-US" sz="2400" b="1" dirty="0"/>
+                <a:t>(x+1,t+1)</a:t>
+              </a:r>
+            </a:p>
+          </p:txBody>
+        </p:sp>
+        <p:sp>
+          <p:nvSpPr>
+            <p:cNvPr id="62" name="TextBox 61">
+              <a:extLst>
+                <a:ext uri="{FF2B5EF4-FFF2-40B4-BE49-F238E27FC236}">
+                  <a16:creationId xmlns:a16="http://schemas.microsoft.com/office/drawing/2014/main" id="{0805A988-7343-1997-DF91-A95860046359}"/>
+                </a:ext>
+              </a:extLst>
+            </p:cNvPr>
+            <p:cNvSpPr txBox="1"/>
+            <p:nvPr/>
+          </p:nvSpPr>
+          <p:spPr>
+            <a:xfrm>
+              <a:off x="6817037" y="852585"/>
+              <a:ext cx="1319913" cy="461665"/>
+            </a:xfrm>
+            <a:prstGeom prst="rect">
+              <a:avLst/>
+            </a:prstGeom>
+            <a:noFill/>
+          </p:spPr>
+          <p:txBody>
+            <a:bodyPr wrap="none" rtlCol="0">
+              <a:spAutoFit/>
+            </a:bodyPr>
+            <a:lstStyle/>
+            <a:p>
+              <a:r>
+                <a:rPr lang="en-US" sz="2400" b="1" dirty="0"/>
+                <a:t>(x+1,t+2)</a:t>
+              </a:r>
+            </a:p>
+          </p:txBody>
+        </p:sp>
+        <p:sp>
+          <p:nvSpPr>
+            <p:cNvPr id="63" name="TextBox 62">
+              <a:extLst>
+                <a:ext uri="{FF2B5EF4-FFF2-40B4-BE49-F238E27FC236}">
+                  <a16:creationId xmlns:a16="http://schemas.microsoft.com/office/drawing/2014/main" id="{C28B918A-9452-6C7E-753C-5CE09609A6B7}"/>
+                </a:ext>
+              </a:extLst>
+            </p:cNvPr>
+            <p:cNvSpPr txBox="1"/>
+            <p:nvPr/>
+          </p:nvSpPr>
+          <p:spPr>
+            <a:xfrm>
+              <a:off x="1623601" y="3442527"/>
+              <a:ext cx="2077877" cy="461665"/>
+            </a:xfrm>
+            <a:prstGeom prst="rect">
+              <a:avLst/>
+            </a:prstGeom>
+            <a:noFill/>
+          </p:spPr>
+          <p:txBody>
+            <a:bodyPr wrap="none" rtlCol="0">
+              <a:spAutoFit/>
+            </a:bodyPr>
+            <a:lstStyle/>
+            <a:p>
+              <a:r>
+                <a:rPr lang="en-US" sz="2400" b="1" dirty="0"/>
+                <a:t>AP Square (</a:t>
+              </a:r>
+              <a:r>
+                <a:rPr lang="en-US" sz="2400" b="1" dirty="0" err="1"/>
+                <a:t>x,t</a:t>
+              </a:r>
+              <a:r>
+                <a:rPr lang="en-US" sz="2400" b="1" dirty="0"/>
+                <a:t>)</a:t>
+              </a:r>
+            </a:p>
+          </p:txBody>
+        </p:sp>
+        <p:sp>
+          <p:nvSpPr>
+            <p:cNvPr id="64" name="TextBox 63">
+              <a:extLst>
+                <a:ext uri="{FF2B5EF4-FFF2-40B4-BE49-F238E27FC236}">
+                  <a16:creationId xmlns:a16="http://schemas.microsoft.com/office/drawing/2014/main" id="{7585D4EB-0DAA-D011-E79B-97F2D51CD0E3}"/>
+                </a:ext>
+              </a:extLst>
+            </p:cNvPr>
+            <p:cNvSpPr txBox="1"/>
+            <p:nvPr/>
+          </p:nvSpPr>
+          <p:spPr>
+            <a:xfrm>
+              <a:off x="4220318" y="3442526"/>
+              <a:ext cx="1010533" cy="461665"/>
+            </a:xfrm>
+            <a:prstGeom prst="rect">
+              <a:avLst/>
+            </a:prstGeom>
+            <a:noFill/>
+          </p:spPr>
+          <p:txBody>
+            <a:bodyPr wrap="none" rtlCol="0">
+              <a:spAutoFit/>
+            </a:bodyPr>
+            <a:lstStyle/>
+            <a:p>
+              <a:r>
+                <a:rPr lang="en-US" sz="2400" b="1" dirty="0"/>
+                <a:t>(x,t+1)</a:t>
+              </a:r>
+            </a:p>
+          </p:txBody>
+        </p:sp>
+        <p:sp>
+          <p:nvSpPr>
+            <p:cNvPr id="65" name="TextBox 64">
+              <a:extLst>
+                <a:ext uri="{FF2B5EF4-FFF2-40B4-BE49-F238E27FC236}">
+                  <a16:creationId xmlns:a16="http://schemas.microsoft.com/office/drawing/2014/main" id="{0B9C0AF9-D7DF-4287-AE90-1A5952AC9AA1}"/>
+                </a:ext>
+              </a:extLst>
+            </p:cNvPr>
+            <p:cNvSpPr txBox="1"/>
+            <p:nvPr/>
+          </p:nvSpPr>
+          <p:spPr>
+            <a:xfrm>
+              <a:off x="6817037" y="3448821"/>
+              <a:ext cx="1010533" cy="461665"/>
+            </a:xfrm>
+            <a:prstGeom prst="rect">
+              <a:avLst/>
+            </a:prstGeom>
+            <a:noFill/>
+          </p:spPr>
+          <p:txBody>
+            <a:bodyPr wrap="none" rtlCol="0">
+              <a:spAutoFit/>
+            </a:bodyPr>
+            <a:lstStyle/>
+            <a:p>
+              <a:r>
+                <a:rPr lang="en-US" sz="2400" b="1" dirty="0"/>
+                <a:t>(x,t+2)</a:t>
+              </a:r>
+            </a:p>
+          </p:txBody>
+        </p:sp>
+        <p:sp>
+          <p:nvSpPr>
+            <p:cNvPr id="66" name="TextBox 65">
+              <a:extLst>
+                <a:ext uri="{FF2B5EF4-FFF2-40B4-BE49-F238E27FC236}">
+                  <a16:creationId xmlns:a16="http://schemas.microsoft.com/office/drawing/2014/main" id="{14C1F5E6-13B9-46AB-53FD-C41E6857FAD1}"/>
+                </a:ext>
+              </a:extLst>
+            </p:cNvPr>
+            <p:cNvSpPr txBox="1"/>
+            <p:nvPr/>
+          </p:nvSpPr>
+          <p:spPr>
+            <a:xfrm>
+              <a:off x="1888020" y="5580728"/>
+              <a:ext cx="2267993" cy="461665"/>
+            </a:xfrm>
+            <a:prstGeom prst="rect">
+              <a:avLst/>
+            </a:prstGeom>
+            <a:noFill/>
+          </p:spPr>
+          <p:txBody>
+            <a:bodyPr wrap="none" rtlCol="0">
+              <a:spAutoFit/>
+            </a:bodyPr>
+            <a:lstStyle/>
+            <a:p>
+              <a:r>
+                <a:rPr lang="en-US" sz="2400" b="1" dirty="0">
+                  <a:solidFill>
+                    <a:srgbClr val="002060"/>
+                  </a:solidFill>
+                </a:rPr>
+                <a:t>Birth Year c = t-x</a:t>
+              </a:r>
+            </a:p>
+          </p:txBody>
+        </p:sp>
+        <p:sp>
+          <p:nvSpPr>
+            <p:cNvPr id="68" name="TextBox 67">
+              <a:extLst>
+                <a:ext uri="{FF2B5EF4-FFF2-40B4-BE49-F238E27FC236}">
+                  <a16:creationId xmlns:a16="http://schemas.microsoft.com/office/drawing/2014/main" id="{30DA8838-8B56-AB61-FF9A-2705EFB2FDF5}"/>
+                </a:ext>
+              </a:extLst>
+            </p:cNvPr>
+            <p:cNvSpPr txBox="1"/>
+            <p:nvPr/>
+          </p:nvSpPr>
+          <p:spPr>
+            <a:xfrm>
+              <a:off x="821095" y="601448"/>
+              <a:ext cx="635110" cy="461665"/>
+            </a:xfrm>
+            <a:prstGeom prst="rect">
+              <a:avLst/>
+            </a:prstGeom>
+            <a:noFill/>
+          </p:spPr>
+          <p:txBody>
+            <a:bodyPr wrap="none" rtlCol="0">
+              <a:spAutoFit/>
+            </a:bodyPr>
+            <a:lstStyle/>
+            <a:p>
+              <a:r>
+                <a:rPr lang="en-US" sz="2400" b="1" dirty="0"/>
+                <a:t>x+2</a:t>
+              </a:r>
+            </a:p>
+          </p:txBody>
+        </p:sp>
+        <p:sp>
+          <p:nvSpPr>
+            <p:cNvPr id="69" name="TextBox 68">
+              <a:extLst>
+                <a:ext uri="{FF2B5EF4-FFF2-40B4-BE49-F238E27FC236}">
+                  <a16:creationId xmlns:a16="http://schemas.microsoft.com/office/drawing/2014/main" id="{6745F9C7-60E8-8D92-E878-FB30A51D889A}"/>
+                </a:ext>
+              </a:extLst>
+            </p:cNvPr>
+            <p:cNvSpPr txBox="1"/>
+            <p:nvPr/>
+          </p:nvSpPr>
+          <p:spPr>
+            <a:xfrm>
+              <a:off x="833098" y="3195020"/>
+              <a:ext cx="635110" cy="461665"/>
+            </a:xfrm>
+            <a:prstGeom prst="rect">
+              <a:avLst/>
+            </a:prstGeom>
+            <a:noFill/>
+          </p:spPr>
+          <p:txBody>
+            <a:bodyPr wrap="none" rtlCol="0">
+              <a:spAutoFit/>
+            </a:bodyPr>
+            <a:lstStyle/>
+            <a:p>
+              <a:r>
+                <a:rPr lang="en-US" sz="2400" b="1" dirty="0"/>
+                <a:t>x+1</a:t>
+              </a:r>
+            </a:p>
+          </p:txBody>
+        </p:sp>
+        <p:sp>
+          <p:nvSpPr>
+            <p:cNvPr id="70" name="TextBox 69">
+              <a:extLst>
+                <a:ext uri="{FF2B5EF4-FFF2-40B4-BE49-F238E27FC236}">
+                  <a16:creationId xmlns:a16="http://schemas.microsoft.com/office/drawing/2014/main" id="{D5551724-5FFA-101F-8539-0B94872E967B}"/>
+                </a:ext>
+              </a:extLst>
+            </p:cNvPr>
+            <p:cNvSpPr txBox="1"/>
+            <p:nvPr/>
+          </p:nvSpPr>
+          <p:spPr>
+            <a:xfrm>
+              <a:off x="987788" y="5811560"/>
+              <a:ext cx="325730" cy="461665"/>
+            </a:xfrm>
+            <a:prstGeom prst="rect">
+              <a:avLst/>
+            </a:prstGeom>
+            <a:noFill/>
+          </p:spPr>
+          <p:txBody>
+            <a:bodyPr wrap="none" rtlCol="0">
+              <a:spAutoFit/>
+            </a:bodyPr>
+            <a:lstStyle/>
+            <a:p>
+              <a:r>
+                <a:rPr lang="en-US" sz="2400" b="1" dirty="0"/>
+                <a:t>x</a:t>
+              </a:r>
+            </a:p>
+          </p:txBody>
+        </p:sp>
+        <p:sp>
+          <p:nvSpPr>
+            <p:cNvPr id="71" name="TextBox 70">
+              <a:extLst>
+                <a:ext uri="{FF2B5EF4-FFF2-40B4-BE49-F238E27FC236}">
+                  <a16:creationId xmlns:a16="http://schemas.microsoft.com/office/drawing/2014/main" id="{CCBAFA0A-55F9-674B-5E48-37A77DEBEC44}"/>
+                </a:ext>
+              </a:extLst>
+            </p:cNvPr>
+            <p:cNvSpPr txBox="1"/>
+            <p:nvPr/>
+          </p:nvSpPr>
+          <p:spPr>
+            <a:xfrm>
+              <a:off x="3919594" y="6103947"/>
+              <a:ext cx="601447" cy="461665"/>
+            </a:xfrm>
+            <a:prstGeom prst="rect">
+              <a:avLst/>
+            </a:prstGeom>
+            <a:noFill/>
+          </p:spPr>
+          <p:txBody>
+            <a:bodyPr wrap="none" rtlCol="0">
+              <a:spAutoFit/>
+            </a:bodyPr>
+            <a:lstStyle/>
+            <a:p>
+              <a:r>
+                <a:rPr lang="en-US" sz="2400" b="1" dirty="0"/>
+                <a:t>t+1</a:t>
+              </a:r>
+            </a:p>
+          </p:txBody>
+        </p:sp>
+        <p:sp>
+          <p:nvSpPr>
+            <p:cNvPr id="72" name="TextBox 71">
+              <a:extLst>
+                <a:ext uri="{FF2B5EF4-FFF2-40B4-BE49-F238E27FC236}">
+                  <a16:creationId xmlns:a16="http://schemas.microsoft.com/office/drawing/2014/main" id="{490FACC5-D7B3-AF98-7B72-ADDA6971746E}"/>
+                </a:ext>
+              </a:extLst>
+            </p:cNvPr>
+            <p:cNvSpPr txBox="1"/>
+            <p:nvPr/>
+          </p:nvSpPr>
+          <p:spPr>
+            <a:xfrm>
+              <a:off x="6525670" y="6103947"/>
+              <a:ext cx="601447" cy="461665"/>
+            </a:xfrm>
+            <a:prstGeom prst="rect">
+              <a:avLst/>
+            </a:prstGeom>
+            <a:noFill/>
+          </p:spPr>
+          <p:txBody>
+            <a:bodyPr wrap="none" rtlCol="0">
+              <a:spAutoFit/>
+            </a:bodyPr>
+            <a:lstStyle/>
+            <a:p>
+              <a:r>
+                <a:rPr lang="en-US" sz="2400" b="1" dirty="0"/>
+                <a:t>t+2</a:t>
+              </a:r>
+            </a:p>
+          </p:txBody>
+        </p:sp>
+        <p:sp>
+          <p:nvSpPr>
+            <p:cNvPr id="73" name="TextBox 72">
+              <a:extLst>
+                <a:ext uri="{FF2B5EF4-FFF2-40B4-BE49-F238E27FC236}">
+                  <a16:creationId xmlns:a16="http://schemas.microsoft.com/office/drawing/2014/main" id="{498186B4-8375-CA1E-9451-8279DCD88CA6}"/>
+                </a:ext>
+              </a:extLst>
+            </p:cNvPr>
+            <p:cNvSpPr txBox="1"/>
+            <p:nvPr/>
+          </p:nvSpPr>
+          <p:spPr>
+            <a:xfrm>
+              <a:off x="9113034" y="6103947"/>
+              <a:ext cx="601447" cy="461665"/>
+            </a:xfrm>
+            <a:prstGeom prst="rect">
+              <a:avLst/>
+            </a:prstGeom>
+            <a:noFill/>
+          </p:spPr>
+          <p:txBody>
+            <a:bodyPr wrap="none" rtlCol="0">
+              <a:spAutoFit/>
+            </a:bodyPr>
+            <a:lstStyle/>
+            <a:p>
+              <a:r>
+                <a:rPr lang="en-US" sz="2400" b="1" dirty="0"/>
+                <a:t>t+3</a:t>
+              </a:r>
+            </a:p>
+          </p:txBody>
+        </p:sp>
+        <p:sp>
+          <p:nvSpPr>
+            <p:cNvPr id="74" name="TextBox 73">
+              <a:extLst>
+                <a:ext uri="{FF2B5EF4-FFF2-40B4-BE49-F238E27FC236}">
+                  <a16:creationId xmlns:a16="http://schemas.microsoft.com/office/drawing/2014/main" id="{3D6DB02A-547A-E6D3-CD63-52D4682B6428}"/>
+                </a:ext>
+              </a:extLst>
+            </p:cNvPr>
+            <p:cNvSpPr txBox="1"/>
+            <p:nvPr/>
+          </p:nvSpPr>
+          <p:spPr>
+            <a:xfrm>
+              <a:off x="1490739" y="6103946"/>
+              <a:ext cx="292068" cy="461665"/>
+            </a:xfrm>
+            <a:prstGeom prst="rect">
+              <a:avLst/>
+            </a:prstGeom>
+            <a:noFill/>
+          </p:spPr>
+          <p:txBody>
+            <a:bodyPr wrap="none" rtlCol="0">
+              <a:spAutoFit/>
+            </a:bodyPr>
+            <a:lstStyle/>
+            <a:p>
+              <a:r>
+                <a:rPr lang="en-US" sz="2400" b="1" dirty="0"/>
+                <a:t>t</a:t>
+              </a:r>
+            </a:p>
+          </p:txBody>
+        </p:sp>
+        <p:sp>
+          <p:nvSpPr>
+            <p:cNvPr id="76" name="TextBox 75">
+              <a:extLst>
+                <a:ext uri="{FF2B5EF4-FFF2-40B4-BE49-F238E27FC236}">
+                  <a16:creationId xmlns:a16="http://schemas.microsoft.com/office/drawing/2014/main" id="{7A9C20AA-F70A-0A0C-0F81-DBC06F60CF58}"/>
+                </a:ext>
+              </a:extLst>
+            </p:cNvPr>
+            <p:cNvSpPr txBox="1"/>
+            <p:nvPr/>
+          </p:nvSpPr>
+          <p:spPr>
+            <a:xfrm>
+              <a:off x="3115515" y="4725786"/>
+              <a:ext cx="684739" cy="646331"/>
+            </a:xfrm>
+            <a:prstGeom prst="rect">
+              <a:avLst/>
+            </a:prstGeom>
+            <a:noFill/>
+            <a:ln w="19050">
+              <a:noFill/>
+            </a:ln>
+          </p:spPr>
+          <p:txBody>
+            <a:bodyPr wrap="none" rtlCol="0">
+              <a:spAutoFit/>
+            </a:bodyPr>
+            <a:lstStyle/>
+            <a:p>
+              <a:r>
+                <a:rPr lang="en-US" sz="3600" dirty="0" err="1"/>
+                <a:t>L</a:t>
+              </a:r>
+              <a:r>
+                <a:rPr lang="en-US" sz="3600" baseline="-25000" dirty="0" err="1"/>
+                <a:t>x,t</a:t>
+              </a:r>
+              <a:endParaRPr lang="en-US" sz="3600" dirty="0"/>
+            </a:p>
+          </p:txBody>
+        </p:sp>
+        <p:sp>
+          <p:nvSpPr>
+            <p:cNvPr id="77" name="TextBox 76">
+              <a:extLst>
+                <a:ext uri="{FF2B5EF4-FFF2-40B4-BE49-F238E27FC236}">
+                  <a16:creationId xmlns:a16="http://schemas.microsoft.com/office/drawing/2014/main" id="{F8B73E9B-1BE7-64E8-E620-7CDB8F125D58}"/>
+                </a:ext>
+              </a:extLst>
+            </p:cNvPr>
+            <p:cNvSpPr txBox="1"/>
+            <p:nvPr/>
+          </p:nvSpPr>
+          <p:spPr>
+            <a:xfrm>
+              <a:off x="5395281" y="2388185"/>
+              <a:ext cx="1303498" cy="646331"/>
+            </a:xfrm>
+            <a:prstGeom prst="rect">
+              <a:avLst/>
+            </a:prstGeom>
+            <a:noFill/>
+            <a:ln w="19050">
+              <a:noFill/>
+            </a:ln>
+          </p:spPr>
+          <p:txBody>
+            <a:bodyPr wrap="none" rtlCol="0">
+              <a:spAutoFit/>
+            </a:bodyPr>
+            <a:lstStyle/>
+            <a:p>
+              <a:r>
+                <a:rPr lang="en-US" sz="3600" dirty="0"/>
+                <a:t>L</a:t>
+              </a:r>
+              <a:r>
+                <a:rPr lang="en-US" sz="3600" baseline="-25000" dirty="0"/>
+                <a:t>x+1,t+1</a:t>
+              </a:r>
+              <a:endParaRPr lang="en-US" sz="3600" dirty="0"/>
+            </a:p>
+          </p:txBody>
+        </p:sp>
+        <p:sp>
+          <p:nvSpPr>
+            <p:cNvPr id="78" name="TextBox 77">
+              <a:extLst>
+                <a:ext uri="{FF2B5EF4-FFF2-40B4-BE49-F238E27FC236}">
+                  <a16:creationId xmlns:a16="http://schemas.microsoft.com/office/drawing/2014/main" id="{43095B57-2132-3B31-FC1D-DE3FFB03EF7F}"/>
+                </a:ext>
+              </a:extLst>
+            </p:cNvPr>
+            <p:cNvSpPr txBox="1"/>
+            <p:nvPr/>
+          </p:nvSpPr>
+          <p:spPr>
+            <a:xfrm>
+              <a:off x="4521041" y="4040535"/>
+              <a:ext cx="1096710" cy="646331"/>
+            </a:xfrm>
+            <a:prstGeom prst="rect">
+              <a:avLst/>
+            </a:prstGeom>
+            <a:noFill/>
+            <a:ln w="19050">
+              <a:noFill/>
+            </a:ln>
+          </p:spPr>
+          <p:txBody>
+            <a:bodyPr wrap="none" rtlCol="0">
+              <a:spAutoFit/>
+            </a:bodyPr>
+            <a:lstStyle/>
+            <a:p>
+              <a:r>
+                <a:rPr lang="en-US" sz="3600" dirty="0"/>
+                <a:t>U</a:t>
+              </a:r>
+              <a:r>
+                <a:rPr lang="en-US" sz="3600" baseline="-25000" dirty="0"/>
+                <a:t>x,t+1</a:t>
+              </a:r>
+              <a:endParaRPr lang="en-US" sz="3600" dirty="0"/>
+            </a:p>
+          </p:txBody>
+        </p:sp>
+        <p:sp>
+          <p:nvSpPr>
+            <p:cNvPr id="79" name="TextBox 78">
+              <a:extLst>
+                <a:ext uri="{FF2B5EF4-FFF2-40B4-BE49-F238E27FC236}">
+                  <a16:creationId xmlns:a16="http://schemas.microsoft.com/office/drawing/2014/main" id="{E32B5D62-0913-3ECB-44E7-17FA339CFC68}"/>
+                </a:ext>
+              </a:extLst>
+            </p:cNvPr>
+            <p:cNvSpPr txBox="1"/>
+            <p:nvPr/>
+          </p:nvSpPr>
+          <p:spPr>
+            <a:xfrm>
+              <a:off x="6889406" y="1382421"/>
+              <a:ext cx="1406091" cy="646331"/>
+            </a:xfrm>
+            <a:prstGeom prst="rect">
+              <a:avLst/>
+            </a:prstGeom>
+            <a:noFill/>
+            <a:ln w="19050">
+              <a:noFill/>
+            </a:ln>
+          </p:spPr>
+          <p:txBody>
+            <a:bodyPr wrap="none" rtlCol="0">
+              <a:spAutoFit/>
+            </a:bodyPr>
+            <a:lstStyle/>
+            <a:p>
+              <a:r>
+                <a:rPr lang="en-US" sz="3600" dirty="0"/>
+                <a:t>U</a:t>
+              </a:r>
+              <a:r>
+                <a:rPr lang="en-US" sz="3600" baseline="-25000" dirty="0"/>
+                <a:t>x+1,t+2</a:t>
+              </a:r>
+              <a:endParaRPr lang="en-US" sz="3600" dirty="0"/>
+            </a:p>
+          </p:txBody>
+        </p:sp>
+      </p:grpSp>
+    </p:spTree>
+    <p:extLst>
+      <p:ext uri="{BB962C8B-B14F-4D97-AF65-F5344CB8AC3E}">
+        <p14:creationId xmlns:p14="http://schemas.microsoft.com/office/powerpoint/2010/main" val="370810060"/>
+      </p:ext>
+    </p:extLst>
+  </p:cSld>
+  <p:clrMapOvr>
+    <a:masterClrMapping/>
+  </p:clrMapOvr>
+</p:sld>
+</file>
+
 <file path=ppt/theme/theme1.xml><?xml version="1.0" encoding="utf-8"?>
 <a:theme xmlns:a="http://schemas.openxmlformats.org/drawingml/2006/main" name="Office Theme">
   <a:themeElements>

</xml_diff>